<commit_message>
until ''THE PROPOSED ALGORITHM'' not included
</commit_message>
<xml_diff>
--- a/project presentation.pptx
+++ b/project presentation.pptx
@@ -5,10 +5,10 @@
     <p:sldMasterId id="2147483668" r:id="rId1"/>
   </p:sldMasterIdLst>
   <p:notesMasterIdLst>
-    <p:notesMasterId r:id="rId15"/>
+    <p:notesMasterId r:id="rId17"/>
   </p:notesMasterIdLst>
   <p:handoutMasterIdLst>
-    <p:handoutMasterId r:id="rId16"/>
+    <p:handoutMasterId r:id="rId18"/>
   </p:handoutMasterIdLst>
   <p:sldIdLst>
     <p:sldId id="257" r:id="rId2"/>
@@ -24,6 +24,8 @@
     <p:sldId id="267" r:id="rId12"/>
     <p:sldId id="268" r:id="rId13"/>
     <p:sldId id="269" r:id="rId14"/>
+    <p:sldId id="271" r:id="rId15"/>
+    <p:sldId id="272" r:id="rId16"/>
   </p:sldIdLst>
   <p:sldSz cx="12192000" cy="6858000"/>
   <p:notesSz cx="6858000" cy="9144000"/>
@@ -12946,6 +12948,1483 @@
 </p:sld>
 </file>
 
+<file path=ppt/slides/slide14.xml><?xml version="1.0" encoding="utf-8"?>
+<p:sld xmlns:a="http://schemas.openxmlformats.org/drawingml/2006/main" xmlns:r="http://schemas.openxmlformats.org/officeDocument/2006/relationships" xmlns:p="http://schemas.openxmlformats.org/presentationml/2006/main">
+  <p:cSld>
+    <p:spTree>
+      <p:nvGrpSpPr>
+        <p:cNvPr id="1" name=""/>
+        <p:cNvGrpSpPr/>
+        <p:nvPr/>
+      </p:nvGrpSpPr>
+      <p:grpSpPr>
+        <a:xfrm>
+          <a:off x="0" y="0"/>
+          <a:ext cx="0" cy="0"/>
+          <a:chOff x="0" y="0"/>
+          <a:chExt cx="0" cy="0"/>
+        </a:xfrm>
+      </p:grpSpPr>
+      <p:sp>
+        <p:nvSpPr>
+          <p:cNvPr id="2" name="כותרת 1">
+            <a:extLst>
+              <a:ext uri="{FF2B5EF4-FFF2-40B4-BE49-F238E27FC236}">
+                <a16:creationId xmlns:a16="http://schemas.microsoft.com/office/drawing/2014/main" id="{47720DBE-E935-427A-9051-3CF0D4DC97E6}"/>
+              </a:ext>
+            </a:extLst>
+          </p:cNvPr>
+          <p:cNvSpPr>
+            <a:spLocks noGrp="1"/>
+          </p:cNvSpPr>
+          <p:nvPr>
+            <p:ph type="title"/>
+          </p:nvPr>
+        </p:nvSpPr>
+        <p:spPr/>
+        <p:txBody>
+          <a:bodyPr/>
+          <a:lstStyle/>
+          <a:p>
+            <a:r>
+              <a:rPr lang="en-US" b="1" dirty="0"/>
+              <a:t>SPARSELAND AND K-SVD - </a:t>
+            </a:r>
+            <a:r>
+              <a:rPr lang="en-US" dirty="0"/>
+              <a:t>K-SVD</a:t>
+            </a:r>
+            <a:endParaRPr lang="he-IL" dirty="0"/>
+          </a:p>
+        </p:txBody>
+      </p:sp>
+      <mc:AlternateContent xmlns:mc="http://schemas.openxmlformats.org/markup-compatibility/2006">
+        <mc:Choice xmlns:a14="http://schemas.microsoft.com/office/drawing/2010/main" Requires="a14">
+          <p:sp>
+            <p:nvSpPr>
+              <p:cNvPr id="3" name="מציין מיקום תוכן 2">
+                <a:extLst>
+                  <a:ext uri="{FF2B5EF4-FFF2-40B4-BE49-F238E27FC236}">
+                    <a16:creationId xmlns:a16="http://schemas.microsoft.com/office/drawing/2014/main" id="{23A7FFA1-A713-4BDA-B9E2-219B3AF70930}"/>
+                  </a:ext>
+                </a:extLst>
+              </p:cNvPr>
+              <p:cNvSpPr>
+                <a:spLocks noGrp="1"/>
+              </p:cNvSpPr>
+              <p:nvPr>
+                <p:ph idx="1"/>
+              </p:nvPr>
+            </p:nvSpPr>
+            <p:spPr/>
+            <p:txBody>
+              <a:bodyPr/>
+              <a:lstStyle/>
+              <a:p>
+                <a:pPr marL="0" indent="0" algn="l" rtl="0">
+                  <a:buNone/>
+                </a:pPr>
+                <a:r>
+                  <a:rPr lang="en-US" dirty="0"/>
+                  <a:t>As seen, K-SVD is patch-based algorithm.</a:t>
+                </a:r>
+              </a:p>
+              <a:p>
+                <a:pPr marL="0" indent="0" algn="l" rtl="0">
+                  <a:buNone/>
+                </a:pPr>
+                <a:r>
+                  <a:rPr lang="en-US" dirty="0"/>
+                  <a:t>It iterate as just described. Then, it reconstructing the denoised image by weighted-averaging the resulting patches. </a:t>
+                </a:r>
+              </a:p>
+              <a:p>
+                <a:pPr marL="0" indent="0" algn="l" rtl="0">
+                  <a:buNone/>
+                </a:pPr>
+                <a:r>
+                  <a:rPr lang="en-US" dirty="0"/>
+                  <a:t>It approximates the solution of the following problem:</a:t>
+                </a:r>
+              </a:p>
+              <a:p>
+                <a:pPr marL="0" indent="0" algn="l" rtl="0">
+                  <a:buNone/>
+                </a:pPr>
+                <a14:m>
+                  <m:oMathPara xmlns:m="http://schemas.openxmlformats.org/officeDocument/2006/math">
+                    <m:oMathParaPr>
+                      <m:jc m:val="centerGroup"/>
+                    </m:oMathParaPr>
+                    <m:oMath xmlns:m="http://schemas.openxmlformats.org/officeDocument/2006/math">
+                      <m:d>
+                        <m:dPr>
+                          <m:begChr m:val="["/>
+                          <m:endChr m:val="]"/>
+                          <m:ctrlPr>
+                            <a:rPr lang="en-US" i="1">
+                              <a:solidFill>
+                                <a:schemeClr val="bg1"/>
+                              </a:solidFill>
+                              <a:latin typeface="Cambria Math" panose="02040503050406030204" pitchFamily="18" charset="0"/>
+                            </a:rPr>
+                          </m:ctrlPr>
+                        </m:dPr>
+                        <m:e>
+                          <m:acc>
+                            <m:accPr>
+                              <m:chr m:val="̂"/>
+                              <m:ctrlPr>
+                                <a:rPr lang="en-US" i="1">
+                                  <a:solidFill>
+                                    <a:schemeClr val="bg1"/>
+                                  </a:solidFill>
+                                  <a:latin typeface="Cambria Math" panose="02040503050406030204" pitchFamily="18" charset="0"/>
+                                </a:rPr>
+                              </m:ctrlPr>
+                            </m:accPr>
+                            <m:e>
+                              <m:r>
+                                <a:rPr lang="en-US" i="1">
+                                  <a:solidFill>
+                                    <a:schemeClr val="bg1"/>
+                                  </a:solidFill>
+                                  <a:latin typeface="Cambria Math" panose="02040503050406030204" pitchFamily="18" charset="0"/>
+                                </a:rPr>
+                                <m:t>𝑥</m:t>
+                              </m:r>
+                            </m:e>
+                          </m:acc>
+                          <m:r>
+                            <a:rPr lang="en-US" i="1">
+                              <a:solidFill>
+                                <a:schemeClr val="bg1"/>
+                              </a:solidFill>
+                              <a:latin typeface="Cambria Math" panose="02040503050406030204" pitchFamily="18" charset="0"/>
+                            </a:rPr>
+                            <m:t>,</m:t>
+                          </m:r>
+                          <m:acc>
+                            <m:accPr>
+                              <m:chr m:val="̂"/>
+                              <m:ctrlPr>
+                                <a:rPr lang="en-US" i="1">
+                                  <a:solidFill>
+                                    <a:schemeClr val="bg1"/>
+                                  </a:solidFill>
+                                  <a:latin typeface="Cambria Math" panose="02040503050406030204" pitchFamily="18" charset="0"/>
+                                </a:rPr>
+                              </m:ctrlPr>
+                            </m:accPr>
+                            <m:e>
+                              <m:r>
+                                <a:rPr lang="en-US" i="1">
+                                  <a:solidFill>
+                                    <a:schemeClr val="bg1"/>
+                                  </a:solidFill>
+                                  <a:latin typeface="Cambria Math" panose="02040503050406030204" pitchFamily="18" charset="0"/>
+                                </a:rPr>
+                                <m:t>𝐷</m:t>
+                              </m:r>
+                            </m:e>
+                          </m:acc>
+                          <m:r>
+                            <a:rPr lang="en-US" i="1">
+                              <a:solidFill>
+                                <a:schemeClr val="bg1"/>
+                              </a:solidFill>
+                              <a:latin typeface="Cambria Math" panose="02040503050406030204" pitchFamily="18" charset="0"/>
+                            </a:rPr>
+                            <m:t>,</m:t>
+                          </m:r>
+                          <m:sSubSup>
+                            <m:sSubSupPr>
+                              <m:ctrlPr>
+                                <a:rPr lang="en-US" i="1">
+                                  <a:solidFill>
+                                    <a:schemeClr val="bg1"/>
+                                  </a:solidFill>
+                                  <a:latin typeface="Cambria Math" panose="02040503050406030204" pitchFamily="18" charset="0"/>
+                                </a:rPr>
+                              </m:ctrlPr>
+                            </m:sSubSupPr>
+                            <m:e>
+                              <m:d>
+                                <m:dPr>
+                                  <m:begChr m:val="{"/>
+                                  <m:endChr m:val="}"/>
+                                  <m:ctrlPr>
+                                    <a:rPr lang="en-US" i="1">
+                                      <a:solidFill>
+                                        <a:schemeClr val="bg1"/>
+                                      </a:solidFill>
+                                      <a:latin typeface="Cambria Math" panose="02040503050406030204" pitchFamily="18" charset="0"/>
+                                    </a:rPr>
+                                  </m:ctrlPr>
+                                </m:dPr>
+                                <m:e>
+                                  <m:sSub>
+                                    <m:sSubPr>
+                                      <m:ctrlPr>
+                                        <a:rPr lang="en-US" i="1">
+                                          <a:solidFill>
+                                            <a:schemeClr val="bg1"/>
+                                          </a:solidFill>
+                                          <a:latin typeface="Cambria Math" panose="02040503050406030204" pitchFamily="18" charset="0"/>
+                                        </a:rPr>
+                                      </m:ctrlPr>
+                                    </m:sSubPr>
+                                    <m:e>
+                                      <m:acc>
+                                        <m:accPr>
+                                          <m:chr m:val="̂"/>
+                                          <m:ctrlPr>
+                                            <a:rPr lang="en-US" i="1">
+                                              <a:solidFill>
+                                                <a:schemeClr val="bg1"/>
+                                              </a:solidFill>
+                                              <a:latin typeface="Cambria Math" panose="02040503050406030204" pitchFamily="18" charset="0"/>
+                                            </a:rPr>
+                                          </m:ctrlPr>
+                                        </m:accPr>
+                                        <m:e>
+                                          <m:r>
+                                            <a:rPr lang="en-US" i="1">
+                                              <a:solidFill>
+                                                <a:schemeClr val="bg1"/>
+                                              </a:solidFill>
+                                              <a:latin typeface="Cambria Math" panose="02040503050406030204" pitchFamily="18" charset="0"/>
+                                            </a:rPr>
+                                            <m:t>𝛼</m:t>
+                                          </m:r>
+                                        </m:e>
+                                      </m:acc>
+                                    </m:e>
+                                    <m:sub>
+                                      <m:r>
+                                        <a:rPr lang="en-US" i="1">
+                                          <a:solidFill>
+                                            <a:schemeClr val="bg1"/>
+                                          </a:solidFill>
+                                          <a:latin typeface="Cambria Math" panose="02040503050406030204" pitchFamily="18" charset="0"/>
+                                        </a:rPr>
+                                        <m:t>𝑖</m:t>
+                                      </m:r>
+                                    </m:sub>
+                                  </m:sSub>
+                                </m:e>
+                              </m:d>
+                            </m:e>
+                            <m:sub>
+                              <m:r>
+                                <a:rPr lang="en-US" i="1">
+                                  <a:solidFill>
+                                    <a:schemeClr val="bg1"/>
+                                  </a:solidFill>
+                                  <a:latin typeface="Cambria Math" panose="02040503050406030204" pitchFamily="18" charset="0"/>
+                                </a:rPr>
+                                <m:t>𝑖</m:t>
+                              </m:r>
+                              <m:r>
+                                <a:rPr lang="en-US" i="1">
+                                  <a:solidFill>
+                                    <a:schemeClr val="bg1"/>
+                                  </a:solidFill>
+                                  <a:latin typeface="Cambria Math" panose="02040503050406030204" pitchFamily="18" charset="0"/>
+                                </a:rPr>
+                                <m:t>=</m:t>
+                              </m:r>
+                              <m:r>
+                                <a:rPr lang="en-US" i="1">
+                                  <a:solidFill>
+                                    <a:schemeClr val="bg1"/>
+                                  </a:solidFill>
+                                  <a:latin typeface="Cambria Math" panose="02040503050406030204" pitchFamily="18" charset="0"/>
+                                </a:rPr>
+                                <m:t>1</m:t>
+                              </m:r>
+                            </m:sub>
+                            <m:sup>
+                              <m:r>
+                                <a:rPr lang="en-US" i="1">
+                                  <a:solidFill>
+                                    <a:schemeClr val="bg1"/>
+                                  </a:solidFill>
+                                  <a:latin typeface="Cambria Math" panose="02040503050406030204" pitchFamily="18" charset="0"/>
+                                </a:rPr>
+                                <m:t>𝑁</m:t>
+                              </m:r>
+                            </m:sup>
+                          </m:sSubSup>
+                        </m:e>
+                      </m:d>
+                      <m:r>
+                        <a:rPr lang="en-US" i="1">
+                          <a:solidFill>
+                            <a:schemeClr val="bg1"/>
+                          </a:solidFill>
+                          <a:latin typeface="Cambria Math" panose="02040503050406030204" pitchFamily="18" charset="0"/>
+                        </a:rPr>
+                        <m:t>=</m:t>
+                      </m:r>
+                      <m:func>
+                        <m:funcPr>
+                          <m:ctrlPr>
+                            <a:rPr lang="en-US" i="1">
+                              <a:solidFill>
+                                <a:schemeClr val="bg1"/>
+                              </a:solidFill>
+                              <a:latin typeface="Cambria Math" panose="02040503050406030204" pitchFamily="18" charset="0"/>
+                            </a:rPr>
+                          </m:ctrlPr>
+                        </m:funcPr>
+                        <m:fName>
+                          <m:limLow>
+                            <m:limLowPr>
+                              <m:ctrlPr>
+                                <a:rPr lang="en-US" i="1">
+                                  <a:solidFill>
+                                    <a:schemeClr val="bg1"/>
+                                  </a:solidFill>
+                                  <a:latin typeface="Cambria Math" panose="02040503050406030204" pitchFamily="18" charset="0"/>
+                                </a:rPr>
+                              </m:ctrlPr>
+                            </m:limLowPr>
+                            <m:e>
+                              <m:r>
+                                <m:rPr>
+                                  <m:sty m:val="p"/>
+                                </m:rPr>
+                                <a:rPr lang="en-US">
+                                  <a:solidFill>
+                                    <a:schemeClr val="bg1"/>
+                                  </a:solidFill>
+                                  <a:latin typeface="Cambria Math" panose="02040503050406030204" pitchFamily="18" charset="0"/>
+                                </a:rPr>
+                                <m:t>min</m:t>
+                              </m:r>
+                            </m:e>
+                            <m:lim>
+                              <m:acc>
+                                <m:accPr>
+                                  <m:chr m:val="̂"/>
+                                  <m:ctrlPr>
+                                    <a:rPr lang="en-US" i="1">
+                                      <a:solidFill>
+                                        <a:schemeClr val="bg1"/>
+                                      </a:solidFill>
+                                      <a:latin typeface="Cambria Math" panose="02040503050406030204" pitchFamily="18" charset="0"/>
+                                    </a:rPr>
+                                  </m:ctrlPr>
+                                </m:accPr>
+                                <m:e>
+                                  <m:r>
+                                    <a:rPr lang="en-US" i="1">
+                                      <a:solidFill>
+                                        <a:schemeClr val="bg1"/>
+                                      </a:solidFill>
+                                      <a:latin typeface="Cambria Math" panose="02040503050406030204" pitchFamily="18" charset="0"/>
+                                    </a:rPr>
+                                    <m:t>𝑥</m:t>
+                                  </m:r>
+                                </m:e>
+                              </m:acc>
+                              <m:r>
+                                <a:rPr lang="en-US" i="1">
+                                  <a:solidFill>
+                                    <a:schemeClr val="bg1"/>
+                                  </a:solidFill>
+                                  <a:latin typeface="Cambria Math" panose="02040503050406030204" pitchFamily="18" charset="0"/>
+                                </a:rPr>
+                                <m:t>,</m:t>
+                              </m:r>
+                              <m:acc>
+                                <m:accPr>
+                                  <m:chr m:val="̂"/>
+                                  <m:ctrlPr>
+                                    <a:rPr lang="en-US" i="1">
+                                      <a:solidFill>
+                                        <a:schemeClr val="bg1"/>
+                                      </a:solidFill>
+                                      <a:latin typeface="Cambria Math" panose="02040503050406030204" pitchFamily="18" charset="0"/>
+                                    </a:rPr>
+                                  </m:ctrlPr>
+                                </m:accPr>
+                                <m:e>
+                                  <m:r>
+                                    <a:rPr lang="en-US" i="1">
+                                      <a:solidFill>
+                                        <a:schemeClr val="bg1"/>
+                                      </a:solidFill>
+                                      <a:latin typeface="Cambria Math" panose="02040503050406030204" pitchFamily="18" charset="0"/>
+                                    </a:rPr>
+                                    <m:t>𝐷</m:t>
+                                  </m:r>
+                                </m:e>
+                              </m:acc>
+                              <m:r>
+                                <a:rPr lang="en-US" i="1">
+                                  <a:solidFill>
+                                    <a:schemeClr val="bg1"/>
+                                  </a:solidFill>
+                                  <a:latin typeface="Cambria Math" panose="02040503050406030204" pitchFamily="18" charset="0"/>
+                                </a:rPr>
+                                <m:t>,</m:t>
+                              </m:r>
+                              <m:sSubSup>
+                                <m:sSubSupPr>
+                                  <m:ctrlPr>
+                                    <a:rPr lang="en-US" i="1">
+                                      <a:solidFill>
+                                        <a:schemeClr val="bg1"/>
+                                      </a:solidFill>
+                                      <a:latin typeface="Cambria Math" panose="02040503050406030204" pitchFamily="18" charset="0"/>
+                                    </a:rPr>
+                                  </m:ctrlPr>
+                                </m:sSubSupPr>
+                                <m:e>
+                                  <m:d>
+                                    <m:dPr>
+                                      <m:begChr m:val="{"/>
+                                      <m:endChr m:val="}"/>
+                                      <m:ctrlPr>
+                                        <a:rPr lang="en-US" i="1">
+                                          <a:solidFill>
+                                            <a:schemeClr val="bg1"/>
+                                          </a:solidFill>
+                                          <a:latin typeface="Cambria Math" panose="02040503050406030204" pitchFamily="18" charset="0"/>
+                                        </a:rPr>
+                                      </m:ctrlPr>
+                                    </m:dPr>
+                                    <m:e>
+                                      <m:sSub>
+                                        <m:sSubPr>
+                                          <m:ctrlPr>
+                                            <a:rPr lang="en-US" i="1">
+                                              <a:solidFill>
+                                                <a:schemeClr val="bg1"/>
+                                              </a:solidFill>
+                                              <a:latin typeface="Cambria Math" panose="02040503050406030204" pitchFamily="18" charset="0"/>
+                                            </a:rPr>
+                                          </m:ctrlPr>
+                                        </m:sSubPr>
+                                        <m:e>
+                                          <m:acc>
+                                            <m:accPr>
+                                              <m:chr m:val="̂"/>
+                                              <m:ctrlPr>
+                                                <a:rPr lang="en-US" i="1">
+                                                  <a:solidFill>
+                                                    <a:schemeClr val="bg1"/>
+                                                  </a:solidFill>
+                                                  <a:latin typeface="Cambria Math" panose="02040503050406030204" pitchFamily="18" charset="0"/>
+                                                </a:rPr>
+                                              </m:ctrlPr>
+                                            </m:accPr>
+                                            <m:e>
+                                              <m:r>
+                                                <a:rPr lang="en-US" i="1">
+                                                  <a:solidFill>
+                                                    <a:schemeClr val="bg1"/>
+                                                  </a:solidFill>
+                                                  <a:latin typeface="Cambria Math" panose="02040503050406030204" pitchFamily="18" charset="0"/>
+                                                </a:rPr>
+                                                <m:t>𝛼</m:t>
+                                              </m:r>
+                                            </m:e>
+                                          </m:acc>
+                                        </m:e>
+                                        <m:sub>
+                                          <m:r>
+                                            <a:rPr lang="en-US" i="1">
+                                              <a:solidFill>
+                                                <a:schemeClr val="bg1"/>
+                                              </a:solidFill>
+                                              <a:latin typeface="Cambria Math" panose="02040503050406030204" pitchFamily="18" charset="0"/>
+                                            </a:rPr>
+                                            <m:t>𝑖</m:t>
+                                          </m:r>
+                                        </m:sub>
+                                      </m:sSub>
+                                    </m:e>
+                                  </m:d>
+                                </m:e>
+                                <m:sub>
+                                  <m:r>
+                                    <a:rPr lang="en-US" i="1">
+                                      <a:solidFill>
+                                        <a:schemeClr val="bg1"/>
+                                      </a:solidFill>
+                                      <a:latin typeface="Cambria Math" panose="02040503050406030204" pitchFamily="18" charset="0"/>
+                                    </a:rPr>
+                                    <m:t>𝑖</m:t>
+                                  </m:r>
+                                  <m:r>
+                                    <a:rPr lang="en-US" i="1">
+                                      <a:solidFill>
+                                        <a:schemeClr val="bg1"/>
+                                      </a:solidFill>
+                                      <a:latin typeface="Cambria Math" panose="02040503050406030204" pitchFamily="18" charset="0"/>
+                                    </a:rPr>
+                                    <m:t>=</m:t>
+                                  </m:r>
+                                  <m:r>
+                                    <a:rPr lang="en-US" i="1">
+                                      <a:solidFill>
+                                        <a:schemeClr val="bg1"/>
+                                      </a:solidFill>
+                                      <a:latin typeface="Cambria Math" panose="02040503050406030204" pitchFamily="18" charset="0"/>
+                                    </a:rPr>
+                                    <m:t>1</m:t>
+                                  </m:r>
+                                </m:sub>
+                                <m:sup>
+                                  <m:r>
+                                    <a:rPr lang="en-US" i="1">
+                                      <a:solidFill>
+                                        <a:schemeClr val="bg1"/>
+                                      </a:solidFill>
+                                      <a:latin typeface="Cambria Math" panose="02040503050406030204" pitchFamily="18" charset="0"/>
+                                    </a:rPr>
+                                    <m:t>𝑁</m:t>
+                                  </m:r>
+                                </m:sup>
+                              </m:sSubSup>
+                            </m:lim>
+                          </m:limLow>
+                        </m:fName>
+                        <m:e>
+                          <m:sSubSup>
+                            <m:sSubSupPr>
+                              <m:ctrlPr>
+                                <a:rPr lang="en-US" i="1">
+                                  <a:solidFill>
+                                    <a:schemeClr val="bg1"/>
+                                  </a:solidFill>
+                                  <a:latin typeface="Cambria Math" panose="02040503050406030204" pitchFamily="18" charset="0"/>
+                                </a:rPr>
+                              </m:ctrlPr>
+                            </m:sSubSupPr>
+                            <m:e>
+                              <m:r>
+                                <a:rPr lang="en-US" i="1">
+                                  <a:solidFill>
+                                    <a:schemeClr val="bg1"/>
+                                  </a:solidFill>
+                                  <a:latin typeface="Cambria Math" panose="02040503050406030204" pitchFamily="18" charset="0"/>
+                                </a:rPr>
+                                <m:t>𝜇</m:t>
+                              </m:r>
+                              <m:d>
+                                <m:dPr>
+                                  <m:begChr m:val="‖"/>
+                                  <m:endChr m:val="‖"/>
+                                  <m:ctrlPr>
+                                    <a:rPr lang="en-US" i="1">
+                                      <a:solidFill>
+                                        <a:schemeClr val="bg1"/>
+                                      </a:solidFill>
+                                      <a:latin typeface="Cambria Math" panose="02040503050406030204" pitchFamily="18" charset="0"/>
+                                    </a:rPr>
+                                  </m:ctrlPr>
+                                </m:dPr>
+                                <m:e>
+                                  <m:r>
+                                    <a:rPr lang="en-US" i="1">
+                                      <a:solidFill>
+                                        <a:schemeClr val="bg1"/>
+                                      </a:solidFill>
+                                      <a:latin typeface="Cambria Math" panose="02040503050406030204" pitchFamily="18" charset="0"/>
+                                    </a:rPr>
+                                    <m:t>𝑥</m:t>
+                                  </m:r>
+                                  <m:r>
+                                    <a:rPr lang="en-US" i="1">
+                                      <a:solidFill>
+                                        <a:schemeClr val="bg1"/>
+                                      </a:solidFill>
+                                      <a:latin typeface="Cambria Math" panose="02040503050406030204" pitchFamily="18" charset="0"/>
+                                    </a:rPr>
+                                    <m:t>−</m:t>
+                                  </m:r>
+                                  <m:r>
+                                    <a:rPr lang="en-US" i="1">
+                                      <a:solidFill>
+                                        <a:schemeClr val="bg1"/>
+                                      </a:solidFill>
+                                      <a:latin typeface="Cambria Math" panose="02040503050406030204" pitchFamily="18" charset="0"/>
+                                    </a:rPr>
+                                    <m:t>𝑦</m:t>
+                                  </m:r>
+                                </m:e>
+                              </m:d>
+                            </m:e>
+                            <m:sub>
+                              <m:r>
+                                <a:rPr lang="en-US" i="1">
+                                  <a:solidFill>
+                                    <a:schemeClr val="bg1"/>
+                                  </a:solidFill>
+                                  <a:latin typeface="Cambria Math" panose="02040503050406030204" pitchFamily="18" charset="0"/>
+                                </a:rPr>
+                                <m:t>2</m:t>
+                              </m:r>
+                            </m:sub>
+                            <m:sup>
+                              <m:r>
+                                <a:rPr lang="en-US" i="1">
+                                  <a:solidFill>
+                                    <a:schemeClr val="bg1"/>
+                                  </a:solidFill>
+                                  <a:latin typeface="Cambria Math" panose="02040503050406030204" pitchFamily="18" charset="0"/>
+                                </a:rPr>
+                                <m:t>2</m:t>
+                              </m:r>
+                            </m:sup>
+                          </m:sSubSup>
+                        </m:e>
+                      </m:func>
+                      <m:r>
+                        <a:rPr lang="en-US" i="1">
+                          <a:solidFill>
+                            <a:schemeClr val="bg1"/>
+                          </a:solidFill>
+                          <a:latin typeface="Cambria Math" panose="02040503050406030204" pitchFamily="18" charset="0"/>
+                        </a:rPr>
+                        <m:t>+</m:t>
+                      </m:r>
+                      <m:nary>
+                        <m:naryPr>
+                          <m:chr m:val="∑"/>
+                          <m:limLoc m:val="undOvr"/>
+                          <m:ctrlPr>
+                            <a:rPr lang="en-US" i="1">
+                              <a:solidFill>
+                                <a:schemeClr val="bg1"/>
+                              </a:solidFill>
+                              <a:latin typeface="Cambria Math" panose="02040503050406030204" pitchFamily="18" charset="0"/>
+                            </a:rPr>
+                          </m:ctrlPr>
+                        </m:naryPr>
+                        <m:sub>
+                          <m:r>
+                            <a:rPr lang="en-US" i="1">
+                              <a:solidFill>
+                                <a:schemeClr val="bg1"/>
+                              </a:solidFill>
+                              <a:latin typeface="Cambria Math" panose="02040503050406030204" pitchFamily="18" charset="0"/>
+                            </a:rPr>
+                            <m:t>𝑖</m:t>
+                          </m:r>
+                          <m:r>
+                            <a:rPr lang="en-US" i="1">
+                              <a:solidFill>
+                                <a:schemeClr val="bg1"/>
+                              </a:solidFill>
+                              <a:latin typeface="Cambria Math" panose="02040503050406030204" pitchFamily="18" charset="0"/>
+                            </a:rPr>
+                            <m:t>=</m:t>
+                          </m:r>
+                          <m:r>
+                            <a:rPr lang="en-US" i="1">
+                              <a:solidFill>
+                                <a:schemeClr val="bg1"/>
+                              </a:solidFill>
+                              <a:latin typeface="Cambria Math" panose="02040503050406030204" pitchFamily="18" charset="0"/>
+                            </a:rPr>
+                            <m:t>1</m:t>
+                          </m:r>
+                        </m:sub>
+                        <m:sup>
+                          <m:r>
+                            <a:rPr lang="en-US" i="1">
+                              <a:solidFill>
+                                <a:schemeClr val="bg1"/>
+                              </a:solidFill>
+                              <a:latin typeface="Cambria Math" panose="02040503050406030204" pitchFamily="18" charset="0"/>
+                            </a:rPr>
+                            <m:t>𝑁</m:t>
+                          </m:r>
+                        </m:sup>
+                        <m:e>
+                          <m:r>
+                            <a:rPr lang="en-US" i="1">
+                              <a:solidFill>
+                                <a:schemeClr val="bg1"/>
+                              </a:solidFill>
+                              <a:latin typeface="Cambria Math" panose="02040503050406030204" pitchFamily="18" charset="0"/>
+                            </a:rPr>
+                            <m:t> </m:t>
+                          </m:r>
+                          <m:sSub>
+                            <m:sSubPr>
+                              <m:ctrlPr>
+                                <a:rPr lang="en-US" i="1">
+                                  <a:solidFill>
+                                    <a:schemeClr val="bg1"/>
+                                  </a:solidFill>
+                                  <a:latin typeface="Cambria Math" panose="02040503050406030204" pitchFamily="18" charset="0"/>
+                                </a:rPr>
+                              </m:ctrlPr>
+                            </m:sSubPr>
+                            <m:e>
+                              <m:d>
+                                <m:dPr>
+                                  <m:begChr m:val="‖"/>
+                                  <m:endChr m:val="‖"/>
+                                  <m:ctrlPr>
+                                    <a:rPr lang="en-US" i="1">
+                                      <a:solidFill>
+                                        <a:schemeClr val="bg1"/>
+                                      </a:solidFill>
+                                      <a:latin typeface="Cambria Math" panose="02040503050406030204" pitchFamily="18" charset="0"/>
+                                    </a:rPr>
+                                  </m:ctrlPr>
+                                </m:dPr>
+                                <m:e>
+                                  <m:sSub>
+                                    <m:sSubPr>
+                                      <m:ctrlPr>
+                                        <a:rPr lang="en-US" i="1">
+                                          <a:solidFill>
+                                            <a:schemeClr val="bg1"/>
+                                          </a:solidFill>
+                                          <a:latin typeface="Cambria Math" panose="02040503050406030204" pitchFamily="18" charset="0"/>
+                                        </a:rPr>
+                                      </m:ctrlPr>
+                                    </m:sSubPr>
+                                    <m:e>
+                                      <m:r>
+                                        <a:rPr lang="en-US" i="1">
+                                          <a:solidFill>
+                                            <a:schemeClr val="bg1"/>
+                                          </a:solidFill>
+                                          <a:latin typeface="Cambria Math" panose="02040503050406030204" pitchFamily="18" charset="0"/>
+                                        </a:rPr>
+                                        <m:t>𝛼</m:t>
+                                      </m:r>
+                                    </m:e>
+                                    <m:sub>
+                                      <m:r>
+                                        <a:rPr lang="en-US" i="1">
+                                          <a:solidFill>
+                                            <a:schemeClr val="bg1"/>
+                                          </a:solidFill>
+                                          <a:latin typeface="Cambria Math" panose="02040503050406030204" pitchFamily="18" charset="0"/>
+                                        </a:rPr>
+                                        <m:t>𝑖</m:t>
+                                      </m:r>
+                                    </m:sub>
+                                  </m:sSub>
+                                </m:e>
+                              </m:d>
+                            </m:e>
+                            <m:sub>
+                              <m:r>
+                                <a:rPr lang="en-US" i="1">
+                                  <a:solidFill>
+                                    <a:schemeClr val="bg1"/>
+                                  </a:solidFill>
+                                  <a:latin typeface="Cambria Math" panose="02040503050406030204" pitchFamily="18" charset="0"/>
+                                </a:rPr>
+                                <m:t>0</m:t>
+                              </m:r>
+                            </m:sub>
+                          </m:sSub>
+                        </m:e>
+                      </m:nary>
+                      <m:r>
+                        <a:rPr lang="en-US" i="1">
+                          <a:solidFill>
+                            <a:schemeClr val="bg1"/>
+                          </a:solidFill>
+                          <a:latin typeface="Cambria Math" panose="02040503050406030204" pitchFamily="18" charset="0"/>
+                        </a:rPr>
+                        <m:t>    </m:t>
+                      </m:r>
+                      <m:r>
+                        <a:rPr lang="en-US" i="1">
+                          <a:solidFill>
+                            <a:schemeClr val="bg1"/>
+                          </a:solidFill>
+                          <a:latin typeface="Cambria Math" panose="02040503050406030204" pitchFamily="18" charset="0"/>
+                        </a:rPr>
+                        <m:t>𝑠</m:t>
+                      </m:r>
+                      <m:r>
+                        <a:rPr lang="en-US" i="1">
+                          <a:solidFill>
+                            <a:schemeClr val="bg1"/>
+                          </a:solidFill>
+                          <a:latin typeface="Cambria Math" panose="02040503050406030204" pitchFamily="18" charset="0"/>
+                        </a:rPr>
+                        <m:t>.</m:t>
+                      </m:r>
+                      <m:r>
+                        <a:rPr lang="en-US" i="1">
+                          <a:solidFill>
+                            <a:schemeClr val="bg1"/>
+                          </a:solidFill>
+                          <a:latin typeface="Cambria Math" panose="02040503050406030204" pitchFamily="18" charset="0"/>
+                        </a:rPr>
+                        <m:t>𝑡</m:t>
+                      </m:r>
+                      <m:r>
+                        <a:rPr lang="en-US" i="1">
+                          <a:solidFill>
+                            <a:schemeClr val="bg1"/>
+                          </a:solidFill>
+                          <a:latin typeface="Cambria Math" panose="02040503050406030204" pitchFamily="18" charset="0"/>
+                        </a:rPr>
+                        <m:t>.   ∀</m:t>
+                      </m:r>
+                      <m:r>
+                        <a:rPr lang="en-US" i="1">
+                          <a:solidFill>
+                            <a:schemeClr val="bg1"/>
+                          </a:solidFill>
+                          <a:latin typeface="Cambria Math" panose="02040503050406030204" pitchFamily="18" charset="0"/>
+                        </a:rPr>
+                        <m:t>𝑖</m:t>
+                      </m:r>
+                      <m:r>
+                        <a:rPr lang="en-US" i="1">
+                          <a:solidFill>
+                            <a:schemeClr val="bg1"/>
+                          </a:solidFill>
+                          <a:latin typeface="Cambria Math" panose="02040503050406030204" pitchFamily="18" charset="0"/>
+                        </a:rPr>
+                        <m:t> </m:t>
+                      </m:r>
+                      <m:d>
+                        <m:dPr>
+                          <m:begChr m:val="["/>
+                          <m:endChr m:val="]"/>
+                          <m:ctrlPr>
+                            <a:rPr lang="en-US" i="1">
+                              <a:solidFill>
+                                <a:schemeClr val="bg1"/>
+                              </a:solidFill>
+                              <a:latin typeface="Cambria Math" panose="02040503050406030204" pitchFamily="18" charset="0"/>
+                            </a:rPr>
+                          </m:ctrlPr>
+                        </m:dPr>
+                        <m:e>
+                          <m:sSubSup>
+                            <m:sSubSupPr>
+                              <m:ctrlPr>
+                                <a:rPr lang="en-US" i="1">
+                                  <a:solidFill>
+                                    <a:schemeClr val="bg1"/>
+                                  </a:solidFill>
+                                  <a:latin typeface="Cambria Math" panose="02040503050406030204" pitchFamily="18" charset="0"/>
+                                </a:rPr>
+                              </m:ctrlPr>
+                            </m:sSubSupPr>
+                            <m:e>
+                              <m:d>
+                                <m:dPr>
+                                  <m:begChr m:val="‖"/>
+                                  <m:endChr m:val="‖"/>
+                                  <m:ctrlPr>
+                                    <a:rPr lang="en-US" i="1">
+                                      <a:solidFill>
+                                        <a:schemeClr val="bg1"/>
+                                      </a:solidFill>
+                                      <a:latin typeface="Cambria Math" panose="02040503050406030204" pitchFamily="18" charset="0"/>
+                                    </a:rPr>
+                                  </m:ctrlPr>
+                                </m:dPr>
+                                <m:e>
+                                  <m:r>
+                                    <a:rPr lang="en-US" i="1">
+                                      <a:solidFill>
+                                        <a:schemeClr val="bg1"/>
+                                      </a:solidFill>
+                                      <a:latin typeface="Cambria Math" panose="02040503050406030204" pitchFamily="18" charset="0"/>
+                                    </a:rPr>
+                                    <m:t>𝐷</m:t>
+                                  </m:r>
+                                  <m:sSub>
+                                    <m:sSubPr>
+                                      <m:ctrlPr>
+                                        <a:rPr lang="en-US" i="1">
+                                          <a:solidFill>
+                                            <a:schemeClr val="bg1"/>
+                                          </a:solidFill>
+                                          <a:latin typeface="Cambria Math" panose="02040503050406030204" pitchFamily="18" charset="0"/>
+                                        </a:rPr>
+                                      </m:ctrlPr>
+                                    </m:sSubPr>
+                                    <m:e>
+                                      <m:r>
+                                        <a:rPr lang="en-US" i="1">
+                                          <a:solidFill>
+                                            <a:schemeClr val="bg1"/>
+                                          </a:solidFill>
+                                          <a:latin typeface="Cambria Math" panose="02040503050406030204" pitchFamily="18" charset="0"/>
+                                        </a:rPr>
+                                        <m:t>𝛼</m:t>
+                                      </m:r>
+                                    </m:e>
+                                    <m:sub>
+                                      <m:r>
+                                        <a:rPr lang="en-US" i="1">
+                                          <a:solidFill>
+                                            <a:schemeClr val="bg1"/>
+                                          </a:solidFill>
+                                          <a:latin typeface="Cambria Math" panose="02040503050406030204" pitchFamily="18" charset="0"/>
+                                        </a:rPr>
+                                        <m:t>𝑖</m:t>
+                                      </m:r>
+                                    </m:sub>
+                                  </m:sSub>
+                                  <m:r>
+                                    <a:rPr lang="en-US" i="1">
+                                      <a:solidFill>
+                                        <a:schemeClr val="bg1"/>
+                                      </a:solidFill>
+                                      <a:latin typeface="Cambria Math" panose="02040503050406030204" pitchFamily="18" charset="0"/>
+                                    </a:rPr>
+                                    <m:t>−</m:t>
+                                  </m:r>
+                                  <m:sSub>
+                                    <m:sSubPr>
+                                      <m:ctrlPr>
+                                        <a:rPr lang="en-US" i="1">
+                                          <a:solidFill>
+                                            <a:schemeClr val="bg1"/>
+                                          </a:solidFill>
+                                          <a:latin typeface="Cambria Math" panose="02040503050406030204" pitchFamily="18" charset="0"/>
+                                        </a:rPr>
+                                      </m:ctrlPr>
+                                    </m:sSubPr>
+                                    <m:e>
+                                      <m:r>
+                                        <a:rPr lang="en-US" i="1">
+                                          <a:solidFill>
+                                            <a:schemeClr val="bg1"/>
+                                          </a:solidFill>
+                                          <a:latin typeface="Cambria Math" panose="02040503050406030204" pitchFamily="18" charset="0"/>
+                                        </a:rPr>
+                                        <m:t>𝑅</m:t>
+                                      </m:r>
+                                    </m:e>
+                                    <m:sub>
+                                      <m:r>
+                                        <a:rPr lang="en-US" i="1">
+                                          <a:solidFill>
+                                            <a:schemeClr val="bg1"/>
+                                          </a:solidFill>
+                                          <a:latin typeface="Cambria Math" panose="02040503050406030204" pitchFamily="18" charset="0"/>
+                                        </a:rPr>
+                                        <m:t>𝑖</m:t>
+                                      </m:r>
+                                    </m:sub>
+                                  </m:sSub>
+                                  <m:r>
+                                    <a:rPr lang="en-US" i="1">
+                                      <a:solidFill>
+                                        <a:schemeClr val="bg1"/>
+                                      </a:solidFill>
+                                      <a:latin typeface="Cambria Math" panose="02040503050406030204" pitchFamily="18" charset="0"/>
+                                    </a:rPr>
+                                    <m:t>𝑥</m:t>
+                                  </m:r>
+                                </m:e>
+                              </m:d>
+                            </m:e>
+                            <m:sub>
+                              <m:r>
+                                <a:rPr lang="en-US" i="1">
+                                  <a:solidFill>
+                                    <a:schemeClr val="bg1"/>
+                                  </a:solidFill>
+                                  <a:latin typeface="Cambria Math" panose="02040503050406030204" pitchFamily="18" charset="0"/>
+                                </a:rPr>
+                                <m:t>2</m:t>
+                              </m:r>
+                            </m:sub>
+                            <m:sup>
+                              <m:r>
+                                <a:rPr lang="en-US" i="1">
+                                  <a:solidFill>
+                                    <a:schemeClr val="bg1"/>
+                                  </a:solidFill>
+                                  <a:latin typeface="Cambria Math" panose="02040503050406030204" pitchFamily="18" charset="0"/>
+                                </a:rPr>
+                                <m:t>2</m:t>
+                              </m:r>
+                            </m:sup>
+                          </m:sSubSup>
+                          <m:r>
+                            <a:rPr lang="en-US" i="1">
+                              <a:solidFill>
+                                <a:schemeClr val="bg1"/>
+                              </a:solidFill>
+                              <a:latin typeface="Cambria Math" panose="02040503050406030204" pitchFamily="18" charset="0"/>
+                            </a:rPr>
+                            <m:t>≤</m:t>
+                          </m:r>
+                          <m:sSup>
+                            <m:sSupPr>
+                              <m:ctrlPr>
+                                <a:rPr lang="en-US" i="1">
+                                  <a:solidFill>
+                                    <a:schemeClr val="bg1"/>
+                                  </a:solidFill>
+                                  <a:latin typeface="Cambria Math" panose="02040503050406030204" pitchFamily="18" charset="0"/>
+                                </a:rPr>
+                              </m:ctrlPr>
+                            </m:sSupPr>
+                            <m:e>
+                              <m:r>
+                                <a:rPr lang="en-US" i="1">
+                                  <a:solidFill>
+                                    <a:schemeClr val="bg1"/>
+                                  </a:solidFill>
+                                  <a:latin typeface="Cambria Math" panose="02040503050406030204" pitchFamily="18" charset="0"/>
+                                </a:rPr>
+                                <m:t>𝜖</m:t>
+                              </m:r>
+                            </m:e>
+                            <m:sup>
+                              <m:r>
+                                <a:rPr lang="en-US" i="1">
+                                  <a:solidFill>
+                                    <a:schemeClr val="bg1"/>
+                                  </a:solidFill>
+                                  <a:latin typeface="Cambria Math" panose="02040503050406030204" pitchFamily="18" charset="0"/>
+                                </a:rPr>
+                                <m:t>2</m:t>
+                              </m:r>
+                            </m:sup>
+                          </m:sSup>
+                        </m:e>
+                      </m:d>
+                    </m:oMath>
+                  </m:oMathPara>
+                </a14:m>
+                <a:endParaRPr lang="en-US" dirty="0"/>
+              </a:p>
+              <a:p>
+                <a:pPr marL="0" indent="0" algn="l" rtl="0">
+                  <a:buNone/>
+                </a:pPr>
+                <a14:m>
+                  <m:oMathPara xmlns:m="http://schemas.openxmlformats.org/officeDocument/2006/math">
+                    <m:oMathParaPr>
+                      <m:jc m:val="left"/>
+                    </m:oMathParaPr>
+                    <m:oMath xmlns:m="http://schemas.openxmlformats.org/officeDocument/2006/math">
+                      <m:r>
+                        <m:rPr>
+                          <m:nor/>
+                        </m:rPr>
+                        <a:rPr lang="en-US"/>
+                        <m:t>where</m:t>
+                      </m:r>
+                      <m:r>
+                        <a:rPr lang="en-US" b="0" i="1" smtClean="0">
+                          <a:latin typeface="Cambria Math" panose="02040503050406030204" pitchFamily="18" charset="0"/>
+                        </a:rPr>
+                        <m:t>:</m:t>
+                      </m:r>
+                    </m:oMath>
+                  </m:oMathPara>
+                </a14:m>
+                <a:endParaRPr lang="en-US" b="0" i="1" dirty="0">
+                  <a:latin typeface="Cambria Math" panose="02040503050406030204" pitchFamily="18" charset="0"/>
+                </a:endParaRPr>
+              </a:p>
+              <a:p>
+                <a:pPr marL="0" indent="0" algn="l" rtl="0">
+                  <a:buNone/>
+                </a:pPr>
+                <a14:m>
+                  <m:oMath xmlns:m="http://schemas.openxmlformats.org/officeDocument/2006/math">
+                    <m:r>
+                      <a:rPr lang="en-US" i="1" smtClean="0">
+                        <a:solidFill>
+                          <a:srgbClr val="FF0000"/>
+                        </a:solidFill>
+                        <a:latin typeface="Cambria Math" panose="02040503050406030204" pitchFamily="18" charset="0"/>
+                      </a:rPr>
+                      <m:t>𝑁</m:t>
+                    </m:r>
+                  </m:oMath>
+                </a14:m>
+                <a:r>
+                  <a:rPr lang="en-US" dirty="0"/>
+                  <a:t> denotes the number of image patches.</a:t>
+                </a:r>
+              </a:p>
+              <a:p>
+                <a:pPr marL="0" indent="0" algn="l" rtl="0">
+                  <a:buNone/>
+                </a:pPr>
+                <a14:m>
+                  <m:oMath xmlns:m="http://schemas.openxmlformats.org/officeDocument/2006/math">
+                    <m:sSub>
+                      <m:sSubPr>
+                        <m:ctrlPr>
+                          <a:rPr lang="en-US" i="1" smtClean="0">
+                            <a:solidFill>
+                              <a:srgbClr val="FF0000"/>
+                            </a:solidFill>
+                            <a:latin typeface="Cambria Math" panose="02040503050406030204" pitchFamily="18" charset="0"/>
+                          </a:rPr>
+                        </m:ctrlPr>
+                      </m:sSubPr>
+                      <m:e>
+                        <m:r>
+                          <a:rPr lang="en-US" i="1">
+                            <a:solidFill>
+                              <a:srgbClr val="FF0000"/>
+                            </a:solidFill>
+                            <a:latin typeface="Cambria Math" panose="02040503050406030204" pitchFamily="18" charset="0"/>
+                          </a:rPr>
+                          <m:t>𝑅</m:t>
+                        </m:r>
+                      </m:e>
+                      <m:sub>
+                        <m:r>
+                          <a:rPr lang="en-US" i="1">
+                            <a:solidFill>
+                              <a:srgbClr val="FF0000"/>
+                            </a:solidFill>
+                            <a:latin typeface="Cambria Math" panose="02040503050406030204" pitchFamily="18" charset="0"/>
+                          </a:rPr>
+                          <m:t>𝑖</m:t>
+                        </m:r>
+                      </m:sub>
+                    </m:sSub>
+                    <m:r>
+                      <a:rPr lang="en-US" i="1">
+                        <a:latin typeface="Cambria Math" panose="02040503050406030204" pitchFamily="18" charset="0"/>
+                      </a:rPr>
+                      <m:t>∈</m:t>
+                    </m:r>
+                    <m:sSup>
+                      <m:sSupPr>
+                        <m:ctrlPr>
+                          <a:rPr lang="en-US" i="1">
+                            <a:latin typeface="Cambria Math" panose="02040503050406030204" pitchFamily="18" charset="0"/>
+                          </a:rPr>
+                        </m:ctrlPr>
+                      </m:sSupPr>
+                      <m:e>
+                        <m:r>
+                          <a:rPr lang="en-US" i="1">
+                            <a:latin typeface="Cambria Math" panose="02040503050406030204" pitchFamily="18" charset="0"/>
+                          </a:rPr>
+                          <m:t>ℝ</m:t>
+                        </m:r>
+                      </m:e>
+                      <m:sup>
+                        <m:r>
+                          <a:rPr lang="en-US" i="1">
+                            <a:latin typeface="Cambria Math" panose="02040503050406030204" pitchFamily="18" charset="0"/>
+                          </a:rPr>
+                          <m:t>𝑛</m:t>
+                        </m:r>
+                        <m:r>
+                          <a:rPr lang="en-US" i="1">
+                            <a:latin typeface="Cambria Math" panose="02040503050406030204" pitchFamily="18" charset="0"/>
+                          </a:rPr>
+                          <m:t>×</m:t>
+                        </m:r>
+                        <m:r>
+                          <a:rPr lang="en-US" i="1">
+                            <a:latin typeface="Cambria Math" panose="02040503050406030204" pitchFamily="18" charset="0"/>
+                          </a:rPr>
+                          <m:t>𝑟𝑐</m:t>
+                        </m:r>
+                      </m:sup>
+                    </m:sSup>
+                  </m:oMath>
+                </a14:m>
+                <a:r>
+                  <a:rPr lang="en-US" dirty="0"/>
+                  <a:t> extracts the </a:t>
+                </a:r>
+                <a:r>
+                  <a:rPr lang="en-US" dirty="0" err="1"/>
+                  <a:t>i'th</a:t>
+                </a:r>
+                <a:r>
+                  <a:rPr lang="en-US" dirty="0"/>
+                  <a:t> patch from the global image.</a:t>
+                </a:r>
+                <a:endParaRPr lang="he-IL" dirty="0"/>
+              </a:p>
+              <a:p>
+                <a:pPr marL="0" indent="0" algn="l" rtl="0">
+                  <a:buNone/>
+                </a:pPr>
+                <a:endParaRPr lang="he-IL" dirty="0"/>
+              </a:p>
+            </p:txBody>
+          </p:sp>
+        </mc:Choice>
+        <mc:Fallback>
+          <p:sp>
+            <p:nvSpPr>
+              <p:cNvPr id="3" name="מציין מיקום תוכן 2">
+                <a:extLst>
+                  <a:ext uri="{FF2B5EF4-FFF2-40B4-BE49-F238E27FC236}">
+                    <a16:creationId xmlns:a16="http://schemas.microsoft.com/office/drawing/2014/main" id="{23A7FFA1-A713-4BDA-B9E2-219B3AF70930}"/>
+                  </a:ext>
+                </a:extLst>
+              </p:cNvPr>
+              <p:cNvSpPr>
+                <a:spLocks noGrp="1" noRot="1" noChangeAspect="1" noMove="1" noResize="1" noEditPoints="1" noAdjustHandles="1" noChangeArrowheads="1" noChangeShapeType="1" noTextEdit="1"/>
+              </p:cNvSpPr>
+              <p:nvPr>
+                <p:ph idx="1"/>
+              </p:nvPr>
+            </p:nvSpPr>
+            <p:spPr>
+              <a:blipFill>
+                <a:blip r:embed="rId2"/>
+                <a:stretch>
+                  <a:fillRect l="-567" t="-942"/>
+                </a:stretch>
+              </a:blipFill>
+            </p:spPr>
+            <p:txBody>
+              <a:bodyPr/>
+              <a:lstStyle/>
+              <a:p>
+                <a:r>
+                  <a:rPr lang="he-IL">
+                    <a:noFill/>
+                  </a:rPr>
+                  <a:t> </a:t>
+                </a:r>
+              </a:p>
+            </p:txBody>
+          </p:sp>
+        </mc:Fallback>
+      </mc:AlternateContent>
+      <p:sp>
+        <p:nvSpPr>
+          <p:cNvPr id="4" name="מציין מיקום של כותרת תחתונה 3">
+            <a:extLst>
+              <a:ext uri="{FF2B5EF4-FFF2-40B4-BE49-F238E27FC236}">
+                <a16:creationId xmlns:a16="http://schemas.microsoft.com/office/drawing/2014/main" id="{2AB800ED-E2C2-4DD9-B7C5-D46F9879D882}"/>
+              </a:ext>
+            </a:extLst>
+          </p:cNvPr>
+          <p:cNvSpPr>
+            <a:spLocks noGrp="1"/>
+          </p:cNvSpPr>
+          <p:nvPr>
+            <p:ph type="ftr" sz="quarter" idx="11"/>
+          </p:nvPr>
+        </p:nvSpPr>
+        <p:spPr/>
+        <p:txBody>
+          <a:bodyPr/>
+          <a:lstStyle/>
+          <a:p>
+            <a:r>
+              <a:rPr lang="en-US"/>
+              <a:t>236862 Sparse and Redundant Representations by Prof. Michael Elad</a:t>
+            </a:r>
+            <a:endParaRPr lang="en-US" dirty="0"/>
+          </a:p>
+        </p:txBody>
+      </p:sp>
+      <p:sp>
+        <p:nvSpPr>
+          <p:cNvPr id="5" name="מציין מיקום של מספר שקופית 4">
+            <a:extLst>
+              <a:ext uri="{FF2B5EF4-FFF2-40B4-BE49-F238E27FC236}">
+                <a16:creationId xmlns:a16="http://schemas.microsoft.com/office/drawing/2014/main" id="{168CD1E4-7370-4CA8-A537-408EF3A9CADD}"/>
+              </a:ext>
+            </a:extLst>
+          </p:cNvPr>
+          <p:cNvSpPr>
+            <a:spLocks noGrp="1"/>
+          </p:cNvSpPr>
+          <p:nvPr>
+            <p:ph type="sldNum" sz="quarter" idx="12"/>
+          </p:nvPr>
+        </p:nvSpPr>
+        <p:spPr/>
+        <p:txBody>
+          <a:bodyPr/>
+          <a:lstStyle/>
+          <a:p>
+            <a:fld id="{D57F1E4F-1CFF-5643-939E-217C01CDF565}" type="slidenum">
+              <a:rPr lang="en-US" smtClean="0"/>
+              <a:pPr/>
+              <a:t>14</a:t>
+            </a:fld>
+            <a:endParaRPr lang="en-US" dirty="0"/>
+          </a:p>
+        </p:txBody>
+      </p:sp>
+    </p:spTree>
+    <p:extLst>
+      <p:ext uri="{BB962C8B-B14F-4D97-AF65-F5344CB8AC3E}">
+        <p14:creationId xmlns:p14="http://schemas.microsoft.com/office/powerpoint/2010/main" val="2515133954"/>
+      </p:ext>
+    </p:extLst>
+  </p:cSld>
+  <p:clrMapOvr>
+    <a:masterClrMapping/>
+  </p:clrMapOvr>
+</p:sld>
+</file>
+
+<file path=ppt/slides/slide15.xml><?xml version="1.0" encoding="utf-8"?>
+<p:sld xmlns:a="http://schemas.openxmlformats.org/drawingml/2006/main" xmlns:r="http://schemas.openxmlformats.org/officeDocument/2006/relationships" xmlns:p="http://schemas.openxmlformats.org/presentationml/2006/main">
+  <p:cSld>
+    <p:spTree>
+      <p:nvGrpSpPr>
+        <p:cNvPr id="1" name=""/>
+        <p:cNvGrpSpPr/>
+        <p:nvPr/>
+      </p:nvGrpSpPr>
+      <p:grpSpPr>
+        <a:xfrm>
+          <a:off x="0" y="0"/>
+          <a:ext cx="0" cy="0"/>
+          <a:chOff x="0" y="0"/>
+          <a:chExt cx="0" cy="0"/>
+        </a:xfrm>
+      </p:grpSpPr>
+      <p:sp>
+        <p:nvSpPr>
+          <p:cNvPr id="2" name="כותרת 1">
+            <a:extLst>
+              <a:ext uri="{FF2B5EF4-FFF2-40B4-BE49-F238E27FC236}">
+                <a16:creationId xmlns:a16="http://schemas.microsoft.com/office/drawing/2014/main" id="{6343F5A1-BF4C-411D-B289-12038826BED4}"/>
+              </a:ext>
+            </a:extLst>
+          </p:cNvPr>
+          <p:cNvSpPr>
+            <a:spLocks noGrp="1"/>
+          </p:cNvSpPr>
+          <p:nvPr>
+            <p:ph type="title"/>
+          </p:nvPr>
+        </p:nvSpPr>
+        <p:spPr/>
+        <p:txBody>
+          <a:bodyPr/>
+          <a:lstStyle/>
+          <a:p>
+            <a:r>
+              <a:rPr lang="en-US" b="1" dirty="0"/>
+              <a:t>THE PROPOSED ALGORITHM</a:t>
+            </a:r>
+            <a:br>
+              <a:rPr lang="en-US" dirty="0"/>
+            </a:br>
+            <a:endParaRPr lang="he-IL" dirty="0"/>
+          </a:p>
+        </p:txBody>
+      </p:sp>
+      <p:sp>
+        <p:nvSpPr>
+          <p:cNvPr id="3" name="מציין מיקום תוכן 2">
+            <a:extLst>
+              <a:ext uri="{FF2B5EF4-FFF2-40B4-BE49-F238E27FC236}">
+                <a16:creationId xmlns:a16="http://schemas.microsoft.com/office/drawing/2014/main" id="{B7B439EE-67E2-4E31-A553-DCEF79958229}"/>
+              </a:ext>
+            </a:extLst>
+          </p:cNvPr>
+          <p:cNvSpPr>
+            <a:spLocks noGrp="1"/>
+          </p:cNvSpPr>
+          <p:nvPr>
+            <p:ph idx="1"/>
+          </p:nvPr>
+        </p:nvSpPr>
+        <p:spPr/>
+        <p:txBody>
+          <a:bodyPr/>
+          <a:lstStyle/>
+          <a:p>
+            <a:endParaRPr lang="he-IL" dirty="0"/>
+          </a:p>
+        </p:txBody>
+      </p:sp>
+      <p:sp>
+        <p:nvSpPr>
+          <p:cNvPr id="4" name="מציין מיקום של כותרת תחתונה 3">
+            <a:extLst>
+              <a:ext uri="{FF2B5EF4-FFF2-40B4-BE49-F238E27FC236}">
+                <a16:creationId xmlns:a16="http://schemas.microsoft.com/office/drawing/2014/main" id="{3D3118D2-722D-40E2-9739-37171423FE74}"/>
+              </a:ext>
+            </a:extLst>
+          </p:cNvPr>
+          <p:cNvSpPr>
+            <a:spLocks noGrp="1"/>
+          </p:cNvSpPr>
+          <p:nvPr>
+            <p:ph type="ftr" sz="quarter" idx="11"/>
+          </p:nvPr>
+        </p:nvSpPr>
+        <p:spPr/>
+        <p:txBody>
+          <a:bodyPr/>
+          <a:lstStyle/>
+          <a:p>
+            <a:r>
+              <a:rPr lang="en-US"/>
+              <a:t>236862 Sparse and Redundant Representations by Prof. Michael Elad</a:t>
+            </a:r>
+            <a:endParaRPr lang="en-US" dirty="0"/>
+          </a:p>
+        </p:txBody>
+      </p:sp>
+      <p:sp>
+        <p:nvSpPr>
+          <p:cNvPr id="5" name="מציין מיקום של מספר שקופית 4">
+            <a:extLst>
+              <a:ext uri="{FF2B5EF4-FFF2-40B4-BE49-F238E27FC236}">
+                <a16:creationId xmlns:a16="http://schemas.microsoft.com/office/drawing/2014/main" id="{3E2E1465-7EF2-451D-B9A4-02451980C38A}"/>
+              </a:ext>
+            </a:extLst>
+          </p:cNvPr>
+          <p:cNvSpPr>
+            <a:spLocks noGrp="1"/>
+          </p:cNvSpPr>
+          <p:nvPr>
+            <p:ph type="sldNum" sz="quarter" idx="12"/>
+          </p:nvPr>
+        </p:nvSpPr>
+        <p:spPr/>
+        <p:txBody>
+          <a:bodyPr/>
+          <a:lstStyle/>
+          <a:p>
+            <a:fld id="{D57F1E4F-1CFF-5643-939E-217C01CDF565}" type="slidenum">
+              <a:rPr lang="en-US" smtClean="0"/>
+              <a:pPr/>
+              <a:t>15</a:t>
+            </a:fld>
+            <a:endParaRPr lang="en-US" dirty="0"/>
+          </a:p>
+        </p:txBody>
+      </p:sp>
+    </p:spTree>
+    <p:extLst>
+      <p:ext uri="{BB962C8B-B14F-4D97-AF65-F5344CB8AC3E}">
+        <p14:creationId xmlns:p14="http://schemas.microsoft.com/office/powerpoint/2010/main" val="2642166507"/>
+      </p:ext>
+    </p:extLst>
+  </p:cSld>
+  <p:clrMapOvr>
+    <a:masterClrMapping/>
+  </p:clrMapOvr>
+</p:sld>
+</file>
+
 <file path=ppt/slides/slide2.xml><?xml version="1.0" encoding="utf-8"?>
 <p:sld xmlns:a="http://schemas.openxmlformats.org/drawingml/2006/main" xmlns:r="http://schemas.openxmlformats.org/officeDocument/2006/relationships" xmlns:p="http://schemas.openxmlformats.org/presentationml/2006/main">
   <p:cSld>
@@ -14711,7 +16190,9 @@
         </p:nvSpPr>
         <p:spPr/>
         <p:txBody>
-          <a:bodyPr/>
+          <a:bodyPr>
+            <a:normAutofit/>
+          </a:bodyPr>
           <a:lstStyle/>
           <a:p>
             <a:pPr marL="0" indent="0" algn="l" rtl="0">
@@ -14728,7 +16209,45 @@
             </a:pPr>
             <a:r>
               <a:rPr lang="en-US" dirty="0"/>
-              <a:t>In nutshell, this algorithm takes overlapping patches from the image and processes each patch assuming it can be represented as a sparse linear combination of elements of redundant dictionary, restoring each patch by using this sparse model, and then reconstructing the full image by averaging the overlapping patches.</a:t>
+              <a:t>In nutshell: </a:t>
+            </a:r>
+          </a:p>
+          <a:p>
+            <a:pPr algn="l" rtl="0"/>
+            <a:r>
+              <a:rPr lang="en-US" dirty="0"/>
+              <a:t>It takes overlapping patches from the image and processes each patch assuming it can be represented as a sparse linear combination of elements of redundant dictionary. </a:t>
+            </a:r>
+          </a:p>
+          <a:p>
+            <a:pPr algn="l" rtl="0"/>
+            <a:r>
+              <a:rPr lang="en-US" dirty="0"/>
+              <a:t>Restoring each patch by using this sparse model. </a:t>
+            </a:r>
+          </a:p>
+          <a:p>
+            <a:pPr algn="l" rtl="0"/>
+            <a:r>
+              <a:rPr lang="en-US" dirty="0"/>
+              <a:t>Reconstructing the full image by averaging the overlapping patches.</a:t>
+            </a:r>
+          </a:p>
+          <a:p>
+            <a:pPr marL="0" indent="0" algn="l" rtl="0">
+              <a:buNone/>
+            </a:pPr>
+            <a:r>
+              <a:rPr lang="en-US" dirty="0"/>
+              <a:t>Later, after “</a:t>
+            </a:r>
+            <a:r>
+              <a:rPr lang="en-US" dirty="0" err="1"/>
+              <a:t>sparseland</a:t>
+            </a:r>
+            <a:r>
+              <a:rPr lang="en-US" dirty="0"/>
+              <a:t>” introduction, we will see K-SVD in more detail.</a:t>
             </a:r>
             <a:endParaRPr lang="he-IL" dirty="0"/>
           </a:p>

</xml_diff>

<commit_message>
adding 2 graphs to presentation
</commit_message>
<xml_diff>
--- a/project presentation.pptx
+++ b/project presentation.pptx
@@ -5,10 +5,10 @@
     <p:sldMasterId id="2147483668" r:id="rId1"/>
   </p:sldMasterIdLst>
   <p:notesMasterIdLst>
-    <p:notesMasterId r:id="rId29"/>
+    <p:notesMasterId r:id="rId30"/>
   </p:notesMasterIdLst>
   <p:handoutMasterIdLst>
-    <p:handoutMasterId r:id="rId30"/>
+    <p:handoutMasterId r:id="rId31"/>
   </p:handoutMasterIdLst>
   <p:sldIdLst>
     <p:sldId id="257" r:id="rId2"/>
@@ -34,10 +34,11 @@
     <p:sldId id="279" r:id="rId22"/>
     <p:sldId id="281" r:id="rId23"/>
     <p:sldId id="282" r:id="rId24"/>
-    <p:sldId id="283" r:id="rId25"/>
-    <p:sldId id="284" r:id="rId26"/>
-    <p:sldId id="285" r:id="rId27"/>
-    <p:sldId id="286" r:id="rId28"/>
+    <p:sldId id="287" r:id="rId25"/>
+    <p:sldId id="283" r:id="rId26"/>
+    <p:sldId id="284" r:id="rId27"/>
+    <p:sldId id="285" r:id="rId28"/>
+    <p:sldId id="286" r:id="rId29"/>
   </p:sldIdLst>
   <p:sldSz cx="12192000" cy="6858000"/>
   <p:notesSz cx="6858000" cy="9144000"/>
@@ -4717,7 +4718,7 @@
           <a:p>
             <a:fld id="{9FBBF96D-AFE1-42B5-A22C-46117F2573AC}" type="datetimeFigureOut">
               <a:rPr lang="he-IL" smtClean="0"/>
-              <a:t>ב'/אייר/תש"פ</a:t>
+              <a:t>ח'/אייר/תש"פ</a:t>
             </a:fld>
             <a:endParaRPr lang="he-IL"/>
           </a:p>
@@ -5709,7 +5710,7 @@
           <a:p>
             <a:fld id="{91BD6653-DFE5-4AF7-810C-CEE37E11E6DC}" type="datetime1">
               <a:rPr lang="en-US" smtClean="0"/>
-              <a:t>4/26/2020</a:t>
+              <a:t>5/2/2020</a:t>
             </a:fld>
             <a:endParaRPr lang="en-US" dirty="0"/>
           </a:p>
@@ -5965,7 +5966,7 @@
           <a:p>
             <a:fld id="{59B32808-6316-4DF5-84BB-F85401F6E023}" type="datetime1">
               <a:rPr lang="en-US" smtClean="0"/>
-              <a:t>4/26/2020</a:t>
+              <a:t>5/2/2020</a:t>
             </a:fld>
             <a:endParaRPr lang="en-US" dirty="0"/>
           </a:p>
@@ -6284,7 +6285,7 @@
           <a:p>
             <a:fld id="{C99C2143-B12A-4D3F-9DAF-6FC56B7AA162}" type="datetime1">
               <a:rPr lang="en-US" smtClean="0"/>
-              <a:t>4/26/2020</a:t>
+              <a:t>5/2/2020</a:t>
             </a:fld>
             <a:endParaRPr lang="en-US" dirty="0"/>
           </a:p>
@@ -6616,7 +6617,7 @@
           <a:p>
             <a:fld id="{D13F27F6-ECA7-48AF-A857-8034E77B05A7}" type="datetime1">
               <a:rPr lang="en-US" smtClean="0"/>
-              <a:t>4/26/2020</a:t>
+              <a:t>5/2/2020</a:t>
             </a:fld>
             <a:endParaRPr lang="en-US" dirty="0"/>
           </a:p>
@@ -6935,7 +6936,7 @@
           <a:p>
             <a:fld id="{63C60301-3BEE-4641-A053-983A79708BF9}" type="datetime1">
               <a:rPr lang="en-US" smtClean="0"/>
-              <a:t>4/26/2020</a:t>
+              <a:t>5/2/2020</a:t>
             </a:fld>
             <a:endParaRPr lang="en-US" dirty="0"/>
           </a:p>
@@ -7327,7 +7328,7 @@
           <a:p>
             <a:fld id="{AF237287-75D4-4FB6-8DDE-4ECC6AA01FC4}" type="datetime1">
               <a:rPr lang="en-US" smtClean="0"/>
-              <a:t>4/26/2020</a:t>
+              <a:t>5/2/2020</a:t>
             </a:fld>
             <a:endParaRPr lang="en-US" dirty="0"/>
           </a:p>
@@ -7502,7 +7503,7 @@
           <a:p>
             <a:fld id="{3682B54C-5E80-44BD-9CB8-558201980F17}" type="datetime1">
               <a:rPr lang="en-US" smtClean="0"/>
-              <a:t>4/26/2020</a:t>
+              <a:t>5/2/2020</a:t>
             </a:fld>
             <a:endParaRPr lang="en-US" dirty="0"/>
           </a:p>
@@ -7686,7 +7687,7 @@
           <a:p>
             <a:fld id="{FDCA2607-29D6-4322-B2A3-3331372F3C57}" type="datetime1">
               <a:rPr lang="en-US" smtClean="0"/>
-              <a:t>4/26/2020</a:t>
+              <a:t>5/2/2020</a:t>
             </a:fld>
             <a:endParaRPr lang="en-US" dirty="0"/>
           </a:p>
@@ -7867,7 +7868,7 @@
           <a:p>
             <a:fld id="{45207A52-AD67-4117-88DA-FF9203676754}" type="datetime1">
               <a:rPr lang="en-US" smtClean="0"/>
-              <a:t>4/26/2020</a:t>
+              <a:t>5/2/2020</a:t>
             </a:fld>
             <a:endParaRPr lang="en-US" dirty="0"/>
           </a:p>
@@ -8119,7 +8120,7 @@
           <a:p>
             <a:fld id="{F5949B5A-6C08-4EAD-8C8C-115A3836B2AB}" type="datetime1">
               <a:rPr lang="en-US" smtClean="0"/>
-              <a:t>4/26/2020</a:t>
+              <a:t>5/2/2020</a:t>
             </a:fld>
             <a:endParaRPr lang="en-US" dirty="0"/>
           </a:p>
@@ -8356,7 +8357,7 @@
           <a:p>
             <a:fld id="{8570C3EF-38E2-4463-BFDE-4ADEF62EF1F6}" type="datetime1">
               <a:rPr lang="en-US" smtClean="0"/>
-              <a:t>4/26/2020</a:t>
+              <a:t>5/2/2020</a:t>
             </a:fld>
             <a:endParaRPr lang="en-US" dirty="0"/>
           </a:p>
@@ -8734,7 +8735,7 @@
           <a:p>
             <a:fld id="{4CEF0B94-C5D0-4D5C-99E2-F440BE509AFA}" type="datetime1">
               <a:rPr lang="en-US" smtClean="0"/>
-              <a:t>4/26/2020</a:t>
+              <a:t>5/2/2020</a:t>
             </a:fld>
             <a:endParaRPr lang="en-US" dirty="0"/>
           </a:p>
@@ -8862,7 +8863,7 @@
           <a:p>
             <a:fld id="{F332A4DF-C94C-41F2-A8DF-D9213994DCFF}" type="datetime1">
               <a:rPr lang="en-US" smtClean="0"/>
-              <a:t>4/26/2020</a:t>
+              <a:t>5/2/2020</a:t>
             </a:fld>
             <a:endParaRPr lang="en-US" dirty="0"/>
           </a:p>
@@ -8962,7 +8963,7 @@
           <a:p>
             <a:fld id="{C2604532-88A1-4D13-BC35-48D36F31BDAF}" type="datetime1">
               <a:rPr lang="en-US" smtClean="0"/>
-              <a:t>4/26/2020</a:t>
+              <a:t>5/2/2020</a:t>
             </a:fld>
             <a:endParaRPr lang="en-US" dirty="0"/>
           </a:p>
@@ -9222,7 +9223,7 @@
           <a:p>
             <a:fld id="{7CFB95AE-0611-4CB9-950C-21E52732E314}" type="datetime1">
               <a:rPr lang="en-US" smtClean="0"/>
-              <a:t>4/26/2020</a:t>
+              <a:t>5/2/2020</a:t>
             </a:fld>
             <a:endParaRPr lang="en-US" dirty="0"/>
           </a:p>
@@ -9489,7 +9490,7 @@
           <a:p>
             <a:fld id="{8C0445F1-8A59-4556-8342-905D3B4A43DE}" type="datetime1">
               <a:rPr lang="en-US" smtClean="0"/>
-              <a:t>4/26/2020</a:t>
+              <a:t>5/2/2020</a:t>
             </a:fld>
             <a:endParaRPr lang="en-US" dirty="0"/>
           </a:p>
@@ -10239,7 +10240,7 @@
           <a:p>
             <a:fld id="{6F5F1DBB-1B81-423C-8F15-0946EFA2AAD8}" type="datetime1">
               <a:rPr lang="en-US" smtClean="0"/>
-              <a:t>4/26/2020</a:t>
+              <a:t>5/2/2020</a:t>
             </a:fld>
             <a:endParaRPr lang="en-US" dirty="0"/>
           </a:p>
@@ -11618,8 +11619,8 @@
           </a:p>
         </p:txBody>
       </p:sp>
-      <mc:AlternateContent xmlns:mc="http://schemas.openxmlformats.org/markup-compatibility/2006" xmlns:a14="http://schemas.microsoft.com/office/drawing/2010/main">
-        <mc:Choice Requires="a14">
+      <mc:AlternateContent xmlns:mc="http://schemas.openxmlformats.org/markup-compatibility/2006">
+        <mc:Choice xmlns:a14="http://schemas.microsoft.com/office/drawing/2010/main" Requires="a14">
           <p:sp>
             <p:nvSpPr>
               <p:cNvPr id="3" name="מציין מיקום תוכן 2">
@@ -11753,7 +11754,7 @@
                           <m:ctrlPr>
                             <a:rPr lang="en-US" i="1" smtClean="0">
                               <a:solidFill>
-                                <a:schemeClr val="bg1"/>
+                                <a:schemeClr val="accent3"/>
                               </a:solidFill>
                               <a:latin typeface="Cambria Math" panose="02040503050406030204" pitchFamily="18" charset="0"/>
                             </a:rPr>
@@ -11763,7 +11764,7 @@
                           <m:r>
                             <a:rPr lang="en-US" i="1">
                               <a:solidFill>
-                                <a:schemeClr val="bg1"/>
+                                <a:schemeClr val="accent3"/>
                               </a:solidFill>
                               <a:latin typeface="Cambria Math" panose="02040503050406030204" pitchFamily="18" charset="0"/>
                             </a:rPr>
@@ -11774,7 +11775,7 @@
                       <m:r>
                         <a:rPr lang="en-US">
                           <a:solidFill>
-                            <a:schemeClr val="bg1"/>
+                            <a:schemeClr val="accent3"/>
                           </a:solidFill>
                           <a:latin typeface="Cambria Math" panose="02040503050406030204" pitchFamily="18" charset="0"/>
                         </a:rPr>
@@ -11785,7 +11786,7 @@
                           <m:ctrlPr>
                             <a:rPr lang="en-US" i="1">
                               <a:solidFill>
-                                <a:schemeClr val="bg1"/>
+                                <a:schemeClr val="accent3"/>
                               </a:solidFill>
                               <a:latin typeface="Cambria Math" panose="02040503050406030204" pitchFamily="18" charset="0"/>
                             </a:rPr>
@@ -11797,7 +11798,7 @@
                               <m:ctrlPr>
                                 <a:rPr lang="en-US" i="1">
                                   <a:solidFill>
-                                    <a:schemeClr val="bg1"/>
+                                    <a:schemeClr val="accent3"/>
                                   </a:solidFill>
                                   <a:latin typeface="Cambria Math" panose="02040503050406030204" pitchFamily="18" charset="0"/>
                                 </a:rPr>
@@ -11810,7 +11811,7 @@
                                 </m:rPr>
                                 <a:rPr lang="en-US" b="0" i="0" smtClean="0">
                                   <a:solidFill>
-                                    <a:schemeClr val="bg1"/>
+                                    <a:schemeClr val="accent3"/>
                                   </a:solidFill>
                                   <a:latin typeface="Cambria Math" panose="02040503050406030204" pitchFamily="18" charset="0"/>
                                 </a:rPr>
@@ -11822,7 +11823,7 @@
                                 </m:rPr>
                                 <a:rPr lang="en-US">
                                   <a:solidFill>
-                                    <a:schemeClr val="bg1"/>
+                                    <a:schemeClr val="accent3"/>
                                   </a:solidFill>
                                   <a:latin typeface="Cambria Math" panose="02040503050406030204" pitchFamily="18" charset="0"/>
                                 </a:rPr>
@@ -11833,7 +11834,7 @@
                               <m:r>
                                 <a:rPr lang="en-US" i="1">
                                   <a:solidFill>
-                                    <a:schemeClr val="bg1"/>
+                                    <a:schemeClr val="accent3"/>
                                   </a:solidFill>
                                   <a:latin typeface="Cambria Math" panose="02040503050406030204" pitchFamily="18" charset="0"/>
                                 </a:rPr>
@@ -11848,7 +11849,7 @@
                               <m:ctrlPr>
                                 <a:rPr lang="en-US" i="1">
                                   <a:solidFill>
-                                    <a:schemeClr val="bg1"/>
+                                    <a:schemeClr val="accent3"/>
                                   </a:solidFill>
                                   <a:latin typeface="Cambria Math" panose="02040503050406030204" pitchFamily="18" charset="0"/>
                                 </a:rPr>
@@ -11862,7 +11863,7 @@
                                   <m:ctrlPr>
                                     <a:rPr lang="en-US" i="1">
                                       <a:solidFill>
-                                        <a:schemeClr val="bg1"/>
+                                        <a:schemeClr val="accent3"/>
                                       </a:solidFill>
                                       <a:latin typeface="Cambria Math" panose="02040503050406030204" pitchFamily="18" charset="0"/>
                                     </a:rPr>
@@ -11872,7 +11873,7 @@
                                   <m:r>
                                     <a:rPr lang="en-US" i="1">
                                       <a:solidFill>
-                                        <a:schemeClr val="bg1"/>
+                                        <a:schemeClr val="accent3"/>
                                       </a:solidFill>
                                       <a:latin typeface="Cambria Math" panose="02040503050406030204" pitchFamily="18" charset="0"/>
                                     </a:rPr>
@@ -11885,7 +11886,7 @@
                               <m:r>
                                 <a:rPr lang="en-US" i="1">
                                   <a:solidFill>
-                                    <a:schemeClr val="bg1"/>
+                                    <a:schemeClr val="accent3"/>
                                   </a:solidFill>
                                   <a:latin typeface="Cambria Math" panose="02040503050406030204" pitchFamily="18" charset="0"/>
                                 </a:rPr>
@@ -11898,7 +11899,7 @@
                       <m:r>
                         <a:rPr lang="en-US">
                           <a:solidFill>
-                            <a:schemeClr val="bg1"/>
+                            <a:schemeClr val="accent3"/>
                           </a:solidFill>
                           <a:latin typeface="Cambria Math" panose="02040503050406030204" pitchFamily="18" charset="0"/>
                         </a:rPr>
@@ -11907,7 +11908,7 @@
                       <m:r>
                         <a:rPr lang="en-US" i="1">
                           <a:solidFill>
-                            <a:schemeClr val="bg1"/>
+                            <a:schemeClr val="accent3"/>
                           </a:solidFill>
                           <a:latin typeface="Cambria Math" panose="02040503050406030204" pitchFamily="18" charset="0"/>
                         </a:rPr>
@@ -11916,7 +11917,7 @@
                       <m:r>
                         <a:rPr lang="en-US" i="1">
                           <a:solidFill>
-                            <a:schemeClr val="bg1"/>
+                            <a:schemeClr val="accent3"/>
                           </a:solidFill>
                           <a:latin typeface="Cambria Math" panose="02040503050406030204" pitchFamily="18" charset="0"/>
                         </a:rPr>
@@ -11925,7 +11926,7 @@
                       <m:r>
                         <a:rPr lang="en-US" i="1">
                           <a:solidFill>
-                            <a:schemeClr val="bg1"/>
+                            <a:schemeClr val="accent3"/>
                           </a:solidFill>
                           <a:latin typeface="Cambria Math" panose="02040503050406030204" pitchFamily="18" charset="0"/>
                         </a:rPr>
@@ -11934,7 +11935,7 @@
                       <m:r>
                         <a:rPr lang="en-US" i="1">
                           <a:solidFill>
-                            <a:schemeClr val="bg1"/>
+                            <a:schemeClr val="accent3"/>
                           </a:solidFill>
                           <a:latin typeface="Cambria Math" panose="02040503050406030204" pitchFamily="18" charset="0"/>
                         </a:rPr>
@@ -11943,7 +11944,7 @@
                       <m:r>
                         <a:rPr lang="en-US" i="1">
                           <a:solidFill>
-                            <a:schemeClr val="bg1"/>
+                            <a:schemeClr val="accent3"/>
                           </a:solidFill>
                           <a:latin typeface="Cambria Math" panose="02040503050406030204" pitchFamily="18" charset="0"/>
                         </a:rPr>
@@ -11954,7 +11955,7 @@
                           <m:ctrlPr>
                             <a:rPr lang="en-US" i="1">
                               <a:solidFill>
-                                <a:schemeClr val="bg1"/>
+                                <a:schemeClr val="accent3"/>
                               </a:solidFill>
                               <a:latin typeface="Cambria Math" panose="02040503050406030204" pitchFamily="18" charset="0"/>
                             </a:rPr>
@@ -11968,7 +11969,7 @@
                               <m:ctrlPr>
                                 <a:rPr lang="en-US" i="1">
                                   <a:solidFill>
-                                    <a:schemeClr val="bg1"/>
+                                    <a:schemeClr val="accent3"/>
                                   </a:solidFill>
                                   <a:latin typeface="Cambria Math" panose="02040503050406030204" pitchFamily="18" charset="0"/>
                                 </a:rPr>
@@ -11978,7 +11979,7 @@
                               <m:r>
                                 <a:rPr lang="en-US" i="1">
                                   <a:solidFill>
-                                    <a:schemeClr val="bg1"/>
+                                    <a:schemeClr val="accent3"/>
                                   </a:solidFill>
                                   <a:latin typeface="Cambria Math" panose="02040503050406030204" pitchFamily="18" charset="0"/>
                                 </a:rPr>
@@ -11987,7 +11988,7 @@
                               <m:r>
                                 <a:rPr lang="en-US" i="1">
                                   <a:solidFill>
-                                    <a:schemeClr val="bg1"/>
+                                    <a:schemeClr val="accent3"/>
                                   </a:solidFill>
                                   <a:latin typeface="Cambria Math" panose="02040503050406030204" pitchFamily="18" charset="0"/>
                                 </a:rPr>
@@ -11996,7 +11997,7 @@
                               <m:r>
                                 <a:rPr lang="en-US" i="1">
                                   <a:solidFill>
-                                    <a:schemeClr val="bg1"/>
+                                    <a:schemeClr val="accent3"/>
                                   </a:solidFill>
                                   <a:latin typeface="Cambria Math" panose="02040503050406030204" pitchFamily="18" charset="0"/>
                                 </a:rPr>
@@ -12005,7 +12006,7 @@
                               <m:r>
                                 <a:rPr lang="en-US" i="1">
                                   <a:solidFill>
-                                    <a:schemeClr val="bg1"/>
+                                    <a:schemeClr val="accent3"/>
                                   </a:solidFill>
                                   <a:latin typeface="Cambria Math" panose="02040503050406030204" pitchFamily="18" charset="0"/>
                                 </a:rPr>
@@ -12018,7 +12019,7 @@
                           <m:r>
                             <a:rPr lang="en-US" i="1">
                               <a:solidFill>
-                                <a:schemeClr val="bg1"/>
+                                <a:schemeClr val="accent3"/>
                               </a:solidFill>
                               <a:latin typeface="Cambria Math" panose="02040503050406030204" pitchFamily="18" charset="0"/>
                             </a:rPr>
@@ -12029,7 +12030,7 @@
                           <m:r>
                             <a:rPr lang="en-US" i="1">
                               <a:solidFill>
-                                <a:schemeClr val="bg1"/>
+                                <a:schemeClr val="accent3"/>
                               </a:solidFill>
                               <a:latin typeface="Cambria Math" panose="02040503050406030204" pitchFamily="18" charset="0"/>
                             </a:rPr>
@@ -12040,7 +12041,7 @@
                       <m:r>
                         <a:rPr lang="en-US" i="1">
                           <a:solidFill>
-                            <a:schemeClr val="bg1"/>
+                            <a:schemeClr val="accent3"/>
                           </a:solidFill>
                           <a:latin typeface="Cambria Math" panose="02040503050406030204" pitchFamily="18" charset="0"/>
                         </a:rPr>
@@ -12051,7 +12052,7 @@
                           <m:ctrlPr>
                             <a:rPr lang="en-US" i="1">
                               <a:solidFill>
-                                <a:schemeClr val="bg1"/>
+                                <a:schemeClr val="accent3"/>
                               </a:solidFill>
                               <a:latin typeface="Cambria Math" panose="02040503050406030204" pitchFamily="18" charset="0"/>
                             </a:rPr>
@@ -12061,7 +12062,7 @@
                           <m:r>
                             <a:rPr lang="en-US" i="1">
                               <a:solidFill>
-                                <a:schemeClr val="bg1"/>
+                                <a:schemeClr val="accent3"/>
                               </a:solidFill>
                               <a:latin typeface="Cambria Math" panose="02040503050406030204" pitchFamily="18" charset="0"/>
                             </a:rPr>
@@ -12072,7 +12073,7 @@
                           <m:r>
                             <a:rPr lang="en-US" i="1">
                               <a:solidFill>
-                                <a:schemeClr val="bg1"/>
+                                <a:schemeClr val="accent3"/>
                               </a:solidFill>
                               <a:latin typeface="Cambria Math" panose="02040503050406030204" pitchFamily="18" charset="0"/>
                             </a:rPr>
@@ -12083,7 +12084,7 @@
                       <m:r>
                         <a:rPr lang="en-US" i="1">
                           <a:solidFill>
-                            <a:schemeClr val="bg1"/>
+                            <a:schemeClr val="accent3"/>
                           </a:solidFill>
                           <a:latin typeface="Cambria Math" panose="02040503050406030204" pitchFamily="18" charset="0"/>
                         </a:rPr>
@@ -12092,7 +12093,7 @@
                       <m:r>
                         <a:rPr lang="en-US" i="1">
                           <a:solidFill>
-                            <a:schemeClr val="bg1"/>
+                            <a:schemeClr val="accent3"/>
                           </a:solidFill>
                           <a:latin typeface="Cambria Math" panose="02040503050406030204" pitchFamily="18" charset="0"/>
                         </a:rPr>
@@ -12101,7 +12102,7 @@
                       <m:r>
                         <a:rPr lang="en-US" i="1">
                           <a:solidFill>
-                            <a:schemeClr val="bg1"/>
+                            <a:schemeClr val="accent3"/>
                           </a:solidFill>
                           <a:latin typeface="Cambria Math" panose="02040503050406030204" pitchFamily="18" charset="0"/>
                         </a:rPr>
@@ -12112,7 +12113,7 @@
                 </a14:m>
                 <a:endParaRPr lang="en-US" dirty="0">
                   <a:solidFill>
-                    <a:schemeClr val="bg1"/>
+                    <a:schemeClr val="accent3"/>
                   </a:solidFill>
                 </a:endParaRPr>
               </a:p>
@@ -12135,7 +12136,7 @@
             </p:txBody>
           </p:sp>
         </mc:Choice>
-        <mc:Fallback xmlns="">
+        <mc:Fallback>
           <p:sp>
             <p:nvSpPr>
               <p:cNvPr id="3" name="מציין מיקום תוכן 2">
@@ -12321,7 +12322,7 @@
             </a:pPr>
             <a:r>
               <a:rPr lang="en-US" dirty="0"/>
-              <a:t>Universal dictionaries not always gives the optimal restoration result for specific task.</a:t>
+              <a:t>Universal dictionaries not always give the optimal restoration result for specific task.</a:t>
             </a:r>
           </a:p>
           <a:p>
@@ -12453,8 +12454,8 @@
           </a:p>
         </p:txBody>
       </p:sp>
-      <mc:AlternateContent xmlns:mc="http://schemas.openxmlformats.org/markup-compatibility/2006" xmlns:a14="http://schemas.microsoft.com/office/drawing/2010/main">
-        <mc:Choice Requires="a14">
+      <mc:AlternateContent xmlns:mc="http://schemas.openxmlformats.org/markup-compatibility/2006">
+        <mc:Choice xmlns:a14="http://schemas.microsoft.com/office/drawing/2010/main" Requires="a14">
           <p:sp>
             <p:nvSpPr>
               <p:cNvPr id="3" name="מציין מיקום תוכן 2">
@@ -12495,9 +12496,9 @@
                         <m:begChr m:val="["/>
                         <m:endChr m:val="]"/>
                         <m:ctrlPr>
-                          <a:rPr lang="en-US" i="1">
+                          <a:rPr lang="en-US" i="1" smtClean="0">
                             <a:solidFill>
-                              <a:schemeClr val="bg1"/>
+                              <a:schemeClr val="accent3"/>
                             </a:solidFill>
                             <a:latin typeface="Cambria Math" panose="02040503050406030204" pitchFamily="18" charset="0"/>
                           </a:rPr>
@@ -12510,7 +12511,7 @@
                             <m:ctrlPr>
                               <a:rPr lang="en-US" i="1">
                                 <a:solidFill>
-                                  <a:schemeClr val="bg1"/>
+                                  <a:schemeClr val="accent3"/>
                                 </a:solidFill>
                                 <a:latin typeface="Cambria Math" panose="02040503050406030204" pitchFamily="18" charset="0"/>
                               </a:rPr>
@@ -12520,7 +12521,7 @@
                             <m:r>
                               <a:rPr lang="en-US" i="1">
                                 <a:solidFill>
-                                  <a:schemeClr val="bg1"/>
+                                  <a:schemeClr val="accent3"/>
                                 </a:solidFill>
                                 <a:latin typeface="Cambria Math" panose="02040503050406030204" pitchFamily="18" charset="0"/>
                               </a:rPr>
@@ -12531,7 +12532,7 @@
                         <m:r>
                           <a:rPr lang="en-US" i="1">
                             <a:solidFill>
-                              <a:schemeClr val="bg1"/>
+                              <a:schemeClr val="accent3"/>
                             </a:solidFill>
                             <a:latin typeface="Cambria Math" panose="02040503050406030204" pitchFamily="18" charset="0"/>
                           </a:rPr>
@@ -12542,7 +12543,7 @@
                             <m:ctrlPr>
                               <a:rPr lang="en-US" i="1">
                                 <a:solidFill>
-                                  <a:schemeClr val="bg1"/>
+                                  <a:schemeClr val="accent3"/>
                                 </a:solidFill>
                                 <a:latin typeface="Cambria Math" panose="02040503050406030204" pitchFamily="18" charset="0"/>
                               </a:rPr>
@@ -12556,7 +12557,7 @@
                                 <m:ctrlPr>
                                   <a:rPr lang="en-US" i="1">
                                     <a:solidFill>
-                                      <a:schemeClr val="bg1"/>
+                                      <a:schemeClr val="accent3"/>
                                     </a:solidFill>
                                     <a:latin typeface="Cambria Math" panose="02040503050406030204" pitchFamily="18" charset="0"/>
                                   </a:rPr>
@@ -12568,7 +12569,7 @@
                                     <m:ctrlPr>
                                       <a:rPr lang="en-US" i="1">
                                         <a:solidFill>
-                                          <a:schemeClr val="bg1"/>
+                                          <a:schemeClr val="accent3"/>
                                         </a:solidFill>
                                         <a:latin typeface="Cambria Math" panose="02040503050406030204" pitchFamily="18" charset="0"/>
                                       </a:rPr>
@@ -12581,7 +12582,7 @@
                                         <m:ctrlPr>
                                           <a:rPr lang="en-US" i="1">
                                             <a:solidFill>
-                                              <a:schemeClr val="bg1"/>
+                                              <a:schemeClr val="accent3"/>
                                             </a:solidFill>
                                             <a:latin typeface="Cambria Math" panose="02040503050406030204" pitchFamily="18" charset="0"/>
                                           </a:rPr>
@@ -12591,7 +12592,7 @@
                                         <m:r>
                                           <a:rPr lang="en-US" i="1">
                                             <a:solidFill>
-                                              <a:schemeClr val="bg1"/>
+                                              <a:schemeClr val="accent3"/>
                                             </a:solidFill>
                                             <a:latin typeface="Cambria Math" panose="02040503050406030204" pitchFamily="18" charset="0"/>
                                           </a:rPr>
@@ -12604,7 +12605,7 @@
                                     <m:r>
                                       <a:rPr lang="en-US" i="1">
                                         <a:solidFill>
-                                          <a:schemeClr val="bg1"/>
+                                          <a:schemeClr val="accent3"/>
                                         </a:solidFill>
                                         <a:latin typeface="Cambria Math" panose="02040503050406030204" pitchFamily="18" charset="0"/>
                                       </a:rPr>
@@ -12619,7 +12620,7 @@
                             <m:r>
                               <a:rPr lang="en-US" i="1">
                                 <a:solidFill>
-                                  <a:schemeClr val="bg1"/>
+                                  <a:schemeClr val="accent3"/>
                                 </a:solidFill>
                                 <a:latin typeface="Cambria Math" panose="02040503050406030204" pitchFamily="18" charset="0"/>
                               </a:rPr>
@@ -12628,7 +12629,7 @@
                             <m:r>
                               <a:rPr lang="en-US" i="1">
                                 <a:solidFill>
-                                  <a:schemeClr val="bg1"/>
+                                  <a:schemeClr val="accent3"/>
                                 </a:solidFill>
                                 <a:latin typeface="Cambria Math" panose="02040503050406030204" pitchFamily="18" charset="0"/>
                               </a:rPr>
@@ -12637,7 +12638,7 @@
                             <m:r>
                               <a:rPr lang="en-US" i="1">
                                 <a:solidFill>
-                                  <a:schemeClr val="bg1"/>
+                                  <a:schemeClr val="accent3"/>
                                 </a:solidFill>
                                 <a:latin typeface="Cambria Math" panose="02040503050406030204" pitchFamily="18" charset="0"/>
                               </a:rPr>
@@ -12648,7 +12649,7 @@
                             <m:r>
                               <a:rPr lang="en-US" i="1">
                                 <a:solidFill>
-                                  <a:schemeClr val="bg1"/>
+                                  <a:schemeClr val="accent3"/>
                                 </a:solidFill>
                                 <a:latin typeface="Cambria Math" panose="02040503050406030204" pitchFamily="18" charset="0"/>
                               </a:rPr>
@@ -12661,7 +12662,7 @@
                     <m:r>
                       <a:rPr lang="en-US" i="1">
                         <a:solidFill>
-                          <a:schemeClr val="bg1"/>
+                          <a:schemeClr val="accent3"/>
                         </a:solidFill>
                         <a:latin typeface="Cambria Math" panose="02040503050406030204" pitchFamily="18" charset="0"/>
                       </a:rPr>
@@ -12672,7 +12673,7 @@
                         <m:ctrlPr>
                           <a:rPr lang="en-US" i="1">
                             <a:solidFill>
-                              <a:schemeClr val="bg1"/>
+                              <a:schemeClr val="accent3"/>
                             </a:solidFill>
                             <a:latin typeface="Cambria Math" panose="02040503050406030204" pitchFamily="18" charset="0"/>
                           </a:rPr>
@@ -12684,7 +12685,7 @@
                             <m:ctrlPr>
                               <a:rPr lang="en-US" i="1">
                                 <a:solidFill>
-                                  <a:schemeClr val="bg1"/>
+                                  <a:schemeClr val="accent3"/>
                                 </a:solidFill>
                                 <a:latin typeface="Cambria Math" panose="02040503050406030204" pitchFamily="18" charset="0"/>
                               </a:rPr>
@@ -12697,7 +12698,7 @@
                               </m:rPr>
                               <a:rPr lang="en-US" b="0" i="0" smtClean="0">
                                 <a:solidFill>
-                                  <a:schemeClr val="bg1"/>
+                                  <a:schemeClr val="accent3"/>
                                 </a:solidFill>
                                 <a:latin typeface="Cambria Math" panose="02040503050406030204" pitchFamily="18" charset="0"/>
                               </a:rPr>
@@ -12709,7 +12710,7 @@
                               </m:rPr>
                               <a:rPr lang="en-US">
                                 <a:solidFill>
-                                  <a:schemeClr val="bg1"/>
+                                  <a:schemeClr val="accent3"/>
                                 </a:solidFill>
                                 <a:latin typeface="Cambria Math" panose="02040503050406030204" pitchFamily="18" charset="0"/>
                               </a:rPr>
@@ -12723,7 +12724,7 @@
                                 <m:ctrlPr>
                                   <a:rPr lang="en-US" i="1">
                                     <a:solidFill>
-                                      <a:schemeClr val="bg1"/>
+                                      <a:schemeClr val="accent3"/>
                                     </a:solidFill>
                                     <a:latin typeface="Cambria Math" panose="02040503050406030204" pitchFamily="18" charset="0"/>
                                   </a:rPr>
@@ -12733,7 +12734,7 @@
                                 <m:r>
                                   <a:rPr lang="en-US" i="1">
                                     <a:solidFill>
-                                      <a:schemeClr val="bg1"/>
+                                      <a:schemeClr val="accent3"/>
                                     </a:solidFill>
                                     <a:latin typeface="Cambria Math" panose="02040503050406030204" pitchFamily="18" charset="0"/>
                                   </a:rPr>
@@ -12744,7 +12745,7 @@
                             <m:r>
                               <a:rPr lang="en-US" i="1">
                                 <a:solidFill>
-                                  <a:schemeClr val="bg1"/>
+                                  <a:schemeClr val="accent3"/>
                                 </a:solidFill>
                                 <a:latin typeface="Cambria Math" panose="02040503050406030204" pitchFamily="18" charset="0"/>
                               </a:rPr>
@@ -12755,7 +12756,7 @@
                                 <m:ctrlPr>
                                   <a:rPr lang="en-US" i="1">
                                     <a:solidFill>
-                                      <a:schemeClr val="bg1"/>
+                                      <a:schemeClr val="accent3"/>
                                     </a:solidFill>
                                     <a:latin typeface="Cambria Math" panose="02040503050406030204" pitchFamily="18" charset="0"/>
                                   </a:rPr>
@@ -12769,7 +12770,7 @@
                                     <m:ctrlPr>
                                       <a:rPr lang="en-US" i="1">
                                         <a:solidFill>
-                                          <a:schemeClr val="bg1"/>
+                                          <a:schemeClr val="accent3"/>
                                         </a:solidFill>
                                         <a:latin typeface="Cambria Math" panose="02040503050406030204" pitchFamily="18" charset="0"/>
                                       </a:rPr>
@@ -12781,7 +12782,7 @@
                                         <m:ctrlPr>
                                           <a:rPr lang="en-US" i="1">
                                             <a:solidFill>
-                                              <a:schemeClr val="bg1"/>
+                                              <a:schemeClr val="accent3"/>
                                             </a:solidFill>
                                             <a:latin typeface="Cambria Math" panose="02040503050406030204" pitchFamily="18" charset="0"/>
                                           </a:rPr>
@@ -12794,7 +12795,7 @@
                                             <m:ctrlPr>
                                               <a:rPr lang="en-US" i="1">
                                                 <a:solidFill>
-                                                  <a:schemeClr val="bg1"/>
+                                                  <a:schemeClr val="accent3"/>
                                                 </a:solidFill>
                                                 <a:latin typeface="Cambria Math" panose="02040503050406030204" pitchFamily="18" charset="0"/>
                                               </a:rPr>
@@ -12804,7 +12805,7 @@
                                             <m:r>
                                               <a:rPr lang="en-US" i="1">
                                                 <a:solidFill>
-                                                  <a:schemeClr val="bg1"/>
+                                                  <a:schemeClr val="accent3"/>
                                                 </a:solidFill>
                                                 <a:latin typeface="Cambria Math" panose="02040503050406030204" pitchFamily="18" charset="0"/>
                                               </a:rPr>
@@ -12817,7 +12818,7 @@
                                         <m:r>
                                           <a:rPr lang="en-US" i="1">
                                             <a:solidFill>
-                                              <a:schemeClr val="bg1"/>
+                                              <a:schemeClr val="accent3"/>
                                             </a:solidFill>
                                             <a:latin typeface="Cambria Math" panose="02040503050406030204" pitchFamily="18" charset="0"/>
                                           </a:rPr>
@@ -12832,7 +12833,7 @@
                                 <m:r>
                                   <a:rPr lang="en-US" i="1">
                                     <a:solidFill>
-                                      <a:schemeClr val="bg1"/>
+                                      <a:schemeClr val="accent3"/>
                                     </a:solidFill>
                                     <a:latin typeface="Cambria Math" panose="02040503050406030204" pitchFamily="18" charset="0"/>
                                   </a:rPr>
@@ -12841,7 +12842,7 @@
                                 <m:r>
                                   <a:rPr lang="en-US" i="1">
                                     <a:solidFill>
-                                      <a:schemeClr val="bg1"/>
+                                      <a:schemeClr val="accent3"/>
                                     </a:solidFill>
                                     <a:latin typeface="Cambria Math" panose="02040503050406030204" pitchFamily="18" charset="0"/>
                                   </a:rPr>
@@ -12850,7 +12851,7 @@
                                 <m:r>
                                   <a:rPr lang="en-US" i="1">
                                     <a:solidFill>
-                                      <a:schemeClr val="bg1"/>
+                                      <a:schemeClr val="accent3"/>
                                     </a:solidFill>
                                     <a:latin typeface="Cambria Math" panose="02040503050406030204" pitchFamily="18" charset="0"/>
                                   </a:rPr>
@@ -12861,7 +12862,7 @@
                                 <m:r>
                                   <a:rPr lang="en-US" i="1">
                                     <a:solidFill>
-                                      <a:schemeClr val="bg1"/>
+                                      <a:schemeClr val="accent3"/>
                                     </a:solidFill>
                                     <a:latin typeface="Cambria Math" panose="02040503050406030204" pitchFamily="18" charset="0"/>
                                   </a:rPr>
@@ -12880,7 +12881,7 @@
                             <m:ctrlPr>
                               <a:rPr lang="en-US" i="1">
                                 <a:solidFill>
-                                  <a:schemeClr val="bg1"/>
+                                  <a:schemeClr val="accent3"/>
                                 </a:solidFill>
                                 <a:latin typeface="Cambria Math" panose="02040503050406030204" pitchFamily="18" charset="0"/>
                               </a:rPr>
@@ -12894,7 +12895,7 @@
                                 <m:ctrlPr>
                                   <a:rPr lang="en-US" i="1">
                                     <a:solidFill>
-                                      <a:schemeClr val="bg1"/>
+                                      <a:schemeClr val="accent3"/>
                                     </a:solidFill>
                                     <a:latin typeface="Cambria Math" panose="02040503050406030204" pitchFamily="18" charset="0"/>
                                   </a:rPr>
@@ -12904,7 +12905,7 @@
                                 <m:r>
                                   <a:rPr lang="en-US" i="1">
                                     <a:solidFill>
-                                      <a:schemeClr val="bg1"/>
+                                      <a:schemeClr val="accent3"/>
                                     </a:solidFill>
                                     <a:latin typeface="Cambria Math" panose="02040503050406030204" pitchFamily="18" charset="0"/>
                                   </a:rPr>
@@ -12913,7 +12914,7 @@
                                 <m:r>
                                   <a:rPr lang="en-US" i="1">
                                     <a:solidFill>
-                                      <a:schemeClr val="bg1"/>
+                                      <a:schemeClr val="accent3"/>
                                     </a:solidFill>
                                     <a:latin typeface="Cambria Math" panose="02040503050406030204" pitchFamily="18" charset="0"/>
                                   </a:rPr>
@@ -12922,7 +12923,7 @@
                                 <m:r>
                                   <a:rPr lang="en-US" i="1">
                                     <a:solidFill>
-                                      <a:schemeClr val="bg1"/>
+                                      <a:schemeClr val="accent3"/>
                                     </a:solidFill>
                                     <a:latin typeface="Cambria Math" panose="02040503050406030204" pitchFamily="18" charset="0"/>
                                   </a:rPr>
@@ -12933,7 +12934,7 @@
                                 <m:r>
                                   <a:rPr lang="en-US" i="1">
                                     <a:solidFill>
-                                      <a:schemeClr val="bg1"/>
+                                      <a:schemeClr val="accent3"/>
                                     </a:solidFill>
                                     <a:latin typeface="Cambria Math" panose="02040503050406030204" pitchFamily="18" charset="0"/>
                                   </a:rPr>
@@ -12944,7 +12945,7 @@
                                 <m:r>
                                   <a:rPr lang="en-US" i="1">
                                     <a:solidFill>
-                                      <a:schemeClr val="bg1"/>
+                                      <a:schemeClr val="accent3"/>
                                     </a:solidFill>
                                     <a:latin typeface="Cambria Math" panose="02040503050406030204" pitchFamily="18" charset="0"/>
                                   </a:rPr>
@@ -12955,7 +12956,7 @@
                                     <m:ctrlPr>
                                       <a:rPr lang="en-US" i="1">
                                         <a:solidFill>
-                                          <a:schemeClr val="bg1"/>
+                                          <a:schemeClr val="accent3"/>
                                         </a:solidFill>
                                         <a:latin typeface="Cambria Math" panose="02040503050406030204" pitchFamily="18" charset="0"/>
                                       </a:rPr>
@@ -12969,7 +12970,7 @@
                                         <m:ctrlPr>
                                           <a:rPr lang="en-US" i="1">
                                             <a:solidFill>
-                                              <a:schemeClr val="bg1"/>
+                                              <a:schemeClr val="accent3"/>
                                             </a:solidFill>
                                             <a:latin typeface="Cambria Math" panose="02040503050406030204" pitchFamily="18" charset="0"/>
                                           </a:rPr>
@@ -12979,7 +12980,7 @@
                                         <m:r>
                                           <a:rPr lang="en-US" i="1">
                                             <a:solidFill>
-                                              <a:schemeClr val="bg1"/>
+                                              <a:schemeClr val="accent3"/>
                                             </a:solidFill>
                                             <a:latin typeface="Cambria Math" panose="02040503050406030204" pitchFamily="18" charset="0"/>
                                           </a:rPr>
@@ -12990,7 +12991,7 @@
                                             <m:ctrlPr>
                                               <a:rPr lang="en-US" i="1">
                                                 <a:solidFill>
-                                                  <a:schemeClr val="bg1"/>
+                                                  <a:schemeClr val="accent3"/>
                                                 </a:solidFill>
                                                 <a:latin typeface="Cambria Math" panose="02040503050406030204" pitchFamily="18" charset="0"/>
                                               </a:rPr>
@@ -13000,7 +13001,7 @@
                                             <m:r>
                                               <a:rPr lang="en-US" i="1">
                                                 <a:solidFill>
-                                                  <a:schemeClr val="bg1"/>
+                                                  <a:schemeClr val="accent3"/>
                                                 </a:solidFill>
                                                 <a:latin typeface="Cambria Math" panose="02040503050406030204" pitchFamily="18" charset="0"/>
                                               </a:rPr>
@@ -13011,7 +13012,7 @@
                                             <m:r>
                                               <a:rPr lang="en-US" i="1">
                                                 <a:solidFill>
-                                                  <a:schemeClr val="bg1"/>
+                                                  <a:schemeClr val="accent3"/>
                                                 </a:solidFill>
                                                 <a:latin typeface="Cambria Math" panose="02040503050406030204" pitchFamily="18" charset="0"/>
                                               </a:rPr>
@@ -13022,7 +13023,7 @@
                                         <m:r>
                                           <a:rPr lang="en-US" i="1">
                                             <a:solidFill>
-                                              <a:schemeClr val="bg1"/>
+                                              <a:schemeClr val="accent3"/>
                                             </a:solidFill>
                                             <a:latin typeface="Cambria Math" panose="02040503050406030204" pitchFamily="18" charset="0"/>
                                           </a:rPr>
@@ -13033,7 +13034,7 @@
                                             <m:ctrlPr>
                                               <a:rPr lang="en-US" i="1">
                                                 <a:solidFill>
-                                                  <a:schemeClr val="bg1"/>
+                                                  <a:schemeClr val="accent3"/>
                                                 </a:solidFill>
                                                 <a:latin typeface="Cambria Math" panose="02040503050406030204" pitchFamily="18" charset="0"/>
                                               </a:rPr>
@@ -13043,7 +13044,7 @@
                                             <m:r>
                                               <a:rPr lang="en-US" i="1">
                                                 <a:solidFill>
-                                                  <a:schemeClr val="bg1"/>
+                                                  <a:schemeClr val="accent3"/>
                                                 </a:solidFill>
                                                 <a:latin typeface="Cambria Math" panose="02040503050406030204" pitchFamily="18" charset="0"/>
                                               </a:rPr>
@@ -13054,7 +13055,7 @@
                                             <m:r>
                                               <a:rPr lang="en-US" i="1">
                                                 <a:solidFill>
-                                                  <a:schemeClr val="bg1"/>
+                                                  <a:schemeClr val="accent3"/>
                                                 </a:solidFill>
                                                 <a:latin typeface="Cambria Math" panose="02040503050406030204" pitchFamily="18" charset="0"/>
                                               </a:rPr>
@@ -13069,7 +13070,7 @@
                                     <m:r>
                                       <a:rPr lang="en-US" i="1">
                                         <a:solidFill>
-                                          <a:schemeClr val="bg1"/>
+                                          <a:schemeClr val="accent3"/>
                                         </a:solidFill>
                                         <a:latin typeface="Cambria Math" panose="02040503050406030204" pitchFamily="18" charset="0"/>
                                       </a:rPr>
@@ -13080,7 +13081,7 @@
                                     <m:r>
                                       <a:rPr lang="en-US" i="1">
                                         <a:solidFill>
-                                          <a:schemeClr val="bg1"/>
+                                          <a:schemeClr val="accent3"/>
                                         </a:solidFill>
                                         <a:latin typeface="Cambria Math" panose="02040503050406030204" pitchFamily="18" charset="0"/>
                                       </a:rPr>
@@ -13097,7 +13098,7 @@
                     <m:r>
                       <a:rPr lang="en-US" i="1">
                         <a:solidFill>
-                          <a:schemeClr val="bg1"/>
+                          <a:schemeClr val="accent3"/>
                         </a:solidFill>
                         <a:latin typeface="Cambria Math" panose="02040503050406030204" pitchFamily="18" charset="0"/>
                       </a:rPr>
@@ -13106,7 +13107,7 @@
                     <m:r>
                       <a:rPr lang="en-US" i="1">
                         <a:solidFill>
-                          <a:schemeClr val="bg1"/>
+                          <a:schemeClr val="accent3"/>
                         </a:solidFill>
                         <a:latin typeface="Cambria Math" panose="02040503050406030204" pitchFamily="18" charset="0"/>
                       </a:rPr>
@@ -13115,7 +13116,7 @@
                     <m:r>
                       <a:rPr lang="en-US" i="1">
                         <a:solidFill>
-                          <a:schemeClr val="bg1"/>
+                          <a:schemeClr val="accent3"/>
                         </a:solidFill>
                         <a:latin typeface="Cambria Math" panose="02040503050406030204" pitchFamily="18" charset="0"/>
                       </a:rPr>
@@ -13124,7 +13125,7 @@
                     <m:r>
                       <a:rPr lang="en-US" i="1">
                         <a:solidFill>
-                          <a:schemeClr val="bg1"/>
+                          <a:schemeClr val="accent3"/>
                         </a:solidFill>
                         <a:latin typeface="Cambria Math" panose="02040503050406030204" pitchFamily="18" charset="0"/>
                       </a:rPr>
@@ -13133,7 +13134,7 @@
                     <m:r>
                       <a:rPr lang="en-US" i="1">
                         <a:solidFill>
-                          <a:schemeClr val="bg1"/>
+                          <a:schemeClr val="accent3"/>
                         </a:solidFill>
                         <a:latin typeface="Cambria Math" panose="02040503050406030204" pitchFamily="18" charset="0"/>
                       </a:rPr>
@@ -13142,7 +13143,7 @@
                     <m:r>
                       <a:rPr lang="en-US" i="1">
                         <a:solidFill>
-                          <a:schemeClr val="bg1"/>
+                          <a:schemeClr val="accent3"/>
                         </a:solidFill>
                         <a:latin typeface="Cambria Math" panose="02040503050406030204" pitchFamily="18" charset="0"/>
                       </a:rPr>
@@ -13155,7 +13156,7 @@
                         <m:ctrlPr>
                           <a:rPr lang="en-US" i="1">
                             <a:solidFill>
-                              <a:schemeClr val="bg1"/>
+                              <a:schemeClr val="accent3"/>
                             </a:solidFill>
                             <a:latin typeface="Cambria Math" panose="02040503050406030204" pitchFamily="18" charset="0"/>
                           </a:rPr>
@@ -13167,7 +13168,7 @@
                             <m:ctrlPr>
                               <a:rPr lang="en-US" i="1">
                                 <a:solidFill>
-                                  <a:schemeClr val="bg1"/>
+                                  <a:schemeClr val="accent3"/>
                                 </a:solidFill>
                                 <a:latin typeface="Cambria Math" panose="02040503050406030204" pitchFamily="18" charset="0"/>
                               </a:rPr>
@@ -13177,7 +13178,7 @@
                             <m:r>
                               <a:rPr lang="en-US" i="1">
                                 <a:solidFill>
-                                  <a:schemeClr val="bg1"/>
+                                  <a:schemeClr val="accent3"/>
                                 </a:solidFill>
                                 <a:latin typeface="Cambria Math" panose="02040503050406030204" pitchFamily="18" charset="0"/>
                               </a:rPr>
@@ -13188,7 +13189,7 @@
                             <m:r>
                               <a:rPr lang="en-US" i="1">
                                 <a:solidFill>
-                                  <a:schemeClr val="bg1"/>
+                                  <a:schemeClr val="accent3"/>
                                 </a:solidFill>
                                 <a:latin typeface="Cambria Math" panose="02040503050406030204" pitchFamily="18" charset="0"/>
                               </a:rPr>
@@ -13201,7 +13202,7 @@
                     <m:r>
                       <a:rPr lang="en-US" i="1">
                         <a:solidFill>
-                          <a:schemeClr val="bg1"/>
+                          <a:schemeClr val="accent3"/>
                         </a:solidFill>
                         <a:latin typeface="Cambria Math" panose="02040503050406030204" pitchFamily="18" charset="0"/>
                       </a:rPr>
@@ -13210,7 +13211,7 @@
                     <m:r>
                       <a:rPr lang="en-US" i="1">
                         <a:solidFill>
-                          <a:schemeClr val="bg1"/>
+                          <a:schemeClr val="accent3"/>
                         </a:solidFill>
                         <a:latin typeface="Cambria Math" panose="02040503050406030204" pitchFamily="18" charset="0"/>
                       </a:rPr>
@@ -13223,7 +13224,7 @@
                         <m:ctrlPr>
                           <a:rPr lang="en-US" i="1">
                             <a:solidFill>
-                              <a:schemeClr val="bg1"/>
+                              <a:schemeClr val="accent3"/>
                             </a:solidFill>
                             <a:latin typeface="Cambria Math" panose="02040503050406030204" pitchFamily="18" charset="0"/>
                           </a:rPr>
@@ -13235,7 +13236,7 @@
                             <m:ctrlPr>
                               <a:rPr lang="en-US" i="1">
                                 <a:solidFill>
-                                  <a:schemeClr val="bg1"/>
+                                  <a:schemeClr val="accent3"/>
                                 </a:solidFill>
                                 <a:latin typeface="Cambria Math" panose="02040503050406030204" pitchFamily="18" charset="0"/>
                               </a:rPr>
@@ -13248,7 +13249,7 @@
                                 <m:ctrlPr>
                                   <a:rPr lang="en-US" i="1">
                                     <a:solidFill>
-                                      <a:schemeClr val="bg1"/>
+                                      <a:schemeClr val="accent3"/>
                                     </a:solidFill>
                                     <a:latin typeface="Cambria Math" panose="02040503050406030204" pitchFamily="18" charset="0"/>
                                   </a:rPr>
@@ -13258,7 +13259,7 @@
                                 <m:r>
                                   <a:rPr lang="en-US" i="1">
                                     <a:solidFill>
-                                      <a:schemeClr val="bg1"/>
+                                      <a:schemeClr val="accent3"/>
                                     </a:solidFill>
                                     <a:latin typeface="Cambria Math" panose="02040503050406030204" pitchFamily="18" charset="0"/>
                                   </a:rPr>
@@ -13271,7 +13272,7 @@
                             <m:r>
                               <a:rPr lang="en-US" i="1">
                                 <a:solidFill>
-                                  <a:schemeClr val="bg1"/>
+                                  <a:schemeClr val="accent3"/>
                                 </a:solidFill>
                                 <a:latin typeface="Cambria Math" panose="02040503050406030204" pitchFamily="18" charset="0"/>
                               </a:rPr>
@@ -13284,7 +13285,7 @@
                     <m:r>
                       <a:rPr lang="en-US" i="1">
                         <a:solidFill>
-                          <a:schemeClr val="bg1"/>
+                          <a:schemeClr val="accent3"/>
                         </a:solidFill>
                         <a:latin typeface="Cambria Math" panose="02040503050406030204" pitchFamily="18" charset="0"/>
                       </a:rPr>
@@ -13293,7 +13294,7 @@
                     <m:r>
                       <a:rPr lang="en-US" i="1">
                         <a:solidFill>
-                          <a:schemeClr val="bg1"/>
+                          <a:schemeClr val="accent3"/>
                         </a:solidFill>
                         <a:latin typeface="Cambria Math" panose="02040503050406030204" pitchFamily="18" charset="0"/>
                       </a:rPr>
@@ -13302,7 +13303,7 @@
                     <m:r>
                       <a:rPr lang="en-US" i="1">
                         <a:solidFill>
-                          <a:schemeClr val="bg1"/>
+                          <a:schemeClr val="accent3"/>
                         </a:solidFill>
                         <a:latin typeface="Cambria Math" panose="02040503050406030204" pitchFamily="18" charset="0"/>
                       </a:rPr>
@@ -13313,7 +13314,7 @@
                 <a:r>
                   <a:rPr lang="en-US" dirty="0">
                     <a:solidFill>
-                      <a:schemeClr val="bg1"/>
+                      <a:schemeClr val="accent3"/>
                     </a:solidFill>
                   </a:rPr>
                   <a:t> </a:t>
@@ -13443,7 +13444,7 @@
             </p:txBody>
           </p:sp>
         </mc:Choice>
-        <mc:Fallback xmlns="">
+        <mc:Fallback>
           <p:sp>
             <p:nvSpPr>
               <p:cNvPr id="3" name="מציין מיקום תוכן 2">
@@ -13605,8 +13606,8 @@
           </a:p>
         </p:txBody>
       </p:sp>
-      <mc:AlternateContent xmlns:mc="http://schemas.openxmlformats.org/markup-compatibility/2006" xmlns:a14="http://schemas.microsoft.com/office/drawing/2010/main">
-        <mc:Choice Requires="a14">
+      <mc:AlternateContent xmlns:mc="http://schemas.openxmlformats.org/markup-compatibility/2006">
+        <mc:Choice xmlns:a14="http://schemas.microsoft.com/office/drawing/2010/main" Requires="a14">
           <p:sp>
             <p:nvSpPr>
               <p:cNvPr id="3" name="מציין מיקום תוכן 2">
@@ -13669,9 +13670,9 @@
                           <m:begChr m:val="["/>
                           <m:endChr m:val="]"/>
                           <m:ctrlPr>
-                            <a:rPr lang="en-US" i="1">
+                            <a:rPr lang="en-US" i="1" smtClean="0">
                               <a:solidFill>
-                                <a:schemeClr val="bg1"/>
+                                <a:schemeClr val="accent3"/>
                               </a:solidFill>
                               <a:latin typeface="Cambria Math" panose="02040503050406030204" pitchFamily="18" charset="0"/>
                             </a:rPr>
@@ -13684,7 +13685,7 @@
                               <m:ctrlPr>
                                 <a:rPr lang="en-US" i="1">
                                   <a:solidFill>
-                                    <a:schemeClr val="bg1"/>
+                                    <a:schemeClr val="accent3"/>
                                   </a:solidFill>
                                   <a:latin typeface="Cambria Math" panose="02040503050406030204" pitchFamily="18" charset="0"/>
                                 </a:rPr>
@@ -13694,7 +13695,7 @@
                               <m:r>
                                 <a:rPr lang="en-US" i="1">
                                   <a:solidFill>
-                                    <a:schemeClr val="bg1"/>
+                                    <a:schemeClr val="accent3"/>
                                   </a:solidFill>
                                   <a:latin typeface="Cambria Math" panose="02040503050406030204" pitchFamily="18" charset="0"/>
                                 </a:rPr>
@@ -13705,7 +13706,7 @@
                           <m:r>
                             <a:rPr lang="en-US" i="1">
                               <a:solidFill>
-                                <a:schemeClr val="bg1"/>
+                                <a:schemeClr val="accent3"/>
                               </a:solidFill>
                               <a:latin typeface="Cambria Math" panose="02040503050406030204" pitchFamily="18" charset="0"/>
                             </a:rPr>
@@ -13717,7 +13718,7 @@
                               <m:ctrlPr>
                                 <a:rPr lang="en-US" i="1">
                                   <a:solidFill>
-                                    <a:schemeClr val="bg1"/>
+                                    <a:schemeClr val="accent3"/>
                                   </a:solidFill>
                                   <a:latin typeface="Cambria Math" panose="02040503050406030204" pitchFamily="18" charset="0"/>
                                 </a:rPr>
@@ -13727,7 +13728,7 @@
                               <m:r>
                                 <a:rPr lang="en-US" i="1">
                                   <a:solidFill>
-                                    <a:schemeClr val="bg1"/>
+                                    <a:schemeClr val="accent3"/>
                                   </a:solidFill>
                                   <a:latin typeface="Cambria Math" panose="02040503050406030204" pitchFamily="18" charset="0"/>
                                 </a:rPr>
@@ -13738,7 +13739,7 @@
                           <m:r>
                             <a:rPr lang="en-US" i="1">
                               <a:solidFill>
-                                <a:schemeClr val="bg1"/>
+                                <a:schemeClr val="accent3"/>
                               </a:solidFill>
                               <a:latin typeface="Cambria Math" panose="02040503050406030204" pitchFamily="18" charset="0"/>
                             </a:rPr>
@@ -13749,7 +13750,7 @@
                               <m:ctrlPr>
                                 <a:rPr lang="en-US" i="1">
                                   <a:solidFill>
-                                    <a:schemeClr val="bg1"/>
+                                    <a:schemeClr val="accent3"/>
                                   </a:solidFill>
                                   <a:latin typeface="Cambria Math" panose="02040503050406030204" pitchFamily="18" charset="0"/>
                                 </a:rPr>
@@ -13763,7 +13764,7 @@
                                   <m:ctrlPr>
                                     <a:rPr lang="en-US" i="1">
                                       <a:solidFill>
-                                        <a:schemeClr val="bg1"/>
+                                        <a:schemeClr val="accent3"/>
                                       </a:solidFill>
                                       <a:latin typeface="Cambria Math" panose="02040503050406030204" pitchFamily="18" charset="0"/>
                                     </a:rPr>
@@ -13775,7 +13776,7 @@
                                       <m:ctrlPr>
                                         <a:rPr lang="en-US" i="1">
                                           <a:solidFill>
-                                            <a:schemeClr val="bg1"/>
+                                            <a:schemeClr val="accent3"/>
                                           </a:solidFill>
                                           <a:latin typeface="Cambria Math" panose="02040503050406030204" pitchFamily="18" charset="0"/>
                                         </a:rPr>
@@ -13788,7 +13789,7 @@
                                           <m:ctrlPr>
                                             <a:rPr lang="en-US" i="1">
                                               <a:solidFill>
-                                                <a:schemeClr val="bg1"/>
+                                                <a:schemeClr val="accent3"/>
                                               </a:solidFill>
                                               <a:latin typeface="Cambria Math" panose="02040503050406030204" pitchFamily="18" charset="0"/>
                                             </a:rPr>
@@ -13798,7 +13799,7 @@
                                           <m:r>
                                             <a:rPr lang="en-US" i="1">
                                               <a:solidFill>
-                                                <a:schemeClr val="bg1"/>
+                                                <a:schemeClr val="accent3"/>
                                               </a:solidFill>
                                               <a:latin typeface="Cambria Math" panose="02040503050406030204" pitchFamily="18" charset="0"/>
                                             </a:rPr>
@@ -13811,7 +13812,7 @@
                                       <m:r>
                                         <a:rPr lang="en-US" i="1">
                                           <a:solidFill>
-                                            <a:schemeClr val="bg1"/>
+                                            <a:schemeClr val="accent3"/>
                                           </a:solidFill>
                                           <a:latin typeface="Cambria Math" panose="02040503050406030204" pitchFamily="18" charset="0"/>
                                         </a:rPr>
@@ -13826,7 +13827,7 @@
                               <m:r>
                                 <a:rPr lang="en-US" i="1">
                                   <a:solidFill>
-                                    <a:schemeClr val="bg1"/>
+                                    <a:schemeClr val="accent3"/>
                                   </a:solidFill>
                                   <a:latin typeface="Cambria Math" panose="02040503050406030204" pitchFamily="18" charset="0"/>
                                 </a:rPr>
@@ -13835,7 +13836,7 @@
                               <m:r>
                                 <a:rPr lang="en-US" i="1">
                                   <a:solidFill>
-                                    <a:schemeClr val="bg1"/>
+                                    <a:schemeClr val="accent3"/>
                                   </a:solidFill>
                                   <a:latin typeface="Cambria Math" panose="02040503050406030204" pitchFamily="18" charset="0"/>
                                 </a:rPr>
@@ -13844,7 +13845,7 @@
                               <m:r>
                                 <a:rPr lang="en-US" i="1">
                                   <a:solidFill>
-                                    <a:schemeClr val="bg1"/>
+                                    <a:schemeClr val="accent3"/>
                                   </a:solidFill>
                                   <a:latin typeface="Cambria Math" panose="02040503050406030204" pitchFamily="18" charset="0"/>
                                 </a:rPr>
@@ -13855,7 +13856,7 @@
                               <m:r>
                                 <a:rPr lang="en-US" i="1">
                                   <a:solidFill>
-                                    <a:schemeClr val="bg1"/>
+                                    <a:schemeClr val="accent3"/>
                                   </a:solidFill>
                                   <a:latin typeface="Cambria Math" panose="02040503050406030204" pitchFamily="18" charset="0"/>
                                 </a:rPr>
@@ -13868,7 +13869,7 @@
                       <m:r>
                         <a:rPr lang="en-US" i="1">
                           <a:solidFill>
-                            <a:schemeClr val="bg1"/>
+                            <a:schemeClr val="accent3"/>
                           </a:solidFill>
                           <a:latin typeface="Cambria Math" panose="02040503050406030204" pitchFamily="18" charset="0"/>
                         </a:rPr>
@@ -13879,7 +13880,7 @@
                           <m:ctrlPr>
                             <a:rPr lang="en-US" i="1">
                               <a:solidFill>
-                                <a:schemeClr val="bg1"/>
+                                <a:schemeClr val="accent3"/>
                               </a:solidFill>
                               <a:latin typeface="Cambria Math" panose="02040503050406030204" pitchFamily="18" charset="0"/>
                             </a:rPr>
@@ -13891,7 +13892,7 @@
                               <m:ctrlPr>
                                 <a:rPr lang="en-US" i="1">
                                   <a:solidFill>
-                                    <a:schemeClr val="bg1"/>
+                                    <a:schemeClr val="accent3"/>
                                   </a:solidFill>
                                   <a:latin typeface="Cambria Math" panose="02040503050406030204" pitchFamily="18" charset="0"/>
                                 </a:rPr>
@@ -13901,7 +13902,7 @@
                               <m:r>
                                 <a:rPr lang="en-US" b="0" i="1" smtClean="0">
                                   <a:solidFill>
-                                    <a:schemeClr val="bg1"/>
+                                    <a:schemeClr val="accent3"/>
                                   </a:solidFill>
                                   <a:latin typeface="Cambria Math" panose="02040503050406030204" pitchFamily="18" charset="0"/>
                                 </a:rPr>
@@ -13913,7 +13914,7 @@
                                 </m:rPr>
                                 <a:rPr lang="en-US">
                                   <a:solidFill>
-                                    <a:schemeClr val="bg1"/>
+                                    <a:schemeClr val="accent3"/>
                                   </a:solidFill>
                                   <a:latin typeface="Cambria Math" panose="02040503050406030204" pitchFamily="18" charset="0"/>
                                 </a:rPr>
@@ -13927,7 +13928,7 @@
                                   <m:ctrlPr>
                                     <a:rPr lang="en-US" i="1">
                                       <a:solidFill>
-                                        <a:schemeClr val="bg1"/>
+                                        <a:schemeClr val="accent3"/>
                                       </a:solidFill>
                                       <a:latin typeface="Cambria Math" panose="02040503050406030204" pitchFamily="18" charset="0"/>
                                     </a:rPr>
@@ -13937,7 +13938,7 @@
                                   <m:r>
                                     <a:rPr lang="en-US" i="1">
                                       <a:solidFill>
-                                        <a:schemeClr val="bg1"/>
+                                        <a:schemeClr val="accent3"/>
                                       </a:solidFill>
                                       <a:latin typeface="Cambria Math" panose="02040503050406030204" pitchFamily="18" charset="0"/>
                                     </a:rPr>
@@ -13948,7 +13949,7 @@
                               <m:r>
                                 <a:rPr lang="en-US" i="1">
                                   <a:solidFill>
-                                    <a:schemeClr val="bg1"/>
+                                    <a:schemeClr val="accent3"/>
                                   </a:solidFill>
                                   <a:latin typeface="Cambria Math" panose="02040503050406030204" pitchFamily="18" charset="0"/>
                                 </a:rPr>
@@ -13960,7 +13961,7 @@
                                   <m:ctrlPr>
                                     <a:rPr lang="en-US" i="1">
                                       <a:solidFill>
-                                        <a:schemeClr val="bg1"/>
+                                        <a:schemeClr val="accent3"/>
                                       </a:solidFill>
                                       <a:latin typeface="Cambria Math" panose="02040503050406030204" pitchFamily="18" charset="0"/>
                                     </a:rPr>
@@ -13970,7 +13971,7 @@
                                   <m:r>
                                     <a:rPr lang="en-US" i="1">
                                       <a:solidFill>
-                                        <a:schemeClr val="bg1"/>
+                                        <a:schemeClr val="accent3"/>
                                       </a:solidFill>
                                       <a:latin typeface="Cambria Math" panose="02040503050406030204" pitchFamily="18" charset="0"/>
                                     </a:rPr>
@@ -13981,7 +13982,7 @@
                               <m:r>
                                 <a:rPr lang="en-US" i="1">
                                   <a:solidFill>
-                                    <a:schemeClr val="bg1"/>
+                                    <a:schemeClr val="accent3"/>
                                   </a:solidFill>
                                   <a:latin typeface="Cambria Math" panose="02040503050406030204" pitchFamily="18" charset="0"/>
                                 </a:rPr>
@@ -13992,7 +13993,7 @@
                                   <m:ctrlPr>
                                     <a:rPr lang="en-US" i="1">
                                       <a:solidFill>
-                                        <a:schemeClr val="bg1"/>
+                                        <a:schemeClr val="accent3"/>
                                       </a:solidFill>
                                       <a:latin typeface="Cambria Math" panose="02040503050406030204" pitchFamily="18" charset="0"/>
                                     </a:rPr>
@@ -14006,7 +14007,7 @@
                                       <m:ctrlPr>
                                         <a:rPr lang="en-US" i="1">
                                           <a:solidFill>
-                                            <a:schemeClr val="bg1"/>
+                                            <a:schemeClr val="accent3"/>
                                           </a:solidFill>
                                           <a:latin typeface="Cambria Math" panose="02040503050406030204" pitchFamily="18" charset="0"/>
                                         </a:rPr>
@@ -14018,7 +14019,7 @@
                                           <m:ctrlPr>
                                             <a:rPr lang="en-US" i="1">
                                               <a:solidFill>
-                                                <a:schemeClr val="bg1"/>
+                                                <a:schemeClr val="accent3"/>
                                               </a:solidFill>
                                               <a:latin typeface="Cambria Math" panose="02040503050406030204" pitchFamily="18" charset="0"/>
                                             </a:rPr>
@@ -14031,7 +14032,7 @@
                                               <m:ctrlPr>
                                                 <a:rPr lang="en-US" i="1">
                                                   <a:solidFill>
-                                                    <a:schemeClr val="bg1"/>
+                                                    <a:schemeClr val="accent3"/>
                                                   </a:solidFill>
                                                   <a:latin typeface="Cambria Math" panose="02040503050406030204" pitchFamily="18" charset="0"/>
                                                 </a:rPr>
@@ -14041,7 +14042,7 @@
                                               <m:r>
                                                 <a:rPr lang="en-US" i="1">
                                                   <a:solidFill>
-                                                    <a:schemeClr val="bg1"/>
+                                                    <a:schemeClr val="accent3"/>
                                                   </a:solidFill>
                                                   <a:latin typeface="Cambria Math" panose="02040503050406030204" pitchFamily="18" charset="0"/>
                                                 </a:rPr>
@@ -14054,7 +14055,7 @@
                                           <m:r>
                                             <a:rPr lang="en-US" i="1">
                                               <a:solidFill>
-                                                <a:schemeClr val="bg1"/>
+                                                <a:schemeClr val="accent3"/>
                                               </a:solidFill>
                                               <a:latin typeface="Cambria Math" panose="02040503050406030204" pitchFamily="18" charset="0"/>
                                             </a:rPr>
@@ -14069,7 +14070,7 @@
                                   <m:r>
                                     <a:rPr lang="en-US" i="1">
                                       <a:solidFill>
-                                        <a:schemeClr val="bg1"/>
+                                        <a:schemeClr val="accent3"/>
                                       </a:solidFill>
                                       <a:latin typeface="Cambria Math" panose="02040503050406030204" pitchFamily="18" charset="0"/>
                                     </a:rPr>
@@ -14078,7 +14079,7 @@
                                   <m:r>
                                     <a:rPr lang="en-US" i="1">
                                       <a:solidFill>
-                                        <a:schemeClr val="bg1"/>
+                                        <a:schemeClr val="accent3"/>
                                       </a:solidFill>
                                       <a:latin typeface="Cambria Math" panose="02040503050406030204" pitchFamily="18" charset="0"/>
                                     </a:rPr>
@@ -14087,7 +14088,7 @@
                                   <m:r>
                                     <a:rPr lang="en-US" i="1">
                                       <a:solidFill>
-                                        <a:schemeClr val="bg1"/>
+                                        <a:schemeClr val="accent3"/>
                                       </a:solidFill>
                                       <a:latin typeface="Cambria Math" panose="02040503050406030204" pitchFamily="18" charset="0"/>
                                     </a:rPr>
@@ -14098,7 +14099,7 @@
                                   <m:r>
                                     <a:rPr lang="en-US" i="1">
                                       <a:solidFill>
-                                        <a:schemeClr val="bg1"/>
+                                        <a:schemeClr val="accent3"/>
                                       </a:solidFill>
                                       <a:latin typeface="Cambria Math" panose="02040503050406030204" pitchFamily="18" charset="0"/>
                                     </a:rPr>
@@ -14115,7 +14116,7 @@
                               <m:ctrlPr>
                                 <a:rPr lang="en-US" i="1">
                                   <a:solidFill>
-                                    <a:schemeClr val="bg1"/>
+                                    <a:schemeClr val="accent3"/>
                                   </a:solidFill>
                                   <a:latin typeface="Cambria Math" panose="02040503050406030204" pitchFamily="18" charset="0"/>
                                 </a:rPr>
@@ -14125,7 +14126,7 @@
                               <m:r>
                                 <a:rPr lang="en-US" i="1">
                                   <a:solidFill>
-                                    <a:schemeClr val="bg1"/>
+                                    <a:schemeClr val="accent3"/>
                                   </a:solidFill>
                                   <a:latin typeface="Cambria Math" panose="02040503050406030204" pitchFamily="18" charset="0"/>
                                 </a:rPr>
@@ -14138,7 +14139,7 @@
                                   <m:ctrlPr>
                                     <a:rPr lang="en-US" i="1">
                                       <a:solidFill>
-                                        <a:schemeClr val="bg1"/>
+                                        <a:schemeClr val="accent3"/>
                                       </a:solidFill>
                                       <a:latin typeface="Cambria Math" panose="02040503050406030204" pitchFamily="18" charset="0"/>
                                     </a:rPr>
@@ -14148,7 +14149,7 @@
                                   <m:r>
                                     <a:rPr lang="en-US" i="1">
                                       <a:solidFill>
-                                        <a:schemeClr val="bg1"/>
+                                        <a:schemeClr val="accent3"/>
                                       </a:solidFill>
                                       <a:latin typeface="Cambria Math" panose="02040503050406030204" pitchFamily="18" charset="0"/>
                                     </a:rPr>
@@ -14157,7 +14158,7 @@
                                   <m:r>
                                     <a:rPr lang="en-US" i="1">
                                       <a:solidFill>
-                                        <a:schemeClr val="bg1"/>
+                                        <a:schemeClr val="accent3"/>
                                       </a:solidFill>
                                       <a:latin typeface="Cambria Math" panose="02040503050406030204" pitchFamily="18" charset="0"/>
                                     </a:rPr>
@@ -14166,7 +14167,7 @@
                                   <m:r>
                                     <a:rPr lang="en-US" i="1">
                                       <a:solidFill>
-                                        <a:schemeClr val="bg1"/>
+                                        <a:schemeClr val="accent3"/>
                                       </a:solidFill>
                                       <a:latin typeface="Cambria Math" panose="02040503050406030204" pitchFamily="18" charset="0"/>
                                     </a:rPr>
@@ -14179,7 +14180,7 @@
                               <m:r>
                                 <a:rPr lang="en-US" i="1">
                                   <a:solidFill>
-                                    <a:schemeClr val="bg1"/>
+                                    <a:schemeClr val="accent3"/>
                                   </a:solidFill>
                                   <a:latin typeface="Cambria Math" panose="02040503050406030204" pitchFamily="18" charset="0"/>
                                 </a:rPr>
@@ -14190,7 +14191,7 @@
                               <m:r>
                                 <a:rPr lang="en-US" i="1">
                                   <a:solidFill>
-                                    <a:schemeClr val="bg1"/>
+                                    <a:schemeClr val="accent3"/>
                                   </a:solidFill>
                                   <a:latin typeface="Cambria Math" panose="02040503050406030204" pitchFamily="18" charset="0"/>
                                 </a:rPr>
@@ -14203,7 +14204,7 @@
                       <m:r>
                         <a:rPr lang="en-US" i="1">
                           <a:solidFill>
-                            <a:schemeClr val="bg1"/>
+                            <a:schemeClr val="accent3"/>
                           </a:solidFill>
                           <a:latin typeface="Cambria Math" panose="02040503050406030204" pitchFamily="18" charset="0"/>
                         </a:rPr>
@@ -14216,7 +14217,7 @@
                           <m:ctrlPr>
                             <a:rPr lang="en-US" i="1">
                               <a:solidFill>
-                                <a:schemeClr val="bg1"/>
+                                <a:schemeClr val="accent3"/>
                               </a:solidFill>
                               <a:latin typeface="Cambria Math" panose="02040503050406030204" pitchFamily="18" charset="0"/>
                             </a:rPr>
@@ -14226,7 +14227,7 @@
                           <m:r>
                             <a:rPr lang="en-US" i="1">
                               <a:solidFill>
-                                <a:schemeClr val="bg1"/>
+                                <a:schemeClr val="accent3"/>
                               </a:solidFill>
                               <a:latin typeface="Cambria Math" panose="02040503050406030204" pitchFamily="18" charset="0"/>
                             </a:rPr>
@@ -14235,7 +14236,7 @@
                           <m:r>
                             <a:rPr lang="en-US" i="1">
                               <a:solidFill>
-                                <a:schemeClr val="bg1"/>
+                                <a:schemeClr val="accent3"/>
                               </a:solidFill>
                               <a:latin typeface="Cambria Math" panose="02040503050406030204" pitchFamily="18" charset="0"/>
                             </a:rPr>
@@ -14244,7 +14245,7 @@
                           <m:r>
                             <a:rPr lang="en-US" i="1">
                               <a:solidFill>
-                                <a:schemeClr val="bg1"/>
+                                <a:schemeClr val="accent3"/>
                               </a:solidFill>
                               <a:latin typeface="Cambria Math" panose="02040503050406030204" pitchFamily="18" charset="0"/>
                             </a:rPr>
@@ -14255,7 +14256,7 @@
                           <m:r>
                             <a:rPr lang="en-US" i="1">
                               <a:solidFill>
-                                <a:schemeClr val="bg1"/>
+                                <a:schemeClr val="accent3"/>
                               </a:solidFill>
                               <a:latin typeface="Cambria Math" panose="02040503050406030204" pitchFamily="18" charset="0"/>
                             </a:rPr>
@@ -14266,7 +14267,7 @@
                           <m:r>
                             <a:rPr lang="en-US" i="1">
                               <a:solidFill>
-                                <a:schemeClr val="bg1"/>
+                                <a:schemeClr val="accent3"/>
                               </a:solidFill>
                               <a:latin typeface="Cambria Math" panose="02040503050406030204" pitchFamily="18" charset="0"/>
                             </a:rPr>
@@ -14277,7 +14278,7 @@
                               <m:ctrlPr>
                                 <a:rPr lang="en-US" i="1">
                                   <a:solidFill>
-                                    <a:schemeClr val="bg1"/>
+                                    <a:schemeClr val="accent3"/>
                                   </a:solidFill>
                                   <a:latin typeface="Cambria Math" panose="02040503050406030204" pitchFamily="18" charset="0"/>
                                 </a:rPr>
@@ -14291,7 +14292,7 @@
                                   <m:ctrlPr>
                                     <a:rPr lang="en-US" i="1">
                                       <a:solidFill>
-                                        <a:schemeClr val="bg1"/>
+                                        <a:schemeClr val="accent3"/>
                                       </a:solidFill>
                                       <a:latin typeface="Cambria Math" panose="02040503050406030204" pitchFamily="18" charset="0"/>
                                     </a:rPr>
@@ -14303,7 +14304,7 @@
                                       <m:ctrlPr>
                                         <a:rPr lang="en-US" i="1">
                                           <a:solidFill>
-                                            <a:schemeClr val="bg1"/>
+                                            <a:schemeClr val="accent3"/>
                                           </a:solidFill>
                                           <a:latin typeface="Cambria Math" panose="02040503050406030204" pitchFamily="18" charset="0"/>
                                         </a:rPr>
@@ -14313,7 +14314,7 @@
                                       <m:r>
                                         <a:rPr lang="en-US" i="1">
                                           <a:solidFill>
-                                            <a:schemeClr val="bg1"/>
+                                            <a:schemeClr val="accent3"/>
                                           </a:solidFill>
                                           <a:latin typeface="Cambria Math" panose="02040503050406030204" pitchFamily="18" charset="0"/>
                                         </a:rPr>
@@ -14324,7 +14325,7 @@
                                       <m:r>
                                         <a:rPr lang="en-US" i="1">
                                           <a:solidFill>
-                                            <a:schemeClr val="bg1"/>
+                                            <a:schemeClr val="accent3"/>
                                           </a:solidFill>
                                           <a:latin typeface="Cambria Math" panose="02040503050406030204" pitchFamily="18" charset="0"/>
                                         </a:rPr>
@@ -14339,7 +14340,7 @@
                               <m:r>
                                 <a:rPr lang="en-US" i="1">
                                   <a:solidFill>
-                                    <a:schemeClr val="bg1"/>
+                                    <a:schemeClr val="accent3"/>
                                   </a:solidFill>
                                   <a:latin typeface="Cambria Math" panose="02040503050406030204" pitchFamily="18" charset="0"/>
                                 </a:rPr>
@@ -14352,7 +14353,7 @@
                       <m:r>
                         <a:rPr lang="en-US" i="1">
                           <a:solidFill>
-                            <a:schemeClr val="bg1"/>
+                            <a:schemeClr val="accent3"/>
                           </a:solidFill>
                           <a:latin typeface="Cambria Math" panose="02040503050406030204" pitchFamily="18" charset="0"/>
                         </a:rPr>
@@ -14361,7 +14362,7 @@
                       <m:r>
                         <a:rPr lang="en-US" i="1">
                           <a:solidFill>
-                            <a:schemeClr val="bg1"/>
+                            <a:schemeClr val="accent3"/>
                           </a:solidFill>
                           <a:latin typeface="Cambria Math" panose="02040503050406030204" pitchFamily="18" charset="0"/>
                         </a:rPr>
@@ -14370,7 +14371,7 @@
                       <m:r>
                         <a:rPr lang="en-US" i="1">
                           <a:solidFill>
-                            <a:schemeClr val="bg1"/>
+                            <a:schemeClr val="accent3"/>
                           </a:solidFill>
                           <a:latin typeface="Cambria Math" panose="02040503050406030204" pitchFamily="18" charset="0"/>
                         </a:rPr>
@@ -14379,7 +14380,7 @@
                       <m:r>
                         <a:rPr lang="en-US" i="1">
                           <a:solidFill>
-                            <a:schemeClr val="bg1"/>
+                            <a:schemeClr val="accent3"/>
                           </a:solidFill>
                           <a:latin typeface="Cambria Math" panose="02040503050406030204" pitchFamily="18" charset="0"/>
                         </a:rPr>
@@ -14388,7 +14389,7 @@
                       <m:r>
                         <a:rPr lang="en-US" i="1">
                           <a:solidFill>
-                            <a:schemeClr val="bg1"/>
+                            <a:schemeClr val="accent3"/>
                           </a:solidFill>
                           <a:latin typeface="Cambria Math" panose="02040503050406030204" pitchFamily="18" charset="0"/>
                         </a:rPr>
@@ -14397,7 +14398,7 @@
                       <m:r>
                         <a:rPr lang="en-US" i="1">
                           <a:solidFill>
-                            <a:schemeClr val="bg1"/>
+                            <a:schemeClr val="accent3"/>
                           </a:solidFill>
                           <a:latin typeface="Cambria Math" panose="02040503050406030204" pitchFamily="18" charset="0"/>
                         </a:rPr>
@@ -14406,7 +14407,7 @@
                       <m:r>
                         <a:rPr lang="en-US" i="1">
                           <a:solidFill>
-                            <a:schemeClr val="bg1"/>
+                            <a:schemeClr val="accent3"/>
                           </a:solidFill>
                           <a:latin typeface="Cambria Math" panose="02040503050406030204" pitchFamily="18" charset="0"/>
                         </a:rPr>
@@ -14419,7 +14420,7 @@
                           <m:ctrlPr>
                             <a:rPr lang="en-US" i="1">
                               <a:solidFill>
-                                <a:schemeClr val="bg1"/>
+                                <a:schemeClr val="accent3"/>
                               </a:solidFill>
                               <a:latin typeface="Cambria Math" panose="02040503050406030204" pitchFamily="18" charset="0"/>
                             </a:rPr>
@@ -14431,7 +14432,7 @@
                               <m:ctrlPr>
                                 <a:rPr lang="en-US" i="1">
                                   <a:solidFill>
-                                    <a:schemeClr val="bg1"/>
+                                    <a:schemeClr val="accent3"/>
                                   </a:solidFill>
                                   <a:latin typeface="Cambria Math" panose="02040503050406030204" pitchFamily="18" charset="0"/>
                                 </a:rPr>
@@ -14445,7 +14446,7 @@
                                   <m:ctrlPr>
                                     <a:rPr lang="en-US" i="1">
                                       <a:solidFill>
-                                        <a:schemeClr val="bg1"/>
+                                        <a:schemeClr val="accent3"/>
                                       </a:solidFill>
                                       <a:latin typeface="Cambria Math" panose="02040503050406030204" pitchFamily="18" charset="0"/>
                                     </a:rPr>
@@ -14455,7 +14456,7 @@
                                   <m:r>
                                     <a:rPr lang="en-US" i="1">
                                       <a:solidFill>
-                                        <a:schemeClr val="bg1"/>
+                                        <a:schemeClr val="accent3"/>
                                       </a:solidFill>
                                       <a:latin typeface="Cambria Math" panose="02040503050406030204" pitchFamily="18" charset="0"/>
                                     </a:rPr>
@@ -14466,7 +14467,7 @@
                                       <m:ctrlPr>
                                         <a:rPr lang="en-US" i="1">
                                           <a:solidFill>
-                                            <a:schemeClr val="bg1"/>
+                                            <a:schemeClr val="accent3"/>
                                           </a:solidFill>
                                           <a:latin typeface="Cambria Math" panose="02040503050406030204" pitchFamily="18" charset="0"/>
                                         </a:rPr>
@@ -14476,7 +14477,7 @@
                                       <m:r>
                                         <a:rPr lang="en-US" i="1">
                                           <a:solidFill>
-                                            <a:schemeClr val="bg1"/>
+                                            <a:schemeClr val="accent3"/>
                                           </a:solidFill>
                                           <a:latin typeface="Cambria Math" panose="02040503050406030204" pitchFamily="18" charset="0"/>
                                         </a:rPr>
@@ -14487,7 +14488,7 @@
                                       <m:r>
                                         <a:rPr lang="en-US" i="1">
                                           <a:solidFill>
-                                            <a:schemeClr val="bg1"/>
+                                            <a:schemeClr val="accent3"/>
                                           </a:solidFill>
                                           <a:latin typeface="Cambria Math" panose="02040503050406030204" pitchFamily="18" charset="0"/>
                                         </a:rPr>
@@ -14498,7 +14499,7 @@
                                   <m:r>
                                     <a:rPr lang="en-US" i="1">
                                       <a:solidFill>
-                                        <a:schemeClr val="bg1"/>
+                                        <a:schemeClr val="accent3"/>
                                       </a:solidFill>
                                       <a:latin typeface="Cambria Math" panose="02040503050406030204" pitchFamily="18" charset="0"/>
                                     </a:rPr>
@@ -14509,7 +14510,7 @@
                                       <m:ctrlPr>
                                         <a:rPr lang="en-US" i="1">
                                           <a:solidFill>
-                                            <a:schemeClr val="bg1"/>
+                                            <a:schemeClr val="accent3"/>
                                           </a:solidFill>
                                           <a:latin typeface="Cambria Math" panose="02040503050406030204" pitchFamily="18" charset="0"/>
                                         </a:rPr>
@@ -14519,7 +14520,7 @@
                                       <m:r>
                                         <a:rPr lang="en-US" i="1">
                                           <a:solidFill>
-                                            <a:schemeClr val="bg1"/>
+                                            <a:schemeClr val="accent3"/>
                                           </a:solidFill>
                                           <a:latin typeface="Cambria Math" panose="02040503050406030204" pitchFamily="18" charset="0"/>
                                         </a:rPr>
@@ -14530,7 +14531,7 @@
                                       <m:r>
                                         <a:rPr lang="en-US" i="1">
                                           <a:solidFill>
-                                            <a:schemeClr val="bg1"/>
+                                            <a:schemeClr val="accent3"/>
                                           </a:solidFill>
                                           <a:latin typeface="Cambria Math" panose="02040503050406030204" pitchFamily="18" charset="0"/>
                                         </a:rPr>
@@ -14541,7 +14542,7 @@
                                   <m:r>
                                     <a:rPr lang="en-US" i="1">
                                       <a:solidFill>
-                                        <a:schemeClr val="bg1"/>
+                                        <a:schemeClr val="accent3"/>
                                       </a:solidFill>
                                       <a:latin typeface="Cambria Math" panose="02040503050406030204" pitchFamily="18" charset="0"/>
                                     </a:rPr>
@@ -14554,7 +14555,7 @@
                               <m:r>
                                 <a:rPr lang="en-US" i="1">
                                   <a:solidFill>
-                                    <a:schemeClr val="bg1"/>
+                                    <a:schemeClr val="accent3"/>
                                   </a:solidFill>
                                   <a:latin typeface="Cambria Math" panose="02040503050406030204" pitchFamily="18" charset="0"/>
                                 </a:rPr>
@@ -14565,7 +14566,7 @@
                               <m:r>
                                 <a:rPr lang="en-US" i="1">
                                   <a:solidFill>
-                                    <a:schemeClr val="bg1"/>
+                                    <a:schemeClr val="accent3"/>
                                   </a:solidFill>
                                   <a:latin typeface="Cambria Math" panose="02040503050406030204" pitchFamily="18" charset="0"/>
                                 </a:rPr>
@@ -14576,7 +14577,7 @@
                           <m:r>
                             <a:rPr lang="en-US" i="1">
                               <a:solidFill>
-                                <a:schemeClr val="bg1"/>
+                                <a:schemeClr val="accent3"/>
                               </a:solidFill>
                               <a:latin typeface="Cambria Math" panose="02040503050406030204" pitchFamily="18" charset="0"/>
                             </a:rPr>
@@ -14587,7 +14588,7 @@
                               <m:ctrlPr>
                                 <a:rPr lang="en-US" i="1">
                                   <a:solidFill>
-                                    <a:schemeClr val="bg1"/>
+                                    <a:schemeClr val="accent3"/>
                                   </a:solidFill>
                                   <a:latin typeface="Cambria Math" panose="02040503050406030204" pitchFamily="18" charset="0"/>
                                 </a:rPr>
@@ -14597,7 +14598,7 @@
                               <m:r>
                                 <a:rPr lang="en-US" i="1">
                                   <a:solidFill>
-                                    <a:schemeClr val="bg1"/>
+                                    <a:schemeClr val="accent3"/>
                                   </a:solidFill>
                                   <a:latin typeface="Cambria Math" panose="02040503050406030204" pitchFamily="18" charset="0"/>
                                 </a:rPr>
@@ -14608,7 +14609,7 @@
                               <m:r>
                                 <a:rPr lang="en-US" i="1">
                                   <a:solidFill>
-                                    <a:schemeClr val="bg1"/>
+                                    <a:schemeClr val="accent3"/>
                                   </a:solidFill>
                                   <a:latin typeface="Cambria Math" panose="02040503050406030204" pitchFamily="18" charset="0"/>
                                 </a:rPr>
@@ -14777,7 +14778,7 @@
             </p:txBody>
           </p:sp>
         </mc:Choice>
-        <mc:Fallback xmlns="">
+        <mc:Fallback>
           <p:sp>
             <p:nvSpPr>
               <p:cNvPr id="3" name="מציין מיקום תוכן 2">
@@ -15700,8 +15701,8 @@
           </a:p>
         </p:txBody>
       </p:sp>
-      <mc:AlternateContent xmlns:mc="http://schemas.openxmlformats.org/markup-compatibility/2006" xmlns:a14="http://schemas.microsoft.com/office/drawing/2010/main">
-        <mc:Choice Requires="a14">
+      <mc:AlternateContent xmlns:mc="http://schemas.openxmlformats.org/markup-compatibility/2006">
+        <mc:Choice xmlns:a14="http://schemas.microsoft.com/office/drawing/2010/main" Requires="a14">
           <p:sp>
             <p:nvSpPr>
               <p:cNvPr id="3" name="מציין מיקום תוכן 2">
@@ -15814,7 +15815,7 @@
                           <m:ctrlPr>
                             <a:rPr lang="en-US" i="1" smtClean="0">
                               <a:solidFill>
-                                <a:schemeClr val="bg1"/>
+                                <a:schemeClr val="accent3"/>
                               </a:solidFill>
                               <a:latin typeface="Cambria Math" panose="02040503050406030204" pitchFamily="18" charset="0"/>
                             </a:rPr>
@@ -15824,7 +15825,7 @@
                           <m:r>
                             <a:rPr lang="en-US" i="1">
                               <a:solidFill>
-                                <a:schemeClr val="bg1"/>
+                                <a:schemeClr val="accent3"/>
                               </a:solidFill>
                               <a:latin typeface="Cambria Math" panose="02040503050406030204" pitchFamily="18" charset="0"/>
                             </a:rPr>
@@ -15835,7 +15836,7 @@
                           <m:r>
                             <a:rPr lang="en-US" i="1">
                               <a:solidFill>
-                                <a:schemeClr val="bg1"/>
+                                <a:schemeClr val="accent3"/>
                               </a:solidFill>
                               <a:latin typeface="Cambria Math" panose="02040503050406030204" pitchFamily="18" charset="0"/>
                             </a:rPr>
@@ -15846,7 +15847,7 @@
                           <m:r>
                             <a:rPr lang="en-US" i="1">
                               <a:solidFill>
-                                <a:schemeClr val="bg1"/>
+                                <a:schemeClr val="accent3"/>
                               </a:solidFill>
                               <a:latin typeface="Cambria Math" panose="02040503050406030204" pitchFamily="18" charset="0"/>
                             </a:rPr>
@@ -15857,7 +15858,7 @@
                       <m:r>
                         <a:rPr lang="en-US" i="1">
                           <a:solidFill>
-                            <a:schemeClr val="bg1"/>
+                            <a:schemeClr val="accent3"/>
                           </a:solidFill>
                           <a:latin typeface="Cambria Math" panose="02040503050406030204" pitchFamily="18" charset="0"/>
                         </a:rPr>
@@ -15868,7 +15869,7 @@
                           <m:ctrlPr>
                             <a:rPr lang="en-US" i="1">
                               <a:solidFill>
-                                <a:schemeClr val="bg1"/>
+                                <a:schemeClr val="accent3"/>
                               </a:solidFill>
                               <a:latin typeface="Cambria Math" panose="02040503050406030204" pitchFamily="18" charset="0"/>
                             </a:rPr>
@@ -15878,7 +15879,7 @@
                           <m:r>
                             <a:rPr lang="en-US" i="1">
                               <a:solidFill>
-                                <a:schemeClr val="bg1"/>
+                                <a:schemeClr val="accent3"/>
                               </a:solidFill>
                               <a:latin typeface="Cambria Math" panose="02040503050406030204" pitchFamily="18" charset="0"/>
                             </a:rPr>
@@ -15889,7 +15890,7 @@
                           <m:r>
                             <a:rPr lang="en-US" i="1">
                               <a:solidFill>
-                                <a:schemeClr val="bg1"/>
+                                <a:schemeClr val="accent3"/>
                               </a:solidFill>
                               <a:latin typeface="Cambria Math" panose="02040503050406030204" pitchFamily="18" charset="0"/>
                             </a:rPr>
@@ -15900,7 +15901,7 @@
                       <m:r>
                         <a:rPr lang="en-US" i="1">
                           <a:solidFill>
-                            <a:schemeClr val="bg1"/>
+                            <a:schemeClr val="accent3"/>
                           </a:solidFill>
                           <a:latin typeface="Cambria Math" panose="02040503050406030204" pitchFamily="18" charset="0"/>
                         </a:rPr>
@@ -15909,7 +15910,7 @@
                       <m:r>
                         <a:rPr lang="en-US" i="1">
                           <a:solidFill>
-                            <a:schemeClr val="bg1"/>
+                            <a:schemeClr val="accent3"/>
                           </a:solidFill>
                           <a:latin typeface="Cambria Math" panose="02040503050406030204" pitchFamily="18" charset="0"/>
                         </a:rPr>
@@ -15920,7 +15921,7 @@
                           <m:ctrlPr>
                             <a:rPr lang="en-US" i="1">
                               <a:solidFill>
-                                <a:schemeClr val="bg1"/>
+                                <a:schemeClr val="accent3"/>
                               </a:solidFill>
                               <a:latin typeface="Cambria Math" panose="02040503050406030204" pitchFamily="18" charset="0"/>
                             </a:rPr>
@@ -15930,7 +15931,7 @@
                           <m:r>
                             <a:rPr lang="en-US" i="1">
                               <a:solidFill>
-                                <a:schemeClr val="bg1"/>
+                                <a:schemeClr val="accent3"/>
                               </a:solidFill>
                               <a:latin typeface="Cambria Math" panose="02040503050406030204" pitchFamily="18" charset="0"/>
                             </a:rPr>
@@ -15941,7 +15942,7 @@
                           <m:r>
                             <a:rPr lang="en-US" i="1">
                               <a:solidFill>
-                                <a:schemeClr val="bg1"/>
+                                <a:schemeClr val="accent3"/>
                               </a:solidFill>
                               <a:latin typeface="Cambria Math" panose="02040503050406030204" pitchFamily="18" charset="0"/>
                             </a:rPr>
@@ -15952,7 +15953,7 @@
                           <m:r>
                             <a:rPr lang="en-US" i="1">
                               <a:solidFill>
-                                <a:schemeClr val="bg1"/>
+                                <a:schemeClr val="accent3"/>
                               </a:solidFill>
                               <a:latin typeface="Cambria Math" panose="02040503050406030204" pitchFamily="18" charset="0"/>
                             </a:rPr>
@@ -15963,7 +15964,7 @@
                       <m:r>
                         <a:rPr lang="en-US" i="1">
                           <a:solidFill>
-                            <a:schemeClr val="bg1"/>
+                            <a:schemeClr val="accent3"/>
                           </a:solidFill>
                           <a:latin typeface="Cambria Math" panose="02040503050406030204" pitchFamily="18" charset="0"/>
                         </a:rPr>
@@ -15974,7 +15975,7 @@
                           <m:ctrlPr>
                             <a:rPr lang="en-US" i="1">
                               <a:solidFill>
-                                <a:schemeClr val="bg1"/>
+                                <a:schemeClr val="accent3"/>
                               </a:solidFill>
                               <a:latin typeface="Cambria Math" panose="02040503050406030204" pitchFamily="18" charset="0"/>
                             </a:rPr>
@@ -15984,7 +15985,7 @@
                           <m:r>
                             <a:rPr lang="en-US" i="1">
                               <a:solidFill>
-                                <a:schemeClr val="bg1"/>
+                                <a:schemeClr val="accent3"/>
                               </a:solidFill>
                               <a:latin typeface="Cambria Math" panose="02040503050406030204" pitchFamily="18" charset="0"/>
                             </a:rPr>
@@ -15995,7 +15996,7 @@
                           <m:r>
                             <a:rPr lang="en-US" i="1">
                               <a:solidFill>
-                                <a:schemeClr val="bg1"/>
+                                <a:schemeClr val="accent3"/>
                               </a:solidFill>
                               <a:latin typeface="Cambria Math" panose="02040503050406030204" pitchFamily="18" charset="0"/>
                             </a:rPr>
@@ -16006,7 +16007,7 @@
                       <m:r>
                         <a:rPr lang="en-US" i="1">
                           <a:solidFill>
-                            <a:schemeClr val="bg1"/>
+                            <a:schemeClr val="accent3"/>
                           </a:solidFill>
                           <a:latin typeface="Cambria Math" panose="02040503050406030204" pitchFamily="18" charset="0"/>
                         </a:rPr>
@@ -16015,7 +16016,7 @@
                       <m:r>
                         <a:rPr lang="en-US" i="1">
                           <a:solidFill>
-                            <a:schemeClr val="bg1"/>
+                            <a:schemeClr val="accent3"/>
                           </a:solidFill>
                           <a:latin typeface="Cambria Math" panose="02040503050406030204" pitchFamily="18" charset="0"/>
                         </a:rPr>
@@ -16026,7 +16027,7 @@
                           <m:ctrlPr>
                             <a:rPr lang="en-US" i="1">
                               <a:solidFill>
-                                <a:schemeClr val="bg1"/>
+                                <a:schemeClr val="accent3"/>
                               </a:solidFill>
                               <a:latin typeface="Cambria Math" panose="02040503050406030204" pitchFamily="18" charset="0"/>
                             </a:rPr>
@@ -16036,7 +16037,7 @@
                           <m:r>
                             <a:rPr lang="en-US" i="1">
                               <a:solidFill>
-                                <a:schemeClr val="bg1"/>
+                                <a:schemeClr val="accent3"/>
                               </a:solidFill>
                               <a:latin typeface="Cambria Math" panose="02040503050406030204" pitchFamily="18" charset="0"/>
                             </a:rPr>
@@ -16047,7 +16048,7 @@
                           <m:r>
                             <a:rPr lang="en-US" i="1">
                               <a:solidFill>
-                                <a:schemeClr val="bg1"/>
+                                <a:schemeClr val="accent3"/>
                               </a:solidFill>
                               <a:latin typeface="Cambria Math" panose="02040503050406030204" pitchFamily="18" charset="0"/>
                             </a:rPr>
@@ -16060,7 +16061,7 @@
                           <m:ctrlPr>
                             <a:rPr lang="en-US" i="1">
                               <a:solidFill>
-                                <a:schemeClr val="bg1"/>
+                                <a:schemeClr val="accent3"/>
                               </a:solidFill>
                               <a:latin typeface="Cambria Math" panose="02040503050406030204" pitchFamily="18" charset="0"/>
                             </a:rPr>
@@ -16070,7 +16071,7 @@
                           <m:r>
                             <a:rPr lang="en-US" i="1">
                               <a:solidFill>
-                                <a:schemeClr val="bg1"/>
+                                <a:schemeClr val="accent3"/>
                               </a:solidFill>
                               <a:latin typeface="Cambria Math" panose="02040503050406030204" pitchFamily="18" charset="0"/>
                             </a:rPr>
@@ -16081,7 +16082,7 @@
                           <m:r>
                             <a:rPr lang="en-US" i="1">
                               <a:solidFill>
-                                <a:schemeClr val="bg1"/>
+                                <a:schemeClr val="accent3"/>
                               </a:solidFill>
                               <a:latin typeface="Cambria Math" panose="02040503050406030204" pitchFamily="18" charset="0"/>
                             </a:rPr>
@@ -16092,7 +16093,7 @@
                           <m:r>
                             <a:rPr lang="en-US" i="1">
                               <a:solidFill>
-                                <a:schemeClr val="bg1"/>
+                                <a:schemeClr val="accent3"/>
                               </a:solidFill>
                               <a:latin typeface="Cambria Math" panose="02040503050406030204" pitchFamily="18" charset="0"/>
                             </a:rPr>
@@ -16103,7 +16104,7 @@
                       <m:r>
                         <a:rPr lang="en-US" i="1">
                           <a:solidFill>
-                            <a:schemeClr val="bg1"/>
+                            <a:schemeClr val="accent3"/>
                           </a:solidFill>
                           <a:latin typeface="Cambria Math" panose="02040503050406030204" pitchFamily="18" charset="0"/>
                         </a:rPr>
@@ -16114,7 +16115,7 @@
                           <m:ctrlPr>
                             <a:rPr lang="en-US" i="1">
                               <a:solidFill>
-                                <a:schemeClr val="bg1"/>
+                                <a:schemeClr val="accent3"/>
                               </a:solidFill>
                               <a:latin typeface="Cambria Math" panose="02040503050406030204" pitchFamily="18" charset="0"/>
                             </a:rPr>
@@ -16124,7 +16125,7 @@
                           <m:r>
                             <a:rPr lang="en-US" i="1">
                               <a:solidFill>
-                                <a:schemeClr val="bg1"/>
+                                <a:schemeClr val="accent3"/>
                               </a:solidFill>
                               <a:latin typeface="Cambria Math" panose="02040503050406030204" pitchFamily="18" charset="0"/>
                             </a:rPr>
@@ -16135,7 +16136,7 @@
                           <m:r>
                             <a:rPr lang="en-US" i="1">
                               <a:solidFill>
-                                <a:schemeClr val="bg1"/>
+                                <a:schemeClr val="accent3"/>
                               </a:solidFill>
                               <a:latin typeface="Cambria Math" panose="02040503050406030204" pitchFamily="18" charset="0"/>
                             </a:rPr>
@@ -16148,7 +16149,7 @@
                           <m:ctrlPr>
                             <a:rPr lang="en-US" i="1">
                               <a:solidFill>
-                                <a:schemeClr val="bg1"/>
+                                <a:schemeClr val="accent3"/>
                               </a:solidFill>
                               <a:latin typeface="Cambria Math" panose="02040503050406030204" pitchFamily="18" charset="0"/>
                             </a:rPr>
@@ -16161,7 +16162,7 @@
                               <m:ctrlPr>
                                 <a:rPr lang="en-US" i="1">
                                   <a:solidFill>
-                                    <a:schemeClr val="bg1"/>
+                                    <a:schemeClr val="accent3"/>
                                   </a:solidFill>
                                   <a:latin typeface="Cambria Math" panose="02040503050406030204" pitchFamily="18" charset="0"/>
                                 </a:rPr>
@@ -16171,7 +16172,7 @@
                               <m:r>
                                 <a:rPr lang="en-US" i="1">
                                   <a:solidFill>
-                                    <a:schemeClr val="bg1"/>
+                                    <a:schemeClr val="accent3"/>
                                   </a:solidFill>
                                   <a:latin typeface="Cambria Math" panose="02040503050406030204" pitchFamily="18" charset="0"/>
                                 </a:rPr>
@@ -16184,7 +16185,7 @@
                           <m:r>
                             <a:rPr lang="en-US" i="1">
                               <a:solidFill>
-                                <a:schemeClr val="bg1"/>
+                                <a:schemeClr val="accent3"/>
                               </a:solidFill>
                               <a:latin typeface="Cambria Math" panose="02040503050406030204" pitchFamily="18" charset="0"/>
                             </a:rPr>
@@ -16195,7 +16196,7 @@
                       <m:r>
                         <a:rPr lang="en-US" i="1">
                           <a:solidFill>
-                            <a:schemeClr val="bg1"/>
+                            <a:schemeClr val="accent3"/>
                           </a:solidFill>
                           <a:latin typeface="Cambria Math" panose="02040503050406030204" pitchFamily="18" charset="0"/>
                         </a:rPr>
@@ -16206,7 +16207,7 @@
                           <m:ctrlPr>
                             <a:rPr lang="en-US" i="1">
                               <a:solidFill>
-                                <a:schemeClr val="bg1"/>
+                                <a:schemeClr val="accent3"/>
                               </a:solidFill>
                               <a:latin typeface="Cambria Math" panose="02040503050406030204" pitchFamily="18" charset="0"/>
                             </a:rPr>
@@ -16216,7 +16217,7 @@
                           <m:r>
                             <a:rPr lang="en-US" i="1">
                               <a:solidFill>
-                                <a:schemeClr val="bg1"/>
+                                <a:schemeClr val="accent3"/>
                               </a:solidFill>
                               <a:latin typeface="Cambria Math" panose="02040503050406030204" pitchFamily="18" charset="0"/>
                             </a:rPr>
@@ -16227,7 +16228,7 @@
                           <m:r>
                             <a:rPr lang="en-US" i="1">
                               <a:solidFill>
-                                <a:schemeClr val="bg1"/>
+                                <a:schemeClr val="accent3"/>
                               </a:solidFill>
                               <a:latin typeface="Cambria Math" panose="02040503050406030204" pitchFamily="18" charset="0"/>
                             </a:rPr>
@@ -16240,7 +16241,7 @@
                           <m:ctrlPr>
                             <a:rPr lang="en-US" i="1" smtClean="0">
                               <a:solidFill>
-                                <a:schemeClr val="bg1"/>
+                                <a:schemeClr val="accent3"/>
                               </a:solidFill>
                               <a:latin typeface="Cambria Math" panose="02040503050406030204" pitchFamily="18" charset="0"/>
                             </a:rPr>
@@ -16253,7 +16254,7 @@
                               <m:ctrlPr>
                                 <a:rPr lang="en-US" i="1">
                                   <a:solidFill>
-                                    <a:schemeClr val="bg1"/>
+                                    <a:schemeClr val="accent3"/>
                                   </a:solidFill>
                                   <a:latin typeface="Cambria Math" panose="02040503050406030204" pitchFamily="18" charset="0"/>
                                 </a:rPr>
@@ -16263,7 +16264,7 @@
                               <m:r>
                                 <a:rPr lang="en-US" i="1">
                                   <a:solidFill>
-                                    <a:schemeClr val="bg1"/>
+                                    <a:schemeClr val="accent3"/>
                                   </a:solidFill>
                                   <a:latin typeface="Cambria Math" panose="02040503050406030204" pitchFamily="18" charset="0"/>
                                 </a:rPr>
@@ -16276,7 +16277,7 @@
                           <m:r>
                             <a:rPr lang="en-US" i="1">
                               <a:solidFill>
-                                <a:schemeClr val="bg1"/>
+                                <a:schemeClr val="accent3"/>
                               </a:solidFill>
                               <a:latin typeface="Cambria Math" panose="02040503050406030204" pitchFamily="18" charset="0"/>
                             </a:rPr>
@@ -16287,7 +16288,7 @@
                       <m:r>
                         <a:rPr lang="en-US" i="1">
                           <a:solidFill>
-                            <a:schemeClr val="bg1"/>
+                            <a:schemeClr val="accent3"/>
                           </a:solidFill>
                           <a:latin typeface="Cambria Math" panose="02040503050406030204" pitchFamily="18" charset="0"/>
                         </a:rPr>
@@ -16298,7 +16299,7 @@
                           <m:ctrlPr>
                             <a:rPr lang="en-US" i="1">
                               <a:solidFill>
-                                <a:schemeClr val="bg1"/>
+                                <a:schemeClr val="accent3"/>
                               </a:solidFill>
                               <a:latin typeface="Cambria Math" panose="02040503050406030204" pitchFamily="18" charset="0"/>
                             </a:rPr>
@@ -16310,7 +16311,7 @@
                               <m:ctrlPr>
                                 <a:rPr lang="en-US" i="1">
                                   <a:solidFill>
-                                    <a:schemeClr val="bg1"/>
+                                    <a:schemeClr val="accent3"/>
                                   </a:solidFill>
                                   <a:latin typeface="Cambria Math" panose="02040503050406030204" pitchFamily="18" charset="0"/>
                                 </a:rPr>
@@ -16320,7 +16321,7 @@
                               <m:r>
                                 <a:rPr lang="en-US" i="1">
                                   <a:solidFill>
-                                    <a:schemeClr val="bg1"/>
+                                    <a:schemeClr val="accent3"/>
                                   </a:solidFill>
                                   <a:latin typeface="Cambria Math" panose="02040503050406030204" pitchFamily="18" charset="0"/>
                                 </a:rPr>
@@ -16331,7 +16332,7 @@
                               <m:r>
                                 <a:rPr lang="en-US" i="1">
                                   <a:solidFill>
-                                    <a:schemeClr val="bg1"/>
+                                    <a:schemeClr val="accent3"/>
                                   </a:solidFill>
                                   <a:latin typeface="Cambria Math" panose="02040503050406030204" pitchFamily="18" charset="0"/>
                                 </a:rPr>
@@ -16342,7 +16343,7 @@
                           <m:r>
                             <a:rPr lang="en-US" i="1">
                               <a:solidFill>
-                                <a:schemeClr val="bg1"/>
+                                <a:schemeClr val="accent3"/>
                               </a:solidFill>
                               <a:latin typeface="Cambria Math" panose="02040503050406030204" pitchFamily="18" charset="0"/>
                             </a:rPr>
@@ -16351,7 +16352,7 @@
                           <m:r>
                             <a:rPr lang="en-US" i="1">
                               <a:solidFill>
-                                <a:schemeClr val="bg1"/>
+                                <a:schemeClr val="accent3"/>
                               </a:solidFill>
                               <a:latin typeface="Cambria Math" panose="02040503050406030204" pitchFamily="18" charset="0"/>
                             </a:rPr>
@@ -16362,7 +16363,7 @@
                               <m:ctrlPr>
                                 <a:rPr lang="en-US" i="1">
                                   <a:solidFill>
-                                    <a:schemeClr val="bg1"/>
+                                    <a:schemeClr val="accent3"/>
                                   </a:solidFill>
                                   <a:latin typeface="Cambria Math" panose="02040503050406030204" pitchFamily="18" charset="0"/>
                                 </a:rPr>
@@ -16372,7 +16373,7 @@
                               <m:r>
                                 <a:rPr lang="en-US" i="1">
                                   <a:solidFill>
-                                    <a:schemeClr val="bg1"/>
+                                    <a:schemeClr val="accent3"/>
                                   </a:solidFill>
                                   <a:latin typeface="Cambria Math" panose="02040503050406030204" pitchFamily="18" charset="0"/>
                                 </a:rPr>
@@ -16383,7 +16384,7 @@
                               <m:r>
                                 <a:rPr lang="en-US" i="1">
                                   <a:solidFill>
-                                    <a:schemeClr val="bg1"/>
+                                    <a:schemeClr val="accent3"/>
                                   </a:solidFill>
                                   <a:latin typeface="Cambria Math" panose="02040503050406030204" pitchFamily="18" charset="0"/>
                                 </a:rPr>
@@ -16396,7 +16397,7 @@
                               <m:ctrlPr>
                                 <a:rPr lang="en-US" i="1">
                                   <a:solidFill>
-                                    <a:schemeClr val="bg1"/>
+                                    <a:schemeClr val="accent3"/>
                                   </a:solidFill>
                                   <a:latin typeface="Cambria Math" panose="02040503050406030204" pitchFamily="18" charset="0"/>
                                 </a:rPr>
@@ -16406,7 +16407,7 @@
                               <m:r>
                                 <a:rPr lang="en-US" i="1">
                                   <a:solidFill>
-                                    <a:schemeClr val="bg1"/>
+                                    <a:schemeClr val="accent3"/>
                                   </a:solidFill>
                                   <a:latin typeface="Cambria Math" panose="02040503050406030204" pitchFamily="18" charset="0"/>
                                 </a:rPr>
@@ -16417,7 +16418,7 @@
                               <m:r>
                                 <a:rPr lang="en-US" i="1">
                                   <a:solidFill>
-                                    <a:schemeClr val="bg1"/>
+                                    <a:schemeClr val="accent3"/>
                                   </a:solidFill>
                                   <a:latin typeface="Cambria Math" panose="02040503050406030204" pitchFamily="18" charset="0"/>
                                 </a:rPr>
@@ -16428,7 +16429,7 @@
                               <m:r>
                                 <a:rPr lang="en-US" i="1">
                                   <a:solidFill>
-                                    <a:schemeClr val="bg1"/>
+                                    <a:schemeClr val="accent3"/>
                                   </a:solidFill>
                                   <a:latin typeface="Cambria Math" panose="02040503050406030204" pitchFamily="18" charset="0"/>
                                 </a:rPr>
@@ -16441,7 +16442,7 @@
                       <m:r>
                         <a:rPr lang="en-US" i="1">
                           <a:solidFill>
-                            <a:schemeClr val="bg1"/>
+                            <a:schemeClr val="accent3"/>
                           </a:solidFill>
                           <a:latin typeface="Cambria Math" panose="02040503050406030204" pitchFamily="18" charset="0"/>
                         </a:rPr>
@@ -16452,7 +16453,7 @@
                           <m:ctrlPr>
                             <a:rPr lang="en-US" i="1">
                               <a:solidFill>
-                                <a:schemeClr val="bg1"/>
+                                <a:schemeClr val="accent3"/>
                               </a:solidFill>
                               <a:latin typeface="Cambria Math" panose="02040503050406030204" pitchFamily="18" charset="0"/>
                             </a:rPr>
@@ -16462,7 +16463,7 @@
                           <m:r>
                             <a:rPr lang="en-US" i="1">
                               <a:solidFill>
-                                <a:schemeClr val="bg1"/>
+                                <a:schemeClr val="accent3"/>
                               </a:solidFill>
                               <a:latin typeface="Cambria Math" panose="02040503050406030204" pitchFamily="18" charset="0"/>
                             </a:rPr>
@@ -16473,7 +16474,7 @@
                           <m:r>
                             <a:rPr lang="en-US" i="1">
                               <a:solidFill>
-                                <a:schemeClr val="bg1"/>
+                                <a:schemeClr val="accent3"/>
                               </a:solidFill>
                               <a:latin typeface="Cambria Math" panose="02040503050406030204" pitchFamily="18" charset="0"/>
                             </a:rPr>
@@ -16486,7 +16487,7 @@
                           <m:ctrlPr>
                             <a:rPr lang="en-US" i="1">
                               <a:solidFill>
-                                <a:schemeClr val="bg1"/>
+                                <a:schemeClr val="accent3"/>
                               </a:solidFill>
                               <a:latin typeface="Cambria Math" panose="02040503050406030204" pitchFamily="18" charset="0"/>
                             </a:rPr>
@@ -16499,7 +16500,7 @@
                               <m:ctrlPr>
                                 <a:rPr lang="en-US" i="1">
                                   <a:solidFill>
-                                    <a:schemeClr val="bg1"/>
+                                    <a:schemeClr val="accent3"/>
                                   </a:solidFill>
                                   <a:latin typeface="Cambria Math" panose="02040503050406030204" pitchFamily="18" charset="0"/>
                                 </a:rPr>
@@ -16509,7 +16510,7 @@
                               <m:r>
                                 <a:rPr lang="en-US" i="1">
                                   <a:solidFill>
-                                    <a:schemeClr val="bg1"/>
+                                    <a:schemeClr val="accent3"/>
                                   </a:solidFill>
                                   <a:latin typeface="Cambria Math" panose="02040503050406030204" pitchFamily="18" charset="0"/>
                                 </a:rPr>
@@ -16522,7 +16523,7 @@
                           <m:r>
                             <a:rPr lang="en-US" i="1">
                               <a:solidFill>
-                                <a:schemeClr val="bg1"/>
+                                <a:schemeClr val="accent3"/>
                               </a:solidFill>
                               <a:latin typeface="Cambria Math" panose="02040503050406030204" pitchFamily="18" charset="0"/>
                             </a:rPr>
@@ -16533,7 +16534,7 @@
                       <m:r>
                         <a:rPr lang="en-US" i="1">
                           <a:solidFill>
-                            <a:schemeClr val="bg1"/>
+                            <a:schemeClr val="accent3"/>
                           </a:solidFill>
                           <a:latin typeface="Cambria Math" panose="02040503050406030204" pitchFamily="18" charset="0"/>
                         </a:rPr>
@@ -16544,7 +16545,7 @@
                           <m:ctrlPr>
                             <a:rPr lang="en-US" i="1">
                               <a:solidFill>
-                                <a:schemeClr val="bg1"/>
+                                <a:schemeClr val="accent3"/>
                               </a:solidFill>
                               <a:latin typeface="Cambria Math" panose="02040503050406030204" pitchFamily="18" charset="0"/>
                             </a:rPr>
@@ -16554,7 +16555,7 @@
                           <m:r>
                             <a:rPr lang="en-US" i="1">
                               <a:solidFill>
-                                <a:schemeClr val="bg1"/>
+                                <a:schemeClr val="accent3"/>
                               </a:solidFill>
                               <a:latin typeface="Cambria Math" panose="02040503050406030204" pitchFamily="18" charset="0"/>
                             </a:rPr>
@@ -16565,7 +16566,7 @@
                           <m:r>
                             <a:rPr lang="en-US" i="1">
                               <a:solidFill>
-                                <a:schemeClr val="bg1"/>
+                                <a:schemeClr val="accent3"/>
                               </a:solidFill>
                               <a:latin typeface="Cambria Math" panose="02040503050406030204" pitchFamily="18" charset="0"/>
                             </a:rPr>
@@ -16576,7 +16577,7 @@
                           <m:r>
                             <a:rPr lang="en-US" i="1">
                               <a:solidFill>
-                                <a:schemeClr val="bg1"/>
+                                <a:schemeClr val="accent3"/>
                               </a:solidFill>
                               <a:latin typeface="Cambria Math" panose="02040503050406030204" pitchFamily="18" charset="0"/>
                             </a:rPr>
@@ -16587,7 +16588,7 @@
                       <m:r>
                         <a:rPr lang="en-US" i="1">
                           <a:solidFill>
-                            <a:schemeClr val="bg1"/>
+                            <a:schemeClr val="accent3"/>
                           </a:solidFill>
                           <a:latin typeface="Cambria Math" panose="02040503050406030204" pitchFamily="18" charset="0"/>
                         </a:rPr>
@@ -16596,7 +16597,7 @@
                       <m:r>
                         <a:rPr lang="en-US" i="1">
                           <a:solidFill>
-                            <a:schemeClr val="bg1"/>
+                            <a:schemeClr val="accent3"/>
                           </a:solidFill>
                           <a:latin typeface="Cambria Math" panose="02040503050406030204" pitchFamily="18" charset="0"/>
                         </a:rPr>
@@ -16605,7 +16606,7 @@
                       <m:r>
                         <a:rPr lang="en-US" i="1">
                           <a:solidFill>
-                            <a:schemeClr val="bg1"/>
+                            <a:schemeClr val="accent3"/>
                           </a:solidFill>
                           <a:latin typeface="Cambria Math" panose="02040503050406030204" pitchFamily="18" charset="0"/>
                         </a:rPr>
@@ -16616,7 +16617,7 @@
                 </a14:m>
                 <a:endParaRPr lang="en-US" dirty="0">
                   <a:solidFill>
-                    <a:schemeClr val="bg1"/>
+                    <a:schemeClr val="accent3"/>
                   </a:solidFill>
                 </a:endParaRPr>
               </a:p>
@@ -16816,7 +16817,7 @@
             </p:txBody>
           </p:sp>
         </mc:Choice>
-        <mc:Fallback xmlns="">
+        <mc:Fallback>
           <p:sp>
             <p:nvSpPr>
               <p:cNvPr id="3" name="מציין מיקום תוכן 2">
@@ -22162,8 +22163,8 @@
           </a:p>
         </p:txBody>
       </p:sp>
-      <mc:AlternateContent xmlns:mc="http://schemas.openxmlformats.org/markup-compatibility/2006">
-        <mc:Choice xmlns:a14="http://schemas.microsoft.com/office/drawing/2010/main" Requires="a14">
+      <mc:AlternateContent xmlns:mc="http://schemas.openxmlformats.org/markup-compatibility/2006" xmlns:a14="http://schemas.microsoft.com/office/drawing/2010/main">
+        <mc:Choice Requires="a14">
           <p:sp>
             <p:nvSpPr>
               <p:cNvPr id="3" name="מציין מיקום תוכן 2">
@@ -22218,7 +22219,9 @@
                 <a14:m>
                   <m:oMath xmlns:m="http://schemas.openxmlformats.org/officeDocument/2006/math">
                     <m:r>
-                      <a:rPr lang="en-US" i="1"/>
+                      <a:rPr lang="en-US" i="1">
+                        <a:latin typeface="Cambria Math" panose="02040503050406030204" pitchFamily="18" charset="0"/>
+                      </a:rPr>
                       <m:t>𝜇</m:t>
                     </m:r>
                   </m:oMath>
@@ -22259,7 +22262,7 @@
             </p:txBody>
           </p:sp>
         </mc:Choice>
-        <mc:Fallback>
+        <mc:Fallback xmlns="">
           <p:sp>
             <p:nvSpPr>
               <p:cNvPr id="3" name="מציין מיקום תוכן 2">
@@ -22621,8 +22624,8 @@
           </a:p>
         </p:txBody>
       </p:sp>
-      <mc:AlternateContent xmlns:mc="http://schemas.openxmlformats.org/markup-compatibility/2006">
-        <mc:Choice xmlns:a14="http://schemas.microsoft.com/office/drawing/2010/main" Requires="a14">
+      <mc:AlternateContent xmlns:mc="http://schemas.openxmlformats.org/markup-compatibility/2006" xmlns:a14="http://schemas.microsoft.com/office/drawing/2010/main">
+        <mc:Choice Requires="a14">
           <p:sp>
             <p:nvSpPr>
               <p:cNvPr id="12" name="Content Placeholder 11">
@@ -22786,7 +22789,7 @@
             </p:txBody>
           </p:sp>
         </mc:Choice>
-        <mc:Fallback>
+        <mc:Fallback xmlns="">
           <p:sp>
             <p:nvSpPr>
               <p:cNvPr id="12" name="Content Placeholder 11">
@@ -23002,8 +23005,8 @@
           </a:p>
         </p:txBody>
       </p:sp>
-      <mc:AlternateContent xmlns:mc="http://schemas.openxmlformats.org/markup-compatibility/2006">
-        <mc:Choice xmlns:a14="http://schemas.microsoft.com/office/drawing/2010/main" Requires="a14">
+      <mc:AlternateContent xmlns:mc="http://schemas.openxmlformats.org/markup-compatibility/2006" xmlns:a14="http://schemas.microsoft.com/office/drawing/2010/main">
+        <mc:Choice Requires="a14">
           <p:graphicFrame>
             <p:nvGraphicFramePr>
               <p:cNvPr id="10" name="מציין מיקום תוכן 6">
@@ -30906,7 +30909,7 @@
             </a:graphic>
           </p:graphicFrame>
         </mc:Choice>
-        <mc:Fallback>
+        <mc:Fallback xmlns="">
           <p:graphicFrame>
             <p:nvGraphicFramePr>
               <p:cNvPr id="10" name="מציין מיקום תוכן 6">
@@ -38815,7 +38818,7 @@
                 </a:pPr>
                 <a:r>
                   <a:rPr lang="en-US" dirty="0"/>
-                  <a:t>we turned to question how the disagreement-patches values influence the denoising result.</a:t>
+                  <a:t>We turned to question how the disagreement-patches values influence the denoising result.</a:t>
                 </a:r>
               </a:p>
               <a:p>
@@ -38829,7 +38832,9 @@
                 <a14:m>
                   <m:oMath xmlns:m="http://schemas.openxmlformats.org/officeDocument/2006/math">
                     <m:r>
-                      <a:rPr lang="en-US" i="1"/>
+                      <a:rPr lang="en-US" i="1">
+                        <a:latin typeface="Cambria Math" panose="02040503050406030204" pitchFamily="18" charset="0"/>
+                      </a:rPr>
                       <m:t>𝛼</m:t>
                     </m:r>
                   </m:oMath>
@@ -38861,24 +38866,27 @@
                       <m:r>
                         <a:rPr lang="en-US" i="1" smtClean="0">
                           <a:solidFill>
-                            <a:schemeClr val="bg1"/>
-                          </a:solidFill>
+                            <a:schemeClr val="accent3"/>
+                          </a:solidFill>
+                          <a:latin typeface="Cambria Math" panose="02040503050406030204" pitchFamily="18" charset="0"/>
                         </a:rPr>
                         <m:t>∀</m:t>
                       </m:r>
                       <m:r>
                         <a:rPr lang="en-US" i="1" smtClean="0">
                           <a:solidFill>
-                            <a:schemeClr val="bg1"/>
-                          </a:solidFill>
+                            <a:schemeClr val="accent3"/>
+                          </a:solidFill>
+                          <a:latin typeface="Cambria Math" panose="02040503050406030204" pitchFamily="18" charset="0"/>
                         </a:rPr>
                         <m:t>𝑖</m:t>
                       </m:r>
                       <m:r>
                         <a:rPr lang="en-US" i="1" smtClean="0">
                           <a:solidFill>
-                            <a:schemeClr val="bg1"/>
-                          </a:solidFill>
+                            <a:schemeClr val="accent3"/>
+                          </a:solidFill>
+                          <a:latin typeface="Cambria Math" panose="02040503050406030204" pitchFamily="18" charset="0"/>
                         </a:rPr>
                         <m:t>, </m:t>
                       </m:r>
@@ -38887,8 +38895,9 @@
                           <m:ctrlPr>
                             <a:rPr lang="en-US" i="1">
                               <a:solidFill>
-                                <a:schemeClr val="bg1"/>
+                                <a:schemeClr val="accent3"/>
                               </a:solidFill>
+                              <a:latin typeface="Cambria Math" panose="02040503050406030204" pitchFamily="18" charset="0"/>
                             </a:rPr>
                           </m:ctrlPr>
                         </m:sSubSupPr>
@@ -38896,8 +38905,9 @@
                           <m:r>
                             <a:rPr lang="en-US" i="1">
                               <a:solidFill>
-                                <a:schemeClr val="bg1"/>
+                                <a:schemeClr val="accent3"/>
                               </a:solidFill>
+                              <a:latin typeface="Cambria Math" panose="02040503050406030204" pitchFamily="18" charset="0"/>
                             </a:rPr>
                             <m:t>𝑞</m:t>
                           </m:r>
@@ -38906,8 +38916,9 @@
                           <m:r>
                             <a:rPr lang="en-US" i="1">
                               <a:solidFill>
-                                <a:schemeClr val="bg1"/>
+                                <a:schemeClr val="accent3"/>
                               </a:solidFill>
+                              <a:latin typeface="Cambria Math" panose="02040503050406030204" pitchFamily="18" charset="0"/>
                             </a:rPr>
                             <m:t>𝑖</m:t>
                           </m:r>
@@ -38916,24 +38927,27 @@
                           <m:r>
                             <a:rPr lang="en-US" i="1">
                               <a:solidFill>
-                                <a:schemeClr val="bg1"/>
+                                <a:schemeClr val="accent3"/>
                               </a:solidFill>
+                              <a:latin typeface="Cambria Math" panose="02040503050406030204" pitchFamily="18" charset="0"/>
                             </a:rPr>
                             <m:t>𝑘</m:t>
                           </m:r>
                           <m:r>
                             <a:rPr lang="en-US" i="1">
                               <a:solidFill>
-                                <a:schemeClr val="bg1"/>
+                                <a:schemeClr val="accent3"/>
                               </a:solidFill>
+                              <a:latin typeface="Cambria Math" panose="02040503050406030204" pitchFamily="18" charset="0"/>
                             </a:rPr>
                             <m:t>+</m:t>
                           </m:r>
                           <m:r>
                             <a:rPr lang="en-US" i="1">
                               <a:solidFill>
-                                <a:schemeClr val="bg1"/>
+                                <a:schemeClr val="accent3"/>
                               </a:solidFill>
+                              <a:latin typeface="Cambria Math" panose="02040503050406030204" pitchFamily="18" charset="0"/>
                             </a:rPr>
                             <m:t>1</m:t>
                           </m:r>
@@ -38942,24 +38956,27 @@
                       <m:r>
                         <a:rPr lang="en-US" i="1">
                           <a:solidFill>
-                            <a:schemeClr val="bg1"/>
-                          </a:solidFill>
+                            <a:schemeClr val="accent3"/>
+                          </a:solidFill>
+                          <a:latin typeface="Cambria Math" panose="02040503050406030204" pitchFamily="18" charset="0"/>
                         </a:rPr>
                         <m:t>=</m:t>
                       </m:r>
                       <m:r>
                         <a:rPr lang="en-US" i="1">
                           <a:solidFill>
-                            <a:schemeClr val="bg1"/>
-                          </a:solidFill>
+                            <a:schemeClr val="accent3"/>
+                          </a:solidFill>
+                          <a:latin typeface="Cambria Math" panose="02040503050406030204" pitchFamily="18" charset="0"/>
                         </a:rPr>
                         <m:t>𝛼</m:t>
                       </m:r>
                       <m:r>
                         <a:rPr lang="en-US" i="1">
                           <a:solidFill>
-                            <a:schemeClr val="bg1"/>
-                          </a:solidFill>
+                            <a:schemeClr val="accent3"/>
+                          </a:solidFill>
+                          <a:latin typeface="Cambria Math" panose="02040503050406030204" pitchFamily="18" charset="0"/>
                         </a:rPr>
                         <m:t>∙</m:t>
                       </m:r>
@@ -38968,8 +38985,9 @@
                           <m:ctrlPr>
                             <a:rPr lang="en-US" i="1">
                               <a:solidFill>
-                                <a:schemeClr val="bg1"/>
+                                <a:schemeClr val="accent3"/>
                               </a:solidFill>
+                              <a:latin typeface="Cambria Math" panose="02040503050406030204" pitchFamily="18" charset="0"/>
                             </a:rPr>
                           </m:ctrlPr>
                         </m:dPr>
@@ -38979,8 +38997,9 @@
                               <m:ctrlPr>
                                 <a:rPr lang="en-US" i="1">
                                   <a:solidFill>
-                                    <a:schemeClr val="bg1"/>
+                                    <a:schemeClr val="accent3"/>
                                   </a:solidFill>
+                                  <a:latin typeface="Cambria Math" panose="02040503050406030204" pitchFamily="18" charset="0"/>
                                 </a:rPr>
                               </m:ctrlPr>
                             </m:sSupPr>
@@ -38988,8 +39007,9 @@
                               <m:r>
                                 <a:rPr lang="en-US" i="1">
                                   <a:solidFill>
-                                    <a:schemeClr val="bg1"/>
+                                    <a:schemeClr val="accent3"/>
                                   </a:solidFill>
+                                  <a:latin typeface="Cambria Math" panose="02040503050406030204" pitchFamily="18" charset="0"/>
                                 </a:rPr>
                                 <m:t>𝐷</m:t>
                               </m:r>
@@ -38998,24 +39018,27 @@
                               <m:r>
                                 <a:rPr lang="en-US" i="1">
                                   <a:solidFill>
-                                    <a:schemeClr val="bg1"/>
+                                    <a:schemeClr val="accent3"/>
                                   </a:solidFill>
+                                  <a:latin typeface="Cambria Math" panose="02040503050406030204" pitchFamily="18" charset="0"/>
                                 </a:rPr>
                                 <m:t>𝑘</m:t>
                               </m:r>
                               <m:r>
                                 <a:rPr lang="en-US" i="1">
                                   <a:solidFill>
-                                    <a:schemeClr val="bg1"/>
+                                    <a:schemeClr val="accent3"/>
                                   </a:solidFill>
+                                  <a:latin typeface="Cambria Math" panose="02040503050406030204" pitchFamily="18" charset="0"/>
                                 </a:rPr>
                                 <m:t>+</m:t>
                               </m:r>
                               <m:r>
                                 <a:rPr lang="en-US" i="1">
                                   <a:solidFill>
-                                    <a:schemeClr val="bg1"/>
+                                    <a:schemeClr val="accent3"/>
                                   </a:solidFill>
+                                  <a:latin typeface="Cambria Math" panose="02040503050406030204" pitchFamily="18" charset="0"/>
                                 </a:rPr>
                                 <m:t>1</m:t>
                               </m:r>
@@ -39026,8 +39049,9 @@
                               <m:ctrlPr>
                                 <a:rPr lang="en-US" i="1">
                                   <a:solidFill>
-                                    <a:schemeClr val="bg1"/>
+                                    <a:schemeClr val="accent3"/>
                                   </a:solidFill>
+                                  <a:latin typeface="Cambria Math" panose="02040503050406030204" pitchFamily="18" charset="0"/>
                                 </a:rPr>
                               </m:ctrlPr>
                             </m:sSubSupPr>
@@ -39035,8 +39059,9 @@
                               <m:r>
                                 <a:rPr lang="en-US" i="1">
                                   <a:solidFill>
-                                    <a:schemeClr val="bg1"/>
+                                    <a:schemeClr val="accent3"/>
                                   </a:solidFill>
+                                  <a:latin typeface="Cambria Math" panose="02040503050406030204" pitchFamily="18" charset="0"/>
                                 </a:rPr>
                                 <m:t>𝛼</m:t>
                               </m:r>
@@ -39045,8 +39070,9 @@
                               <m:r>
                                 <a:rPr lang="en-US" i="1">
                                   <a:solidFill>
-                                    <a:schemeClr val="bg1"/>
+                                    <a:schemeClr val="accent3"/>
                                   </a:solidFill>
+                                  <a:latin typeface="Cambria Math" panose="02040503050406030204" pitchFamily="18" charset="0"/>
                                 </a:rPr>
                                 <m:t>𝑖</m:t>
                               </m:r>
@@ -39055,24 +39081,27 @@
                               <m:r>
                                 <a:rPr lang="en-US" i="1">
                                   <a:solidFill>
-                                    <a:schemeClr val="bg1"/>
+                                    <a:schemeClr val="accent3"/>
                                   </a:solidFill>
+                                  <a:latin typeface="Cambria Math" panose="02040503050406030204" pitchFamily="18" charset="0"/>
                                 </a:rPr>
                                 <m:t>𝑘</m:t>
                               </m:r>
                               <m:r>
                                 <a:rPr lang="en-US" i="1">
                                   <a:solidFill>
-                                    <a:schemeClr val="bg1"/>
+                                    <a:schemeClr val="accent3"/>
                                   </a:solidFill>
+                                  <a:latin typeface="Cambria Math" panose="02040503050406030204" pitchFamily="18" charset="0"/>
                                 </a:rPr>
                                 <m:t>+</m:t>
                               </m:r>
                               <m:r>
                                 <a:rPr lang="en-US" i="1">
                                   <a:solidFill>
-                                    <a:schemeClr val="bg1"/>
+                                    <a:schemeClr val="accent3"/>
                                   </a:solidFill>
+                                  <a:latin typeface="Cambria Math" panose="02040503050406030204" pitchFamily="18" charset="0"/>
                                 </a:rPr>
                                 <m:t>1</m:t>
                               </m:r>
@@ -39081,8 +39110,9 @@
                           <m:r>
                             <a:rPr lang="en-US" i="1">
                               <a:solidFill>
-                                <a:schemeClr val="bg1"/>
+                                <a:schemeClr val="accent3"/>
                               </a:solidFill>
+                              <a:latin typeface="Cambria Math" panose="02040503050406030204" pitchFamily="18" charset="0"/>
                             </a:rPr>
                             <m:t>−</m:t>
                           </m:r>
@@ -39091,8 +39121,9 @@
                               <m:ctrlPr>
                                 <a:rPr lang="en-US" i="1">
                                   <a:solidFill>
-                                    <a:schemeClr val="bg1"/>
+                                    <a:schemeClr val="accent3"/>
                                   </a:solidFill>
+                                  <a:latin typeface="Cambria Math" panose="02040503050406030204" pitchFamily="18" charset="0"/>
                                 </a:rPr>
                               </m:ctrlPr>
                             </m:sSubPr>
@@ -39100,8 +39131,9 @@
                               <m:r>
                                 <a:rPr lang="en-US" i="1">
                                   <a:solidFill>
-                                    <a:schemeClr val="bg1"/>
+                                    <a:schemeClr val="accent3"/>
                                   </a:solidFill>
+                                  <a:latin typeface="Cambria Math" panose="02040503050406030204" pitchFamily="18" charset="0"/>
                                 </a:rPr>
                                 <m:t>𝑅</m:t>
                               </m:r>
@@ -39110,8 +39142,9 @@
                               <m:r>
                                 <a:rPr lang="en-US" i="1">
                                   <a:solidFill>
-                                    <a:schemeClr val="bg1"/>
+                                    <a:schemeClr val="accent3"/>
                                   </a:solidFill>
+                                  <a:latin typeface="Cambria Math" panose="02040503050406030204" pitchFamily="18" charset="0"/>
                                 </a:rPr>
                                 <m:t>𝑖</m:t>
                               </m:r>
@@ -39122,8 +39155,9 @@
                               <m:ctrlPr>
                                 <a:rPr lang="en-US" i="1">
                                   <a:solidFill>
-                                    <a:schemeClr val="bg1"/>
+                                    <a:schemeClr val="accent3"/>
                                   </a:solidFill>
+                                  <a:latin typeface="Cambria Math" panose="02040503050406030204" pitchFamily="18" charset="0"/>
                                 </a:rPr>
                               </m:ctrlPr>
                             </m:sSupPr>
@@ -39134,8 +39168,9 @@
                                   <m:ctrlPr>
                                     <a:rPr lang="en-US" i="1">
                                       <a:solidFill>
-                                        <a:schemeClr val="bg1"/>
+                                        <a:schemeClr val="accent3"/>
                                       </a:solidFill>
+                                      <a:latin typeface="Cambria Math" panose="02040503050406030204" pitchFamily="18" charset="0"/>
                                     </a:rPr>
                                   </m:ctrlPr>
                                 </m:accPr>
@@ -39143,8 +39178,9 @@
                                   <m:r>
                                     <a:rPr lang="en-US" i="1">
                                       <a:solidFill>
-                                        <a:schemeClr val="bg1"/>
+                                        <a:schemeClr val="accent3"/>
                                       </a:solidFill>
+                                      <a:latin typeface="Cambria Math" panose="02040503050406030204" pitchFamily="18" charset="0"/>
                                     </a:rPr>
                                     <m:t>𝑥</m:t>
                                   </m:r>
@@ -39155,24 +39191,27 @@
                               <m:r>
                                 <a:rPr lang="en-US" i="1">
                                   <a:solidFill>
-                                    <a:schemeClr val="bg1"/>
+                                    <a:schemeClr val="accent3"/>
                                   </a:solidFill>
+                                  <a:latin typeface="Cambria Math" panose="02040503050406030204" pitchFamily="18" charset="0"/>
                                 </a:rPr>
                                 <m:t>𝑘</m:t>
                               </m:r>
                               <m:r>
                                 <a:rPr lang="en-US" i="1">
                                   <a:solidFill>
-                                    <a:schemeClr val="bg1"/>
+                                    <a:schemeClr val="accent3"/>
                                   </a:solidFill>
+                                  <a:latin typeface="Cambria Math" panose="02040503050406030204" pitchFamily="18" charset="0"/>
                                 </a:rPr>
                                 <m:t>+</m:t>
                               </m:r>
                               <m:r>
                                 <a:rPr lang="en-US" i="1">
                                   <a:solidFill>
-                                    <a:schemeClr val="bg1"/>
+                                    <a:schemeClr val="accent3"/>
                                   </a:solidFill>
+                                  <a:latin typeface="Cambria Math" panose="02040503050406030204" pitchFamily="18" charset="0"/>
                                 </a:rPr>
                                 <m:t>1</m:t>
                               </m:r>
@@ -39196,22 +39235,28 @@
                 <a14:m>
                   <m:oMath xmlns:m="http://schemas.openxmlformats.org/officeDocument/2006/math">
                     <m:r>
-                      <a:rPr lang="en-US" i="1"/>
+                      <a:rPr lang="en-US" i="1">
+                        <a:latin typeface="Cambria Math" panose="02040503050406030204" pitchFamily="18" charset="0"/>
+                      </a:rPr>
                       <m:t>𝛼</m:t>
                     </m:r>
                     <m:r>
-                      <a:rPr lang="en-US" i="1"/>
+                      <a:rPr lang="en-US" i="1">
+                        <a:latin typeface="Cambria Math" panose="02040503050406030204" pitchFamily="18" charset="0"/>
+                      </a:rPr>
                       <m:t>=</m:t>
                     </m:r>
                     <m:r>
-                      <a:rPr lang="en-US" i="1"/>
+                      <a:rPr lang="en-US" i="1">
+                        <a:latin typeface="Cambria Math" panose="02040503050406030204" pitchFamily="18" charset="0"/>
+                      </a:rPr>
                       <m:t>0</m:t>
                     </m:r>
                   </m:oMath>
                 </a14:m>
                 <a:r>
                   <a:rPr lang="en-US" dirty="0"/>
-                  <a:t> mean that the resulting algorithm K-SVD in every iteration, while</a:t>
+                  <a:t> mean that the resulting algorithm is K-SVD in every iteration, while</a:t>
                 </a:r>
                 <a:r>
                   <a:rPr lang="en-US" i="1" dirty="0"/>
@@ -39220,15 +39265,21 @@
                 <a14:m>
                   <m:oMath xmlns:m="http://schemas.openxmlformats.org/officeDocument/2006/math">
                     <m:r>
-                      <a:rPr lang="en-US" i="1"/>
+                      <a:rPr lang="en-US" i="1">
+                        <a:latin typeface="Cambria Math" panose="02040503050406030204" pitchFamily="18" charset="0"/>
+                      </a:rPr>
                       <m:t>𝛼</m:t>
                     </m:r>
                     <m:r>
-                      <a:rPr lang="en-US" i="1"/>
+                      <a:rPr lang="en-US" i="1">
+                        <a:latin typeface="Cambria Math" panose="02040503050406030204" pitchFamily="18" charset="0"/>
+                      </a:rPr>
                       <m:t>=</m:t>
                     </m:r>
                     <m:r>
-                      <a:rPr lang="en-US" i="1"/>
+                      <a:rPr lang="en-US" i="1">
+                        <a:latin typeface="Cambria Math" panose="02040503050406030204" pitchFamily="18" charset="0"/>
+                      </a:rPr>
                       <m:t>1</m:t>
                     </m:r>
                   </m:oMath>
@@ -39355,6 +39406,568 @@
 </file>
 
 <file path=ppt/slides/slide24.xml><?xml version="1.0" encoding="utf-8"?>
+<p:sld xmlns:a="http://schemas.openxmlformats.org/drawingml/2006/main" xmlns:r="http://schemas.openxmlformats.org/officeDocument/2006/relationships" xmlns:p="http://schemas.openxmlformats.org/presentationml/2006/main">
+  <p:cSld>
+    <p:bg>
+      <p:bgPr>
+        <a:solidFill>
+          <a:schemeClr val="bg2"/>
+        </a:solidFill>
+        <a:effectLst/>
+      </p:bgPr>
+    </p:bg>
+    <p:spTree>
+      <p:nvGrpSpPr>
+        <p:cNvPr id="1" name=""/>
+        <p:cNvGrpSpPr/>
+        <p:nvPr/>
+      </p:nvGrpSpPr>
+      <p:grpSpPr>
+        <a:xfrm>
+          <a:off x="0" y="0"/>
+          <a:ext cx="0" cy="0"/>
+          <a:chOff x="0" y="0"/>
+          <a:chExt cx="0" cy="0"/>
+        </a:xfrm>
+      </p:grpSpPr>
+      <p:sp useBgFill="1">
+        <p:nvSpPr>
+          <p:cNvPr id="14" name="Rectangle 13">
+            <a:extLst>
+              <a:ext uri="{FF2B5EF4-FFF2-40B4-BE49-F238E27FC236}">
+                <a16:creationId xmlns:a16="http://schemas.microsoft.com/office/drawing/2014/main" id="{8267EEE4-6354-4F1C-9484-951F0EB92F1B}"/>
+              </a:ext>
+              <a:ext uri="{C183D7F6-B498-43B3-948B-1728B52AA6E4}">
+                <adec:decorative xmlns:adec="http://schemas.microsoft.com/office/drawing/2017/decorative" val="1"/>
+              </a:ext>
+            </a:extLst>
+          </p:cNvPr>
+          <p:cNvSpPr>
+            <a:spLocks noGrp="1" noRot="1" noChangeAspect="1" noMove="1" noResize="1" noEditPoints="1" noAdjustHandles="1" noChangeArrowheads="1" noChangeShapeType="1" noTextEdit="1"/>
+          </p:cNvSpPr>
+          <p:nvPr>
+            <p:extLst>
+              <p:ext uri="{386F3935-93C4-4BCD-93E2-E3B085C9AB24}">
+                <p16:designElem xmlns:p16="http://schemas.microsoft.com/office/powerpoint/2015/main" val="1"/>
+              </p:ext>
+            </p:extLst>
+          </p:nvPr>
+        </p:nvSpPr>
+        <p:spPr>
+          <a:xfrm>
+            <a:off x="3176" y="0"/>
+            <a:ext cx="12185649" cy="6858000"/>
+          </a:xfrm>
+          <a:prstGeom prst="rect">
+            <a:avLst/>
+          </a:prstGeom>
+          <a:ln>
+            <a:noFill/>
+          </a:ln>
+        </p:spPr>
+        <p:style>
+          <a:lnRef idx="2">
+            <a:schemeClr val="accent1">
+              <a:shade val="50000"/>
+            </a:schemeClr>
+          </a:lnRef>
+          <a:fillRef idx="1">
+            <a:schemeClr val="accent1"/>
+          </a:fillRef>
+          <a:effectRef idx="0">
+            <a:schemeClr val="accent1"/>
+          </a:effectRef>
+          <a:fontRef idx="minor">
+            <a:schemeClr val="lt1"/>
+          </a:fontRef>
+        </p:style>
+        <p:txBody>
+          <a:bodyPr rtlCol="0" anchor="ctr"/>
+          <a:lstStyle/>
+          <a:p>
+            <a:pPr marL="0" marR="0" lvl="0" indent="0" algn="ctr" defTabSz="457200" rtl="0" eaLnBrk="1" fontAlgn="auto" latinLnBrk="0" hangingPunct="1">
+              <a:lnSpc>
+                <a:spcPct val="100000"/>
+              </a:lnSpc>
+              <a:spcBef>
+                <a:spcPts val="0"/>
+              </a:spcBef>
+              <a:spcAft>
+                <a:spcPts val="0"/>
+              </a:spcAft>
+              <a:buClrTx/>
+              <a:buSzTx/>
+              <a:buFontTx/>
+              <a:buNone/>
+              <a:tabLst/>
+              <a:defRPr/>
+            </a:pPr>
+            <a:endParaRPr kumimoji="0" lang="en-US" sz="1800" b="0" i="0" u="none" strike="noStrike" kern="1200" cap="none" spc="0" normalizeH="0" baseline="0" noProof="0">
+              <a:ln>
+                <a:noFill/>
+              </a:ln>
+              <a:solidFill>
+                <a:prstClr val="white"/>
+              </a:solidFill>
+              <a:effectLst/>
+              <a:uLnTx/>
+              <a:uFillTx/>
+              <a:latin typeface="Trebuchet MS" panose="020B0603020202020204"/>
+              <a:ea typeface="+mn-ea"/>
+              <a:cs typeface="+mn-cs"/>
+            </a:endParaRPr>
+          </a:p>
+        </p:txBody>
+      </p:sp>
+      <p:sp>
+        <p:nvSpPr>
+          <p:cNvPr id="2" name="כותרת 1">
+            <a:extLst>
+              <a:ext uri="{FF2B5EF4-FFF2-40B4-BE49-F238E27FC236}">
+                <a16:creationId xmlns:a16="http://schemas.microsoft.com/office/drawing/2014/main" id="{376D76BF-7B30-49FE-9D2E-8DEC2CD29B55}"/>
+              </a:ext>
+            </a:extLst>
+          </p:cNvPr>
+          <p:cNvSpPr>
+            <a:spLocks noGrp="1"/>
+          </p:cNvSpPr>
+          <p:nvPr>
+            <p:ph type="title"/>
+          </p:nvPr>
+        </p:nvSpPr>
+        <p:spPr>
+          <a:xfrm>
+            <a:off x="989768" y="609600"/>
+            <a:ext cx="5498361" cy="1320800"/>
+          </a:xfrm>
+        </p:spPr>
+        <p:txBody>
+          <a:bodyPr anchor="ctr">
+            <a:normAutofit/>
+          </a:bodyPr>
+          <a:lstStyle/>
+          <a:p>
+            <a:pPr>
+              <a:lnSpc>
+                <a:spcPct val="90000"/>
+              </a:lnSpc>
+            </a:pPr>
+            <a:r>
+              <a:rPr lang="en-US" sz="2800" b="1"/>
+              <a:t>ADDITIONAL WORK – PARAMETRIZATION – first reaserch</a:t>
+            </a:r>
+            <a:endParaRPr lang="he-IL" sz="2800"/>
+          </a:p>
+        </p:txBody>
+      </p:sp>
+      <p:sp>
+        <p:nvSpPr>
+          <p:cNvPr id="16" name="Isosceles Triangle 15">
+            <a:extLst>
+              <a:ext uri="{FF2B5EF4-FFF2-40B4-BE49-F238E27FC236}">
+                <a16:creationId xmlns:a16="http://schemas.microsoft.com/office/drawing/2014/main" id="{0E5A83F9-E6B8-40BD-9C0D-9A6F15650742}"/>
+              </a:ext>
+              <a:ext uri="{C183D7F6-B498-43B3-948B-1728B52AA6E4}">
+                <adec:decorative xmlns:adec="http://schemas.microsoft.com/office/drawing/2017/decorative" val="1"/>
+              </a:ext>
+            </a:extLst>
+          </p:cNvPr>
+          <p:cNvSpPr>
+            <a:spLocks noGrp="1" noRot="1" noChangeAspect="1" noMove="1" noResize="1" noEditPoints="1" noAdjustHandles="1" noChangeArrowheads="1" noChangeShapeType="1" noTextEdit="1"/>
+          </p:cNvSpPr>
+          <p:nvPr>
+            <p:extLst>
+              <p:ext uri="{386F3935-93C4-4BCD-93E2-E3B085C9AB24}">
+                <p16:designElem xmlns:p16="http://schemas.microsoft.com/office/powerpoint/2015/main" val="1"/>
+              </p:ext>
+            </p:extLst>
+          </p:nvPr>
+        </p:nvSpPr>
+        <p:spPr>
+          <a:xfrm rot="10800000">
+            <a:off x="0" y="0"/>
+            <a:ext cx="842596" cy="5666154"/>
+          </a:xfrm>
+          <a:prstGeom prst="triangle">
+            <a:avLst>
+              <a:gd name="adj" fmla="val 100000"/>
+            </a:avLst>
+          </a:prstGeom>
+          <a:solidFill>
+            <a:schemeClr val="accent1">
+              <a:alpha val="85000"/>
+            </a:schemeClr>
+          </a:solidFill>
+          <a:ln>
+            <a:noFill/>
+          </a:ln>
+          <a:effectLst/>
+        </p:spPr>
+        <p:style>
+          <a:lnRef idx="1">
+            <a:schemeClr val="accent1"/>
+          </a:lnRef>
+          <a:fillRef idx="3">
+            <a:schemeClr val="accent1"/>
+          </a:fillRef>
+          <a:effectRef idx="2">
+            <a:schemeClr val="accent1"/>
+          </a:effectRef>
+          <a:fontRef idx="minor">
+            <a:schemeClr val="lt1"/>
+          </a:fontRef>
+        </p:style>
+      </p:sp>
+      <mc:AlternateContent xmlns:mc="http://schemas.openxmlformats.org/markup-compatibility/2006">
+        <mc:Choice xmlns:a14="http://schemas.microsoft.com/office/drawing/2010/main" Requires="a14">
+          <p:sp>
+            <p:nvSpPr>
+              <p:cNvPr id="3" name="מציין מיקום תוכן 2">
+                <a:extLst>
+                  <a:ext uri="{FF2B5EF4-FFF2-40B4-BE49-F238E27FC236}">
+                    <a16:creationId xmlns:a16="http://schemas.microsoft.com/office/drawing/2014/main" id="{0A72F901-78F5-429E-B14A-12E673CFB44A}"/>
+                  </a:ext>
+                </a:extLst>
+              </p:cNvPr>
+              <p:cNvSpPr>
+                <a:spLocks noGrp="1"/>
+              </p:cNvSpPr>
+              <p:nvPr>
+                <p:ph idx="1"/>
+              </p:nvPr>
+            </p:nvSpPr>
+            <p:spPr>
+              <a:xfrm>
+                <a:off x="989769" y="2160589"/>
+                <a:ext cx="6163773" cy="3880773"/>
+              </a:xfrm>
+            </p:spPr>
+            <p:txBody>
+              <a:bodyPr>
+                <a:normAutofit/>
+              </a:bodyPr>
+              <a:lstStyle/>
+              <a:p>
+                <a:pPr marL="0" indent="0" algn="l" rtl="0">
+                  <a:buNone/>
+                </a:pPr>
+                <a:r>
+                  <a:rPr lang="en-US" dirty="0"/>
+                  <a:t>We tried various values between 0 and 2, with step of 0.1.</a:t>
+                </a:r>
+              </a:p>
+              <a:p>
+                <a:pPr marL="0" indent="0" algn="l" rtl="0">
+                  <a:buNone/>
+                </a:pPr>
+                <a:r>
+                  <a:rPr lang="en-US" dirty="0"/>
+                  <a:t>First, for 2 of the most different pictures: Barbara and Fingerprint.</a:t>
+                </a:r>
+              </a:p>
+              <a:p>
+                <a:pPr marL="0" indent="0" algn="l" rtl="0">
+                  <a:buNone/>
+                </a:pPr>
+                <a:r>
+                  <a:rPr lang="en-US" dirty="0"/>
+                  <a:t>We used fixed concrete </a:t>
+                </a:r>
+                <a14:m>
+                  <m:oMath xmlns:m="http://schemas.openxmlformats.org/officeDocument/2006/math">
+                    <m:r>
+                      <a:rPr lang="en-US" i="1"/>
+                      <m:t>𝜎</m:t>
+                    </m:r>
+                  </m:oMath>
+                </a14:m>
+                <a:r>
+                  <a:rPr lang="en-US" dirty="0"/>
+                  <a:t>=20 and gain 1.16.</a:t>
+                </a:r>
+              </a:p>
+              <a:p>
+                <a:pPr marL="0" indent="0" algn="l" rtl="0">
+                  <a:buNone/>
+                </a:pPr>
+                <a:r>
+                  <a:rPr lang="en-US" dirty="0"/>
+                  <a:t>As can be seen </a:t>
+                </a:r>
+                <a14:m>
+                  <m:oMath xmlns:m="http://schemas.openxmlformats.org/officeDocument/2006/math">
+                    <m:r>
+                      <a:rPr lang="en-US" i="1">
+                        <a:latin typeface="Cambria Math" panose="02040503050406030204" pitchFamily="18" charset="0"/>
+                      </a:rPr>
+                      <m:t>𝛼</m:t>
+                    </m:r>
+                  </m:oMath>
+                </a14:m>
+                <a:r>
+                  <a:rPr lang="en-US" dirty="0"/>
+                  <a:t>=1 is not the best option. There is still a space for improvement up to 0.1 more in terms of PSNR.</a:t>
+                </a:r>
+              </a:p>
+              <a:p>
+                <a:pPr marL="0" indent="0" algn="l" rtl="0">
+                  <a:buNone/>
+                </a:pPr>
+                <a:r>
+                  <a:rPr lang="en-US" dirty="0"/>
+                  <a:t>The </a:t>
+                </a:r>
+                <a14:m>
+                  <m:oMath xmlns:m="http://schemas.openxmlformats.org/officeDocument/2006/math">
+                    <m:r>
+                      <a:rPr lang="en-US" i="1"/>
+                      <m:t>𝛼</m:t>
+                    </m:r>
+                  </m:oMath>
+                </a14:m>
+                <a:r>
+                  <a:rPr lang="en-US" dirty="0"/>
+                  <a:t> providing the peak improvement was not the same for both pictures – about 0.4 for Barbara and about 1.3 for Fingerprint.</a:t>
+                </a:r>
+                <a:endParaRPr lang="he-IL" dirty="0"/>
+              </a:p>
+            </p:txBody>
+          </p:sp>
+        </mc:Choice>
+        <mc:Fallback>
+          <p:sp>
+            <p:nvSpPr>
+              <p:cNvPr id="3" name="מציין מיקום תוכן 2">
+                <a:extLst>
+                  <a:ext uri="{FF2B5EF4-FFF2-40B4-BE49-F238E27FC236}">
+                    <a16:creationId xmlns:a16="http://schemas.microsoft.com/office/drawing/2014/main" id="{0A72F901-78F5-429E-B14A-12E673CFB44A}"/>
+                  </a:ext>
+                </a:extLst>
+              </p:cNvPr>
+              <p:cNvSpPr>
+                <a:spLocks noGrp="1" noRot="1" noChangeAspect="1" noMove="1" noResize="1" noEditPoints="1" noAdjustHandles="1" noChangeArrowheads="1" noChangeShapeType="1" noTextEdit="1"/>
+              </p:cNvSpPr>
+              <p:nvPr>
+                <p:ph idx="1"/>
+              </p:nvPr>
+            </p:nvSpPr>
+            <p:spPr>
+              <a:xfrm>
+                <a:off x="989769" y="2160589"/>
+                <a:ext cx="6163773" cy="3880773"/>
+              </a:xfrm>
+              <a:blipFill>
+                <a:blip r:embed="rId2"/>
+                <a:stretch>
+                  <a:fillRect l="-791" t="-942" r="-297"/>
+                </a:stretch>
+              </a:blipFill>
+            </p:spPr>
+            <p:txBody>
+              <a:bodyPr/>
+              <a:lstStyle/>
+              <a:p>
+                <a:r>
+                  <a:rPr lang="he-IL">
+                    <a:noFill/>
+                  </a:rPr>
+                  <a:t> </a:t>
+                </a:r>
+              </a:p>
+            </p:txBody>
+          </p:sp>
+        </mc:Fallback>
+      </mc:AlternateContent>
+      <p:sp>
+        <p:nvSpPr>
+          <p:cNvPr id="4" name="מציין מיקום של כותרת תחתונה 3">
+            <a:extLst>
+              <a:ext uri="{FF2B5EF4-FFF2-40B4-BE49-F238E27FC236}">
+                <a16:creationId xmlns:a16="http://schemas.microsoft.com/office/drawing/2014/main" id="{2E7B128A-B3F4-47BB-8913-27E6D623B42F}"/>
+              </a:ext>
+            </a:extLst>
+          </p:cNvPr>
+          <p:cNvSpPr>
+            <a:spLocks noGrp="1"/>
+          </p:cNvSpPr>
+          <p:nvPr>
+            <p:ph type="ftr" sz="quarter" idx="11"/>
+          </p:nvPr>
+        </p:nvSpPr>
+        <p:spPr>
+          <a:xfrm>
+            <a:off x="986594" y="6041362"/>
+            <a:ext cx="3836418" cy="365125"/>
+          </a:xfrm>
+        </p:spPr>
+        <p:txBody>
+          <a:bodyPr>
+            <a:normAutofit/>
+          </a:bodyPr>
+          <a:lstStyle/>
+          <a:p>
+            <a:pPr>
+              <a:spcAft>
+                <a:spcPts val="600"/>
+              </a:spcAft>
+            </a:pPr>
+            <a:r>
+              <a:rPr lang="en-US">
+                <a:solidFill>
+                  <a:schemeClr val="tx1"/>
+                </a:solidFill>
+              </a:rPr>
+              <a:t>236862 Sparse and Redundant Representations by Prof. Michael Elad</a:t>
+            </a:r>
+          </a:p>
+        </p:txBody>
+      </p:sp>
+      <p:sp>
+        <p:nvSpPr>
+          <p:cNvPr id="5" name="מציין מיקום של מספר שקופית 4">
+            <a:extLst>
+              <a:ext uri="{FF2B5EF4-FFF2-40B4-BE49-F238E27FC236}">
+                <a16:creationId xmlns:a16="http://schemas.microsoft.com/office/drawing/2014/main" id="{F4D661FA-39AA-4A57-AE6B-C56D0EA98A8E}"/>
+              </a:ext>
+            </a:extLst>
+          </p:cNvPr>
+          <p:cNvSpPr>
+            <a:spLocks noGrp="1"/>
+          </p:cNvSpPr>
+          <p:nvPr>
+            <p:ph type="sldNum" sz="quarter" idx="12"/>
+          </p:nvPr>
+        </p:nvSpPr>
+        <p:spPr>
+          <a:xfrm>
+            <a:off x="6470204" y="6041362"/>
+            <a:ext cx="683339" cy="365125"/>
+          </a:xfrm>
+        </p:spPr>
+        <p:txBody>
+          <a:bodyPr>
+            <a:normAutofit/>
+          </a:bodyPr>
+          <a:lstStyle/>
+          <a:p>
+            <a:pPr>
+              <a:spcAft>
+                <a:spcPts val="600"/>
+              </a:spcAft>
+            </a:pPr>
+            <a:fld id="{D57F1E4F-1CFF-5643-939E-217C01CDF565}" type="slidenum">
+              <a:rPr lang="en-US">
+                <a:solidFill>
+                  <a:srgbClr val="90C226"/>
+                </a:solidFill>
+              </a:rPr>
+              <a:pPr>
+                <a:spcAft>
+                  <a:spcPts val="600"/>
+                </a:spcAft>
+              </a:pPr>
+              <a:t>24</a:t>
+            </a:fld>
+            <a:endParaRPr lang="en-US">
+              <a:solidFill>
+                <a:srgbClr val="90C226"/>
+              </a:solidFill>
+            </a:endParaRPr>
+          </a:p>
+        </p:txBody>
+      </p:sp>
+      <p:pic>
+        <p:nvPicPr>
+          <p:cNvPr id="13" name="Picture 10">
+            <a:extLst>
+              <a:ext uri="{FF2B5EF4-FFF2-40B4-BE49-F238E27FC236}">
+                <a16:creationId xmlns:a16="http://schemas.microsoft.com/office/drawing/2014/main" id="{235EA887-6802-4840-A6E9-F324A5D4CA51}"/>
+              </a:ext>
+            </a:extLst>
+          </p:cNvPr>
+          <p:cNvPicPr/>
+          <p:nvPr/>
+        </p:nvPicPr>
+        <p:blipFill>
+          <a:blip r:embed="rId3" cstate="print">
+            <a:extLst>
+              <a:ext uri="{28A0092B-C50C-407E-A947-70E740481C1C}">
+                <a14:useLocalDpi xmlns:a14="http://schemas.microsoft.com/office/drawing/2010/main" val="0"/>
+              </a:ext>
+            </a:extLst>
+          </a:blip>
+          <a:srcRect/>
+          <a:stretch>
+            <a:fillRect/>
+          </a:stretch>
+        </p:blipFill>
+        <p:spPr bwMode="auto">
+          <a:xfrm>
+            <a:off x="7534661" y="3448424"/>
+            <a:ext cx="4657340" cy="3448414"/>
+          </a:xfrm>
+          <a:prstGeom prst="rect">
+            <a:avLst/>
+          </a:prstGeom>
+          <a:noFill/>
+          <a:ln>
+            <a:noFill/>
+          </a:ln>
+        </p:spPr>
+      </p:pic>
+      <p:pic>
+        <p:nvPicPr>
+          <p:cNvPr id="15" name="Picture 6">
+            <a:extLst>
+              <a:ext uri="{FF2B5EF4-FFF2-40B4-BE49-F238E27FC236}">
+                <a16:creationId xmlns:a16="http://schemas.microsoft.com/office/drawing/2014/main" id="{F18F0133-4786-43FB-8C55-84EB1C528A8A}"/>
+              </a:ext>
+            </a:extLst>
+          </p:cNvPr>
+          <p:cNvPicPr/>
+          <p:nvPr/>
+        </p:nvPicPr>
+        <p:blipFill>
+          <a:blip r:embed="rId4" cstate="print">
+            <a:extLst>
+              <a:ext uri="{28A0092B-C50C-407E-A947-70E740481C1C}">
+                <a14:useLocalDpi xmlns:a14="http://schemas.microsoft.com/office/drawing/2010/main" val="0"/>
+              </a:ext>
+            </a:extLst>
+          </a:blip>
+          <a:srcRect/>
+          <a:stretch>
+            <a:fillRect/>
+          </a:stretch>
+        </p:blipFill>
+        <p:spPr bwMode="auto">
+          <a:xfrm>
+            <a:off x="7534660" y="0"/>
+            <a:ext cx="4657340" cy="3448413"/>
+          </a:xfrm>
+          <a:prstGeom prst="rect">
+            <a:avLst/>
+          </a:prstGeom>
+          <a:noFill/>
+          <a:ln>
+            <a:noFill/>
+          </a:ln>
+        </p:spPr>
+      </p:pic>
+    </p:spTree>
+    <p:extLst>
+      <p:ext uri="{BB962C8B-B14F-4D97-AF65-F5344CB8AC3E}">
+        <p14:creationId xmlns:p14="http://schemas.microsoft.com/office/powerpoint/2010/main" val="3934841607"/>
+      </p:ext>
+    </p:extLst>
+  </p:cSld>
+  <p:clrMapOvr>
+    <a:masterClrMapping/>
+  </p:clrMapOvr>
+</p:sld>
+</file>
+
+<file path=ppt/slides/slide25.xml><?xml version="1.0" encoding="utf-8"?>
 <p:sld xmlns:a="http://schemas.openxmlformats.org/drawingml/2006/main" xmlns:r="http://schemas.openxmlformats.org/officeDocument/2006/relationships" xmlns:p="http://schemas.openxmlformats.org/presentationml/2006/main">
   <p:cSld>
     <p:bg>
@@ -39563,8 +40176,8 @@
           </a:p>
         </p:txBody>
       </p:sp>
-      <mc:AlternateContent xmlns:mc="http://schemas.openxmlformats.org/markup-compatibility/2006">
-        <mc:Choice xmlns:a14="http://schemas.microsoft.com/office/drawing/2010/main" Requires="a14">
+      <mc:AlternateContent xmlns:mc="http://schemas.openxmlformats.org/markup-compatibility/2006" xmlns:a14="http://schemas.microsoft.com/office/drawing/2010/main">
+        <mc:Choice Requires="a14">
           <p:sp>
             <p:nvSpPr>
               <p:cNvPr id="2" name="כותרת 1">
@@ -39636,7 +40249,7 @@
             </p:txBody>
           </p:sp>
         </mc:Choice>
-        <mc:Fallback>
+        <mc:Fallback xmlns="">
           <p:sp>
             <p:nvSpPr>
               <p:cNvPr id="2" name="כותרת 1">
@@ -39680,8 +40293,8 @@
           </p:sp>
         </mc:Fallback>
       </mc:AlternateContent>
-      <mc:AlternateContent xmlns:mc="http://schemas.openxmlformats.org/markup-compatibility/2006">
-        <mc:Choice xmlns:a14="http://schemas.microsoft.com/office/drawing/2010/main" Requires="a14">
+      <mc:AlternateContent xmlns:mc="http://schemas.openxmlformats.org/markup-compatibility/2006" xmlns:a14="http://schemas.microsoft.com/office/drawing/2010/main">
+        <mc:Choice Requires="a14">
           <p:sp>
             <p:nvSpPr>
               <p:cNvPr id="3" name="מציין מיקום תוכן 2">
@@ -39770,6 +40383,7 @@
                         <a:solidFill>
                           <a:schemeClr val="bg1"/>
                         </a:solidFill>
+                        <a:latin typeface="Cambria Math" panose="02040503050406030204" pitchFamily="18" charset="0"/>
                       </a:rPr>
                       <m:t>𝜎</m:t>
                     </m:r>
@@ -39886,7 +40500,7 @@
             </p:txBody>
           </p:sp>
         </mc:Choice>
-        <mc:Fallback>
+        <mc:Fallback xmlns="">
           <p:sp>
             <p:nvSpPr>
               <p:cNvPr id="3" name="מציין מיקום תוכן 2">
@@ -40059,7 +40673,7 @@
                   <a:spcPts val="600"/>
                 </a:spcAft>
               </a:pPr>
-              <a:t>24</a:t>
+              <a:t>25</a:t>
             </a:fld>
             <a:endParaRPr lang="en-US">
               <a:solidFill>
@@ -40150,7 +40764,7 @@
 </p:sld>
 </file>
 
-<file path=ppt/slides/slide25.xml><?xml version="1.0" encoding="utf-8"?>
+<file path=ppt/slides/slide26.xml><?xml version="1.0" encoding="utf-8"?>
 <p:sld xmlns:a="http://schemas.openxmlformats.org/drawingml/2006/main" xmlns:r="http://schemas.openxmlformats.org/officeDocument/2006/relationships" xmlns:p="http://schemas.openxmlformats.org/presentationml/2006/main">
   <p:cSld>
     <p:spTree>
@@ -40259,7 +40873,7 @@
                 <a:pPr algn="l" rtl="0"/>
                 <a:r>
                   <a:rPr lang="en-US" dirty="0"/>
-                  <a:t>proposed a small parametrization to the “Sharing the disagreement”.</a:t>
+                  <a:t>Proposed a small parametrization to the “Sharing the disagreement”.</a:t>
                 </a:r>
               </a:p>
               <a:p>
@@ -40282,7 +40896,9 @@
                 <a14:m>
                   <m:oMath xmlns:m="http://schemas.openxmlformats.org/officeDocument/2006/math">
                     <m:r>
-                      <a:rPr lang="en-US" i="1"/>
+                      <a:rPr lang="en-US" i="1">
+                        <a:latin typeface="Cambria Math" panose="02040503050406030204" pitchFamily="18" charset="0"/>
+                      </a:rPr>
                       <m:t>𝛼</m:t>
                     </m:r>
                   </m:oMath>
@@ -40394,7 +41010,7 @@
             <a:fld id="{D57F1E4F-1CFF-5643-939E-217C01CDF565}" type="slidenum">
               <a:rPr lang="en-US" smtClean="0"/>
               <a:pPr/>
-              <a:t>25</a:t>
+              <a:t>26</a:t>
             </a:fld>
             <a:endParaRPr lang="en-US" dirty="0"/>
           </a:p>
@@ -40413,7 +41029,7 @@
 </p:sld>
 </file>
 
-<file path=ppt/slides/slide26.xml><?xml version="1.0" encoding="utf-8"?>
+<file path=ppt/slides/slide27.xml><?xml version="1.0" encoding="utf-8"?>
 <p:sld xmlns:a="http://schemas.openxmlformats.org/drawingml/2006/main" xmlns:r="http://schemas.openxmlformats.org/officeDocument/2006/relationships" xmlns:p="http://schemas.openxmlformats.org/presentationml/2006/main">
   <p:cSld>
     <p:spTree>
@@ -40463,8 +41079,8 @@
           </a:p>
         </p:txBody>
       </p:sp>
-      <mc:AlternateContent xmlns:mc="http://schemas.openxmlformats.org/markup-compatibility/2006">
-        <mc:Choice xmlns:a14="http://schemas.microsoft.com/office/drawing/2010/main" Requires="a14">
+      <mc:AlternateContent xmlns:mc="http://schemas.openxmlformats.org/markup-compatibility/2006" xmlns:a14="http://schemas.microsoft.com/office/drawing/2010/main">
+        <mc:Choice Requires="a14">
           <p:sp>
             <p:nvSpPr>
               <p:cNvPr id="3" name="מציין מיקום תוכן 2">
@@ -40601,7 +41217,7 @@
             </p:txBody>
           </p:sp>
         </mc:Choice>
-        <mc:Fallback>
+        <mc:Fallback xmlns="">
           <p:sp>
             <p:nvSpPr>
               <p:cNvPr id="3" name="מציין מיקום תוכן 2">
@@ -40694,7 +41310,7 @@
             <a:fld id="{D57F1E4F-1CFF-5643-939E-217C01CDF565}" type="slidenum">
               <a:rPr lang="en-US" smtClean="0"/>
               <a:pPr/>
-              <a:t>26</a:t>
+              <a:t>27</a:t>
             </a:fld>
             <a:endParaRPr lang="en-US" dirty="0"/>
           </a:p>
@@ -40713,7 +41329,7 @@
 </p:sld>
 </file>
 
-<file path=ppt/slides/slide27.xml><?xml version="1.0" encoding="utf-8"?>
+<file path=ppt/slides/slide28.xml><?xml version="1.0" encoding="utf-8"?>
 <p:sld xmlns:a="http://schemas.openxmlformats.org/drawingml/2006/main" xmlns:r="http://schemas.openxmlformats.org/officeDocument/2006/relationships" xmlns:p="http://schemas.openxmlformats.org/presentationml/2006/main">
   <p:cSld>
     <p:spTree>
@@ -40780,10 +41396,15 @@
             <p:ph idx="1"/>
           </p:nvPr>
         </p:nvSpPr>
-        <p:spPr/>
+        <p:spPr>
+          <a:xfrm>
+            <a:off x="677334" y="1704513"/>
+            <a:ext cx="8596668" cy="4336849"/>
+          </a:xfrm>
+        </p:spPr>
         <p:txBody>
           <a:bodyPr>
-            <a:normAutofit fontScale="70000" lnSpcReduction="20000"/>
+            <a:normAutofit fontScale="85000" lnSpcReduction="20000"/>
           </a:bodyPr>
           <a:lstStyle/>
           <a:p>
@@ -41064,7 +41685,7 @@
             <a:fld id="{D57F1E4F-1CFF-5643-939E-217C01CDF565}" type="slidenum">
               <a:rPr lang="en-US" smtClean="0"/>
               <a:pPr/>
-              <a:t>27</a:t>
+              <a:t>28</a:t>
             </a:fld>
             <a:endParaRPr lang="en-US" dirty="0"/>
           </a:p>
@@ -41157,7 +41778,7 @@
             </a:pPr>
             <a:r>
               <a:rPr lang="en-US" sz="2000" dirty="0"/>
-              <a:t>This paper is a summary of paper “PATCH-DISAGREEMENT AS A WAY TO IMPROVE K-SVD DENOISING” by Elad and Romano, extended by our remarks and descriptions.</a:t>
+              <a:t>This is a presentation for the summary of the paper “PATCH-DISAGREEMENT AS A WAY TO IMPROVE K-SVD DENOISING” by Elad and Romano, extended by our remarks and descriptions.</a:t>
             </a:r>
           </a:p>
           <a:p>

</xml_diff>